<commit_message>
fix presentation, add TaskFlowPurple, add presentation of others
</commit_message>
<xml_diff>
--- a/Redmine.pptx
+++ b/Redmine.pptx
@@ -5,10 +5,10 @@
     <p:sldMasterId id="2147483673" r:id="rId1"/>
   </p:sldMasterIdLst>
   <p:notesMasterIdLst>
-    <p:notesMasterId r:id="rId14"/>
+    <p:notesMasterId r:id="rId15"/>
   </p:notesMasterIdLst>
   <p:sldIdLst>
-    <p:sldId id="256" r:id="rId2"/>
+    <p:sldId id="319" r:id="rId2"/>
     <p:sldId id="311" r:id="rId3"/>
     <p:sldId id="312" r:id="rId4"/>
     <p:sldId id="306" r:id="rId5"/>
@@ -17,36 +17,37 @@
     <p:sldId id="307" r:id="rId8"/>
     <p:sldId id="316" r:id="rId9"/>
     <p:sldId id="258" r:id="rId10"/>
-    <p:sldId id="310" r:id="rId11"/>
+    <p:sldId id="317" r:id="rId11"/>
     <p:sldId id="308" r:id="rId12"/>
     <p:sldId id="309" r:id="rId13"/>
+    <p:sldId id="318" r:id="rId14"/>
   </p:sldIdLst>
   <p:sldSz cx="9144000" cy="5143500" type="screen16x9"/>
   <p:notesSz cx="6858000" cy="9144000"/>
   <p:embeddedFontLst>
     <p:embeddedFont>
       <p:font typeface="Frank Ruhl Libre Medium" panose="00000600000000000000" pitchFamily="2" charset="-79"/>
-      <p:regular r:id="rId15"/>
-      <p:bold r:id="rId16"/>
+      <p:regular r:id="rId16"/>
+      <p:bold r:id="rId17"/>
     </p:embeddedFont>
     <p:embeddedFont>
       <p:font typeface="Lato Light" panose="020F0502020204030203" pitchFamily="34" charset="0"/>
-      <p:regular r:id="rId17"/>
-      <p:bold r:id="rId18"/>
-      <p:italic r:id="rId19"/>
-      <p:boldItalic r:id="rId20"/>
+      <p:regular r:id="rId18"/>
+      <p:bold r:id="rId19"/>
+      <p:italic r:id="rId20"/>
+      <p:boldItalic r:id="rId21"/>
     </p:embeddedFont>
     <p:embeddedFont>
       <p:font typeface="Oswald Medium" panose="00000600000000000000" pitchFamily="2" charset="-52"/>
-      <p:regular r:id="rId21"/>
-      <p:bold r:id="rId22"/>
+      <p:regular r:id="rId22"/>
+      <p:bold r:id="rId23"/>
     </p:embeddedFont>
     <p:embeddedFont>
       <p:font typeface="Roboto" panose="02000000000000000000" pitchFamily="2" charset="0"/>
-      <p:regular r:id="rId23"/>
-      <p:bold r:id="rId24"/>
-      <p:italic r:id="rId25"/>
-      <p:boldItalic r:id="rId26"/>
+      <p:regular r:id="rId24"/>
+      <p:bold r:id="rId25"/>
+      <p:italic r:id="rId26"/>
+      <p:boldItalic r:id="rId27"/>
     </p:embeddedFont>
   </p:embeddedFontLst>
   <p:defaultTextStyle>
@@ -824,6 +825,11 @@
         </p:txBody>
       </p:sp>
     </p:spTree>
+    <p:extLst>
+      <p:ext uri="{BB962C8B-B14F-4D97-AF65-F5344CB8AC3E}">
+        <p14:creationId xmlns:p14="http://schemas.microsoft.com/office/powerpoint/2010/main" val="3350317860"/>
+      </p:ext>
+    </p:extLst>
   </p:cSld>
   <p:clrMapOvr>
     <a:masterClrMapping/>
@@ -6961,6 +6967,14 @@
 <file path=ppt/slides/slide1.xml><?xml version="1.0" encoding="utf-8"?>
 <p:sld xmlns:a="http://schemas.openxmlformats.org/drawingml/2006/main" xmlns:r="http://schemas.openxmlformats.org/officeDocument/2006/relationships" xmlns:p="http://schemas.openxmlformats.org/presentationml/2006/main">
   <p:cSld>
+    <p:bg>
+      <p:bgPr>
+        <a:solidFill>
+          <a:srgbClr val="001746"/>
+        </a:solidFill>
+        <a:effectLst/>
+      </p:bgPr>
+    </p:bg>
     <p:spTree>
       <p:nvGrpSpPr>
         <p:cNvPr id="1" name="Shape 171"/>
@@ -6975,64 +6989,6 @@
           <a:chExt cx="0" cy="0"/>
         </a:xfrm>
       </p:grpSpPr>
-      <p:sp>
-        <p:nvSpPr>
-          <p:cNvPr id="172" name="Google Shape;172;p28"/>
-          <p:cNvSpPr txBox="1">
-            <a:spLocks noGrp="1"/>
-          </p:cNvSpPr>
-          <p:nvPr>
-            <p:ph type="ctrTitle"/>
-          </p:nvPr>
-        </p:nvSpPr>
-        <p:spPr>
-          <a:xfrm>
-            <a:off x="924790" y="1697182"/>
-            <a:ext cx="7294419" cy="2052184"/>
-          </a:xfrm>
-          <a:prstGeom prst="rect">
-            <a:avLst/>
-          </a:prstGeom>
-        </p:spPr>
-        <p:txBody>
-          <a:bodyPr spcFirstLastPara="1" wrap="square" lIns="91425" tIns="91425" rIns="91425" bIns="91425" anchor="b" anchorCtr="0">
-            <a:noAutofit/>
-          </a:bodyPr>
-          <a:lstStyle/>
-          <a:p>
-            <a:pPr marL="0" lvl="0" indent="0" algn="ctr" rtl="0">
-              <a:spcBef>
-                <a:spcPts val="0"/>
-              </a:spcBef>
-              <a:spcAft>
-                <a:spcPts val="0"/>
-              </a:spcAft>
-              <a:buNone/>
-            </a:pPr>
-            <a:r>
-              <a:rPr lang="en-US" sz="4000" dirty="0">
-                <a:solidFill>
-                  <a:schemeClr val="accent3"/>
-                </a:solidFill>
-              </a:rPr>
-              <a:t>Redmine - </a:t>
-            </a:r>
-            <a:r>
-              <a:rPr lang="ru-RU" sz="4000" dirty="0">
-                <a:solidFill>
-                  <a:schemeClr val="bg1"/>
-                </a:solidFill>
-              </a:rPr>
-              <a:t>открытое серверное веб-приложение для управления проектами и задачами.</a:t>
-            </a:r>
-            <a:endParaRPr sz="4000" dirty="0">
-              <a:solidFill>
-                <a:schemeClr val="bg1"/>
-              </a:solidFill>
-            </a:endParaRPr>
-          </a:p>
-        </p:txBody>
-      </p:sp>
       <p:pic>
         <p:nvPicPr>
           <p:cNvPr id="3" name="Рисунок 2">
@@ -7047,33 +7003,70 @@
           </p:cNvPicPr>
           <p:nvPr/>
         </p:nvPicPr>
-        <p:blipFill>
+        <p:blipFill rotWithShape="1">
           <a:blip r:embed="rId3"/>
-          <a:stretch>
-            <a:fillRect/>
-          </a:stretch>
+          <a:srcRect l="-1662" r="-2610"/>
+          <a:stretch/>
         </p:blipFill>
         <p:spPr>
           <a:xfrm>
-            <a:off x="2331102" y="619252"/>
-            <a:ext cx="4080013" cy="914324"/>
+            <a:off x="369928" y="1668647"/>
+            <a:ext cx="8404144" cy="1806205"/>
           </a:xfrm>
-          <a:prstGeom prst="rect">
-            <a:avLst/>
+          <a:prstGeom prst="roundRect">
+            <a:avLst>
+              <a:gd name="adj" fmla="val 8594"/>
+            </a:avLst>
           </a:prstGeom>
+          <a:solidFill>
+            <a:srgbClr val="FFFFFF">
+              <a:shade val="85000"/>
+            </a:srgbClr>
+          </a:solidFill>
+          <a:ln>
+            <a:noFill/>
+          </a:ln>
+          <a:effectLst>
+            <a:reflection blurRad="12700" stA="38000" endPos="28000" dist="5000" dir="5400000" sy="-100000" algn="bl" rotWithShape="0"/>
+          </a:effectLst>
         </p:spPr>
       </p:pic>
     </p:spTree>
+    <p:extLst>
+      <p:ext uri="{BB962C8B-B14F-4D97-AF65-F5344CB8AC3E}">
+        <p14:creationId xmlns:p14="http://schemas.microsoft.com/office/powerpoint/2010/main" val="43881566"/>
+      </p:ext>
+    </p:extLst>
   </p:cSld>
   <p:clrMapOvr>
     <a:masterClrMapping/>
   </p:clrMapOvr>
+  <mc:AlternateContent xmlns:mc="http://schemas.openxmlformats.org/markup-compatibility/2006">
+    <mc:Choice xmlns:p14="http://schemas.microsoft.com/office/powerpoint/2010/main" Requires="p14">
+      <p:transition spd="slow" p14:dur="1500">
+        <p:split orient="vert"/>
+      </p:transition>
+    </mc:Choice>
+    <mc:Fallback>
+      <p:transition spd="slow">
+        <p:split orient="vert"/>
+      </p:transition>
+    </mc:Fallback>
+  </mc:AlternateContent>
 </p:sld>
 </file>
 
 <file path=ppt/slides/slide10.xml><?xml version="1.0" encoding="utf-8"?>
 <p:sld xmlns:a="http://schemas.openxmlformats.org/drawingml/2006/main" xmlns:r="http://schemas.openxmlformats.org/officeDocument/2006/relationships" xmlns:p="http://schemas.openxmlformats.org/presentationml/2006/main">
   <p:cSld>
+    <p:bg>
+      <p:bgPr>
+        <a:solidFill>
+          <a:srgbClr val="001746"/>
+        </a:solidFill>
+        <a:effectLst/>
+      </p:bgPr>
+    </p:bg>
     <p:spTree>
       <p:nvGrpSpPr>
         <p:cNvPr id="1" name=""/>
@@ -7088,46 +7081,12 @@
           <a:chExt cx="0" cy="0"/>
         </a:xfrm>
       </p:grpSpPr>
-      <p:sp>
-        <p:nvSpPr>
-          <p:cNvPr id="8" name="Заголовок 7">
+      <p:pic>
+        <p:nvPicPr>
+          <p:cNvPr id="16" name="Рисунок 15">
             <a:extLst>
               <a:ext uri="{FF2B5EF4-FFF2-40B4-BE49-F238E27FC236}">
-                <a16:creationId xmlns:a16="http://schemas.microsoft.com/office/drawing/2014/main" id="{42DAAB94-EC12-43AD-A66F-D72EBC963681}"/>
-              </a:ext>
-            </a:extLst>
-          </p:cNvPr>
-          <p:cNvSpPr>
-            <a:spLocks noGrp="1"/>
-          </p:cNvSpPr>
-          <p:nvPr>
-            <p:ph type="title" idx="6"/>
-          </p:nvPr>
-        </p:nvSpPr>
-        <p:spPr>
-          <a:xfrm>
-            <a:off x="651955" y="75108"/>
-            <a:ext cx="2770118" cy="616500"/>
-          </a:xfrm>
-        </p:spPr>
-        <p:txBody>
-          <a:bodyPr/>
-          <a:lstStyle/>
-          <a:p>
-            <a:r>
-              <a:rPr lang="en-US" dirty="0"/>
-              <a:t>Task flow Redmine</a:t>
-            </a:r>
-            <a:endParaRPr lang="ru-RU" dirty="0"/>
-          </a:p>
-        </p:txBody>
-      </p:sp>
-      <p:pic>
-        <p:nvPicPr>
-          <p:cNvPr id="7" name="Рисунок 6">
-            <a:extLst>
-              <a:ext uri="{FF2B5EF4-FFF2-40B4-BE49-F238E27FC236}">
-                <a16:creationId xmlns:a16="http://schemas.microsoft.com/office/drawing/2014/main" id="{48E2AD83-85A5-449D-98A4-6F7907F45198}"/>
+                <a16:creationId xmlns:a16="http://schemas.microsoft.com/office/drawing/2014/main" id="{2658361C-E6CE-4EDF-9B28-B05BF78D3ADA}"/>
               </a:ext>
             </a:extLst>
           </p:cNvPr>
@@ -7144,8 +7103,8 @@
         </p:blipFill>
         <p:spPr>
           <a:xfrm>
-            <a:off x="471426" y="893318"/>
-            <a:ext cx="7737391" cy="2840482"/>
+            <a:off x="0" y="0"/>
+            <a:ext cx="9143999" cy="5143500"/>
           </a:xfrm>
           <a:prstGeom prst="rect">
             <a:avLst/>
@@ -7155,19 +7114,39 @@
     </p:spTree>
     <p:extLst>
       <p:ext uri="{BB962C8B-B14F-4D97-AF65-F5344CB8AC3E}">
-        <p14:creationId xmlns:p14="http://schemas.microsoft.com/office/powerpoint/2010/main" val="1993024645"/>
+        <p14:creationId xmlns:p14="http://schemas.microsoft.com/office/powerpoint/2010/main" val="2277270073"/>
       </p:ext>
     </p:extLst>
   </p:cSld>
   <p:clrMapOvr>
     <a:masterClrMapping/>
   </p:clrMapOvr>
+  <mc:AlternateContent xmlns:mc="http://schemas.openxmlformats.org/markup-compatibility/2006">
+    <mc:Choice xmlns:p14="http://schemas.microsoft.com/office/powerpoint/2010/main" Requires="p14">
+      <p:transition spd="slow" p14:dur="1500">
+        <p:split orient="vert"/>
+      </p:transition>
+    </mc:Choice>
+    <mc:Fallback>
+      <p:transition spd="slow">
+        <p:split orient="vert"/>
+      </p:transition>
+    </mc:Fallback>
+  </mc:AlternateContent>
 </p:sld>
 </file>
 
 <file path=ppt/slides/slide11.xml><?xml version="1.0" encoding="utf-8"?>
 <p:sld xmlns:a="http://schemas.openxmlformats.org/drawingml/2006/main" xmlns:r="http://schemas.openxmlformats.org/officeDocument/2006/relationships" xmlns:p="http://schemas.openxmlformats.org/presentationml/2006/main">
   <p:cSld>
+    <p:bg>
+      <p:bgPr>
+        <a:solidFill>
+          <a:srgbClr val="001746"/>
+        </a:solidFill>
+        <a:effectLst/>
+      </p:bgPr>
+    </p:bg>
     <p:spTree>
       <p:nvGrpSpPr>
         <p:cNvPr id="1" name=""/>
@@ -7195,13 +7174,13 @@
             <a:spLocks noGrp="1"/>
           </p:cNvSpPr>
           <p:nvPr>
-            <p:ph type="title" idx="6"/>
+            <p:ph type="title" idx="4294967295"/>
           </p:nvPr>
         </p:nvSpPr>
         <p:spPr>
           <a:xfrm>
-            <a:off x="714301" y="-60181"/>
-            <a:ext cx="1938845" cy="616500"/>
+            <a:off x="416273" y="0"/>
+            <a:ext cx="1909141" cy="615950"/>
           </a:xfrm>
         </p:spPr>
         <p:txBody>
@@ -7209,14 +7188,26 @@
           <a:lstStyle/>
           <a:p>
             <a:r>
-              <a:rPr lang="ru-RU" dirty="0"/>
+              <a:rPr lang="ru-RU" b="1" u="sng" dirty="0">
+                <a:solidFill>
+                  <a:srgbClr val="FF0000"/>
+                </a:solidFill>
+              </a:rPr>
               <a:t>Работа с </a:t>
             </a:r>
             <a:r>
-              <a:rPr lang="en-US" dirty="0"/>
+              <a:rPr lang="en-US" b="1" u="sng" dirty="0">
+                <a:solidFill>
+                  <a:srgbClr val="FF0000"/>
+                </a:solidFill>
+              </a:rPr>
               <a:t>Git</a:t>
             </a:r>
-            <a:endParaRPr lang="ru-RU" dirty="0"/>
+            <a:endParaRPr lang="ru-RU" b="1" u="sng" dirty="0">
+              <a:solidFill>
+                <a:srgbClr val="FF0000"/>
+              </a:solidFill>
+            </a:endParaRPr>
           </a:p>
         </p:txBody>
       </p:sp>
@@ -7233,13 +7224,13 @@
             <a:spLocks noGrp="1"/>
           </p:cNvSpPr>
           <p:nvPr>
-            <p:ph type="title" idx="14"/>
+            <p:ph type="title" idx="4294967295"/>
           </p:nvPr>
         </p:nvSpPr>
         <p:spPr>
           <a:xfrm>
-            <a:off x="714301" y="498763"/>
-            <a:ext cx="7312962" cy="4443845"/>
+            <a:off x="416274" y="472966"/>
+            <a:ext cx="7113722" cy="4468922"/>
           </a:xfrm>
         </p:spPr>
         <p:txBody>
@@ -7248,228 +7239,596 @@
           <a:p>
             <a:pPr algn="l"/>
             <a:r>
-              <a:rPr lang="ru-RU" sz="1900" dirty="0"/>
+              <a:rPr lang="ru-RU" sz="1900" dirty="0">
+                <a:solidFill>
+                  <a:schemeClr val="bg1"/>
+                </a:solidFill>
+              </a:rPr>
               <a:t>Основные команды :</a:t>
             </a:r>
             <a:br>
-              <a:rPr lang="en-US" sz="1900" dirty="0"/>
+              <a:rPr lang="en-US" sz="1900" dirty="0">
+                <a:solidFill>
+                  <a:schemeClr val="bg1"/>
+                </a:solidFill>
+              </a:rPr>
             </a:br>
             <a:r>
-              <a:rPr lang="en-US" sz="1800" dirty="0"/>
+              <a:rPr lang="en-US" sz="1800" dirty="0">
+                <a:solidFill>
+                  <a:schemeClr val="bg1"/>
+                </a:solidFill>
+              </a:rPr>
               <a:t>1. git </a:t>
             </a:r>
             <a:r>
-              <a:rPr lang="en-US" sz="1800" dirty="0" err="1"/>
+              <a:rPr lang="en-US" sz="1800" dirty="0" err="1">
+                <a:solidFill>
+                  <a:schemeClr val="bg1"/>
+                </a:solidFill>
+              </a:rPr>
               <a:t>init</a:t>
             </a:r>
             <a:r>
-              <a:rPr lang="en-US" sz="1800" dirty="0"/>
+              <a:rPr lang="en-US" sz="1800" dirty="0">
+                <a:solidFill>
+                  <a:schemeClr val="bg1"/>
+                </a:solidFill>
+              </a:rPr>
               <a:t> – </a:t>
             </a:r>
             <a:r>
-              <a:rPr lang="ru-RU" sz="1800" dirty="0"/>
+              <a:rPr lang="ru-RU" sz="1800" dirty="0">
+                <a:solidFill>
+                  <a:schemeClr val="bg1"/>
+                </a:solidFill>
+              </a:rPr>
               <a:t>инициализация </a:t>
             </a:r>
             <a:r>
-              <a:rPr lang="en-US" sz="1800" dirty="0"/>
+              <a:rPr lang="en-US" sz="1800" dirty="0">
+                <a:solidFill>
+                  <a:schemeClr val="bg1"/>
+                </a:solidFill>
+              </a:rPr>
               <a:t>Git</a:t>
             </a:r>
             <a:r>
-              <a:rPr lang="ru-RU" sz="1800" dirty="0"/>
+              <a:rPr lang="ru-RU" sz="1800" dirty="0">
+                <a:solidFill>
+                  <a:schemeClr val="bg1"/>
+                </a:solidFill>
+              </a:rPr>
               <a:t>-репозитория</a:t>
             </a:r>
             <a:br>
-              <a:rPr lang="ru-RU" sz="1800" dirty="0"/>
+              <a:rPr lang="ru-RU" sz="1800" dirty="0">
+                <a:solidFill>
+                  <a:schemeClr val="bg1"/>
+                </a:solidFill>
+              </a:rPr>
             </a:br>
             <a:r>
-              <a:rPr lang="en-US" sz="1800" dirty="0"/>
+              <a:rPr lang="en-US" sz="1800" dirty="0">
+                <a:solidFill>
+                  <a:schemeClr val="bg1"/>
+                </a:solidFill>
+              </a:rPr>
               <a:t>2</a:t>
             </a:r>
             <a:r>
-              <a:rPr lang="ru-RU" sz="1800" dirty="0"/>
+              <a:rPr lang="ru-RU" sz="1800" dirty="0">
+                <a:solidFill>
+                  <a:schemeClr val="bg1"/>
+                </a:solidFill>
+              </a:rPr>
               <a:t>. </a:t>
             </a:r>
             <a:r>
-              <a:rPr lang="en-US" sz="1800" dirty="0"/>
+              <a:rPr lang="en-US" sz="1800" dirty="0">
+                <a:solidFill>
+                  <a:schemeClr val="bg1"/>
+                </a:solidFill>
+              </a:rPr>
               <a:t>git add . – </a:t>
             </a:r>
             <a:r>
-              <a:rPr lang="ru-RU" sz="1800" dirty="0"/>
+              <a:rPr lang="ru-RU" sz="1800" dirty="0">
+                <a:solidFill>
+                  <a:schemeClr val="bg1"/>
+                </a:solidFill>
+              </a:rPr>
               <a:t>сборка слепка следующего коммита</a:t>
             </a:r>
             <a:br>
-              <a:rPr lang="en-US" sz="1800" dirty="0"/>
+              <a:rPr lang="en-US" sz="1800" dirty="0">
+                <a:solidFill>
+                  <a:schemeClr val="bg1"/>
+                </a:solidFill>
+              </a:rPr>
             </a:br>
             <a:r>
-              <a:rPr lang="en-US" sz="1800" dirty="0"/>
+              <a:rPr lang="en-US" sz="1800" dirty="0">
+                <a:solidFill>
+                  <a:schemeClr val="bg1"/>
+                </a:solidFill>
+              </a:rPr>
               <a:t>3. git commit - </a:t>
             </a:r>
             <a:r>
-              <a:rPr lang="ru-RU" sz="1800" dirty="0"/>
+              <a:rPr lang="ru-RU" sz="1800" dirty="0">
+                <a:solidFill>
+                  <a:schemeClr val="bg1"/>
+                </a:solidFill>
+              </a:rPr>
               <a:t>сохраняет слепок во внутренней базе данных</a:t>
             </a:r>
             <a:br>
-              <a:rPr lang="ru-RU" sz="1800" dirty="0"/>
+              <a:rPr lang="ru-RU" sz="1800" dirty="0">
+                <a:solidFill>
+                  <a:schemeClr val="bg1"/>
+                </a:solidFill>
+              </a:rPr>
             </a:br>
             <a:r>
-              <a:rPr lang="en-US" sz="1800" dirty="0"/>
+              <a:rPr lang="en-US" sz="1800" dirty="0">
+                <a:solidFill>
+                  <a:schemeClr val="bg1"/>
+                </a:solidFill>
+              </a:rPr>
               <a:t>4. git status – </a:t>
             </a:r>
             <a:r>
-              <a:rPr lang="ru-RU" sz="1800" dirty="0"/>
+              <a:rPr lang="ru-RU" sz="1800" dirty="0">
+                <a:solidFill>
+                  <a:schemeClr val="bg1"/>
+                </a:solidFill>
+              </a:rPr>
               <a:t>показывает статус рабочего каталога (дерева)</a:t>
             </a:r>
             <a:br>
-              <a:rPr lang="en-US" sz="1800" dirty="0"/>
+              <a:rPr lang="en-US" sz="1800" dirty="0">
+                <a:solidFill>
+                  <a:schemeClr val="bg1"/>
+                </a:solidFill>
+              </a:rPr>
             </a:br>
             <a:r>
-              <a:rPr lang="ru-RU" sz="1800" dirty="0"/>
+              <a:rPr lang="ru-RU" sz="1800" dirty="0">
+                <a:solidFill>
+                  <a:schemeClr val="bg1"/>
+                </a:solidFill>
+              </a:rPr>
               <a:t>5</a:t>
             </a:r>
             <a:r>
-              <a:rPr lang="en-US" sz="1800" dirty="0"/>
+              <a:rPr lang="en-US" sz="1800" dirty="0">
+                <a:solidFill>
+                  <a:schemeClr val="bg1"/>
+                </a:solidFill>
+              </a:rPr>
               <a:t>. git push</a:t>
             </a:r>
             <a:r>
-              <a:rPr lang="ru-RU" sz="1800" dirty="0"/>
+              <a:rPr lang="ru-RU" sz="1800" dirty="0">
+                <a:solidFill>
+                  <a:schemeClr val="bg1"/>
+                </a:solidFill>
+              </a:rPr>
               <a:t> – получение и интеграция с другим репозиторием или локальным</a:t>
             </a:r>
             <a:br>
-              <a:rPr lang="en-US" sz="1800" dirty="0"/>
+              <a:rPr lang="en-US" sz="1800" dirty="0">
+                <a:solidFill>
+                  <a:schemeClr val="bg1"/>
+                </a:solidFill>
+              </a:rPr>
             </a:br>
             <a:r>
-              <a:rPr lang="ru-RU" sz="1800" dirty="0"/>
+              <a:rPr lang="ru-RU" sz="1800" dirty="0">
+                <a:solidFill>
+                  <a:schemeClr val="bg1"/>
+                </a:solidFill>
+              </a:rPr>
               <a:t>6</a:t>
             </a:r>
             <a:r>
-              <a:rPr lang="en-US" sz="1800" dirty="0"/>
+              <a:rPr lang="en-US" sz="1800" dirty="0">
+                <a:solidFill>
+                  <a:schemeClr val="bg1"/>
+                </a:solidFill>
+              </a:rPr>
               <a:t>. git pull - </a:t>
             </a:r>
             <a:r>
-              <a:rPr lang="ru-RU" sz="1800" dirty="0"/>
+              <a:rPr lang="ru-RU" sz="1800" dirty="0">
+                <a:solidFill>
+                  <a:schemeClr val="bg1"/>
+                </a:solidFill>
+              </a:rPr>
               <a:t> обновите удаленные ссылки вместе со связанными объектами</a:t>
             </a:r>
             <a:br>
-              <a:rPr lang="en-US" sz="1800" dirty="0"/>
+              <a:rPr lang="en-US" sz="1800" dirty="0">
+                <a:solidFill>
+                  <a:schemeClr val="bg1"/>
+                </a:solidFill>
+              </a:rPr>
             </a:br>
             <a:r>
-              <a:rPr lang="ru-RU" sz="1800" dirty="0"/>
+              <a:rPr lang="ru-RU" sz="1800" dirty="0">
+                <a:solidFill>
+                  <a:schemeClr val="bg1"/>
+                </a:solidFill>
+              </a:rPr>
               <a:t>7</a:t>
             </a:r>
             <a:r>
-              <a:rPr lang="en-US" sz="1800" dirty="0"/>
+              <a:rPr lang="en-US" sz="1800" dirty="0">
+                <a:solidFill>
+                  <a:schemeClr val="bg1"/>
+                </a:solidFill>
+              </a:rPr>
               <a:t>. git branch “</a:t>
             </a:r>
             <a:r>
-              <a:rPr lang="en-US" sz="1800" dirty="0" err="1"/>
+              <a:rPr lang="en-US" sz="1800" dirty="0" err="1">
+                <a:solidFill>
+                  <a:schemeClr val="bg1"/>
+                </a:solidFill>
+              </a:rPr>
               <a:t>NameBranch</a:t>
             </a:r>
             <a:r>
-              <a:rPr lang="en-US" sz="1800" dirty="0"/>
+              <a:rPr lang="en-US" sz="1800" dirty="0">
+                <a:solidFill>
+                  <a:schemeClr val="bg1"/>
+                </a:solidFill>
+              </a:rPr>
               <a:t>”- </a:t>
             </a:r>
             <a:r>
-              <a:rPr lang="ru-RU" sz="1800" dirty="0"/>
+              <a:rPr lang="ru-RU" sz="1800" dirty="0">
+                <a:solidFill>
+                  <a:schemeClr val="bg1"/>
+                </a:solidFill>
+              </a:rPr>
               <a:t>создание новой ветки</a:t>
             </a:r>
             <a:br>
-              <a:rPr lang="en-US" sz="1800" dirty="0"/>
+              <a:rPr lang="en-US" sz="1800" dirty="0">
+                <a:solidFill>
+                  <a:schemeClr val="bg1"/>
+                </a:solidFill>
+              </a:rPr>
             </a:br>
             <a:r>
-              <a:rPr lang="en-US" sz="1800" dirty="0"/>
+              <a:rPr lang="en-US" sz="1800" dirty="0">
+                <a:solidFill>
+                  <a:schemeClr val="bg1"/>
+                </a:solidFill>
+              </a:rPr>
               <a:t>8. git branch – </a:t>
             </a:r>
             <a:r>
-              <a:rPr lang="ru-RU" sz="1800" dirty="0"/>
+              <a:rPr lang="ru-RU" sz="1800" dirty="0">
+                <a:solidFill>
+                  <a:schemeClr val="bg1"/>
+                </a:solidFill>
+              </a:rPr>
               <a:t>просмотр веток и в какой находишься </a:t>
             </a:r>
             <a:br>
-              <a:rPr lang="en-US" sz="1800" dirty="0"/>
+              <a:rPr lang="en-US" sz="1800" dirty="0">
+                <a:solidFill>
+                  <a:schemeClr val="bg1"/>
+                </a:solidFill>
+              </a:rPr>
             </a:br>
             <a:r>
-              <a:rPr lang="ru-RU" sz="1800" dirty="0"/>
+              <a:rPr lang="ru-RU" sz="1800" dirty="0">
+                <a:solidFill>
+                  <a:schemeClr val="bg1"/>
+                </a:solidFill>
+              </a:rPr>
               <a:t>8</a:t>
             </a:r>
             <a:r>
-              <a:rPr lang="en-US" sz="1800" dirty="0"/>
+              <a:rPr lang="en-US" sz="1800" dirty="0">
+                <a:solidFill>
+                  <a:schemeClr val="bg1"/>
+                </a:solidFill>
+              </a:rPr>
               <a:t>. git checkout “</a:t>
             </a:r>
             <a:r>
-              <a:rPr lang="en-US" sz="1800" dirty="0" err="1"/>
+              <a:rPr lang="en-US" sz="1800" dirty="0" err="1">
+                <a:solidFill>
+                  <a:schemeClr val="bg1"/>
+                </a:solidFill>
+              </a:rPr>
               <a:t>NameBranch</a:t>
             </a:r>
             <a:r>
-              <a:rPr lang="en-US" sz="1800" dirty="0"/>
+              <a:rPr lang="en-US" sz="1800" dirty="0">
+                <a:solidFill>
+                  <a:schemeClr val="bg1"/>
+                </a:solidFill>
+              </a:rPr>
               <a:t>”-</a:t>
             </a:r>
             <a:r>
-              <a:rPr lang="ru-RU" sz="1800" dirty="0"/>
+              <a:rPr lang="ru-RU" sz="1800" dirty="0">
+                <a:solidFill>
+                  <a:schemeClr val="bg1"/>
+                </a:solidFill>
+              </a:rPr>
               <a:t> переключение между ветками </a:t>
             </a:r>
             <a:br>
-              <a:rPr lang="en-US" sz="1800" dirty="0"/>
+              <a:rPr lang="en-US" sz="1800" dirty="0">
+                <a:solidFill>
+                  <a:schemeClr val="bg1"/>
+                </a:solidFill>
+              </a:rPr>
             </a:br>
             <a:r>
-              <a:rPr lang="ru-RU" sz="1800" dirty="0"/>
+              <a:rPr lang="ru-RU" sz="1800" dirty="0">
+                <a:solidFill>
+                  <a:schemeClr val="bg1"/>
+                </a:solidFill>
+              </a:rPr>
               <a:t>9</a:t>
             </a:r>
             <a:r>
-              <a:rPr lang="en-US" sz="1800" dirty="0"/>
+              <a:rPr lang="en-US" sz="1800" dirty="0">
+                <a:solidFill>
+                  <a:schemeClr val="bg1"/>
+                </a:solidFill>
+              </a:rPr>
               <a:t>.</a:t>
             </a:r>
             <a:r>
-              <a:rPr lang="ru-RU" sz="1800" dirty="0"/>
+              <a:rPr lang="ru-RU" sz="1800" dirty="0">
+                <a:solidFill>
+                  <a:schemeClr val="bg1"/>
+                </a:solidFill>
+              </a:rPr>
               <a:t> </a:t>
             </a:r>
             <a:r>
-              <a:rPr lang="en-US" sz="1800" dirty="0"/>
+              <a:rPr lang="en-US" sz="1800" dirty="0">
+                <a:solidFill>
+                  <a:schemeClr val="bg1"/>
+                </a:solidFill>
+              </a:rPr>
               <a:t>git clone </a:t>
             </a:r>
             <a:r>
               <a:rPr lang="en-US" sz="1800" dirty="0">
-                <a:hlinkClick r:id="rId2"/>
+                <a:solidFill>
+                  <a:schemeClr val="bg1"/>
+                </a:solidFill>
+                <a:hlinkClick r:id="rId2">
+                  <a:extLst>
+                    <a:ext uri="{A12FA001-AC4F-418D-AE19-62706E023703}">
+                      <ahyp:hlinkClr xmlns:ahyp="http://schemas.microsoft.com/office/drawing/2018/hyperlinkcolor" val="tx"/>
+                    </a:ext>
+                  </a:extLst>
+                </a:hlinkClick>
               </a:rPr>
               <a:t>https://github.com/testrepo/dev.git</a:t>
             </a:r>
             <a:r>
-              <a:rPr lang="en-US" sz="1800" dirty="0"/>
+              <a:rPr lang="en-US" sz="1800" dirty="0">
+                <a:solidFill>
+                  <a:schemeClr val="bg1"/>
+                </a:solidFill>
+              </a:rPr>
               <a:t> - </a:t>
             </a:r>
             <a:r>
-              <a:rPr lang="ru-RU" sz="1800" dirty="0"/>
+              <a:rPr lang="ru-RU" sz="1800" dirty="0">
+                <a:solidFill>
+                  <a:schemeClr val="bg1"/>
+                </a:solidFill>
+              </a:rPr>
               <a:t>клонирование всей ветки </a:t>
             </a:r>
             <a:br>
-              <a:rPr lang="ru-RU" sz="1800" dirty="0"/>
+              <a:rPr lang="ru-RU" sz="1800" dirty="0">
+                <a:solidFill>
+                  <a:schemeClr val="bg1"/>
+                </a:solidFill>
+              </a:rPr>
             </a:br>
             <a:r>
-              <a:rPr lang="ru-RU" sz="1800" dirty="0"/>
+              <a:rPr lang="ru-RU" sz="1800" dirty="0">
+                <a:solidFill>
+                  <a:schemeClr val="bg1"/>
+                </a:solidFill>
+              </a:rPr>
               <a:t>10. </a:t>
             </a:r>
             <a:r>
-              <a:rPr lang="en-US" sz="1800" dirty="0"/>
+              <a:rPr lang="en-US" sz="1800" dirty="0">
+                <a:solidFill>
+                  <a:schemeClr val="bg1"/>
+                </a:solidFill>
+              </a:rPr>
               <a:t>git reset – </a:t>
             </a:r>
             <a:r>
-              <a:rPr lang="ru-RU" sz="1800" dirty="0"/>
+              <a:rPr lang="ru-RU" sz="1800" dirty="0">
+                <a:solidFill>
+                  <a:schemeClr val="bg1"/>
+                </a:solidFill>
+              </a:rPr>
               <a:t>отменяет изменения, лучше использовать для локальных  изменений</a:t>
             </a:r>
             <a:br>
-              <a:rPr lang="ru-RU" sz="1800" dirty="0"/>
+              <a:rPr lang="ru-RU" sz="1800" dirty="0">
+                <a:solidFill>
+                  <a:schemeClr val="bg1"/>
+                </a:solidFill>
+              </a:rPr>
             </a:br>
             <a:r>
-              <a:rPr lang="ru-RU" sz="1800" dirty="0"/>
+              <a:rPr lang="ru-RU" sz="1800" dirty="0">
+                <a:solidFill>
+                  <a:schemeClr val="bg1"/>
+                </a:solidFill>
+              </a:rPr>
               <a:t>11. </a:t>
             </a:r>
             <a:r>
-              <a:rPr lang="en-US" sz="1800" dirty="0"/>
+              <a:rPr lang="en-US" sz="1800" dirty="0">
+                <a:solidFill>
+                  <a:schemeClr val="bg1"/>
+                </a:solidFill>
+              </a:rPr>
               <a:t>git revert --hard “028fd209ed” - </a:t>
             </a:r>
             <a:r>
-              <a:rPr lang="ru-RU" sz="1800" dirty="0"/>
+              <a:rPr lang="ru-RU" sz="1800" dirty="0">
+                <a:solidFill>
+                  <a:schemeClr val="bg1"/>
+                </a:solidFill>
+              </a:rPr>
               <a:t>отменяет изменения, лучше использовать для публичных изменений </a:t>
             </a:r>
-            <a:endParaRPr lang="ru-RU" sz="1900" dirty="0"/>
+            <a:endParaRPr lang="ru-RU" sz="1900" dirty="0">
+              <a:solidFill>
+                <a:schemeClr val="bg1"/>
+              </a:solidFill>
+            </a:endParaRPr>
+          </a:p>
+        </p:txBody>
+      </p:sp>
+      <p:pic>
+        <p:nvPicPr>
+          <p:cNvPr id="2050" name="Picture 2" descr="Введение в Git: от установки до основных команд">
+            <a:extLst>
+              <a:ext uri="{FF2B5EF4-FFF2-40B4-BE49-F238E27FC236}">
+                <a16:creationId xmlns:a16="http://schemas.microsoft.com/office/drawing/2014/main" id="{19501F41-1EC4-4307-AF4D-0DBDBDC0DCDE}"/>
+              </a:ext>
+            </a:extLst>
+          </p:cNvPr>
+          <p:cNvPicPr>
+            <a:picLocks noChangeAspect="1" noChangeArrowheads="1"/>
+          </p:cNvPicPr>
+          <p:nvPr/>
+        </p:nvPicPr>
+        <p:blipFill>
+          <a:blip r:embed="rId3">
+            <a:extLst>
+              <a:ext uri="{28A0092B-C50C-407E-A947-70E740481C1C}">
+                <a14:useLocalDpi xmlns:a14="http://schemas.microsoft.com/office/drawing/2010/main" val="0"/>
+              </a:ext>
+            </a:extLst>
+          </a:blip>
+          <a:srcRect/>
+          <a:stretch>
+            <a:fillRect/>
+          </a:stretch>
+        </p:blipFill>
+        <p:spPr bwMode="auto">
+          <a:xfrm>
+            <a:off x="6822939" y="855881"/>
+            <a:ext cx="1414113" cy="1414113"/>
+          </a:xfrm>
+          <a:prstGeom prst="roundRect">
+            <a:avLst>
+              <a:gd name="adj" fmla="val 8594"/>
+            </a:avLst>
+          </a:prstGeom>
+          <a:solidFill>
+            <a:srgbClr val="FFFFFF">
+              <a:shade val="85000"/>
+            </a:srgbClr>
+          </a:solidFill>
+          <a:ln>
+            <a:noFill/>
+          </a:ln>
+          <a:effectLst>
+            <a:reflection blurRad="12700" stA="38000" endPos="28000" dist="5000" dir="5400000" sy="-100000" algn="bl" rotWithShape="0"/>
+          </a:effectLst>
+          <a:extLst>
+            <a:ext uri="{909E8E84-426E-40DD-AFC4-6F175D3DCCD1}">
+              <a14:hiddenFill xmlns:a14="http://schemas.microsoft.com/office/drawing/2010/main">
+                <a:solidFill>
+                  <a:srgbClr val="FFFFFF"/>
+                </a:solidFill>
+              </a14:hiddenFill>
+            </a:ext>
+          </a:extLst>
+        </p:spPr>
+      </p:pic>
+      <p:sp>
+        <p:nvSpPr>
+          <p:cNvPr id="2" name="TextBox 1">
+            <a:extLst>
+              <a:ext uri="{FF2B5EF4-FFF2-40B4-BE49-F238E27FC236}">
+                <a16:creationId xmlns:a16="http://schemas.microsoft.com/office/drawing/2014/main" id="{A64F6EF4-79AA-46E9-AE4A-2A022870A434}"/>
+              </a:ext>
+            </a:extLst>
+          </p:cNvPr>
+          <p:cNvSpPr txBox="1"/>
+          <p:nvPr/>
+        </p:nvSpPr>
+        <p:spPr>
+          <a:xfrm>
+            <a:off x="6273162" y="117217"/>
+            <a:ext cx="2821606" cy="738664"/>
+          </a:xfrm>
+          <a:prstGeom prst="rect">
+            <a:avLst/>
+          </a:prstGeom>
+          <a:noFill/>
+        </p:spPr>
+        <p:txBody>
+          <a:bodyPr wrap="none" rtlCol="0">
+            <a:spAutoFit/>
+          </a:bodyPr>
+          <a:lstStyle/>
+          <a:p>
+            <a:r>
+              <a:rPr lang="ru-RU" dirty="0">
+                <a:solidFill>
+                  <a:schemeClr val="bg1"/>
+                </a:solidFill>
+              </a:rPr>
+              <a:t>Ссылка для скачивания:</a:t>
+            </a:r>
+          </a:p>
+          <a:p>
+            <a:r>
+              <a:rPr lang="en-US" dirty="0">
+                <a:solidFill>
+                  <a:schemeClr val="bg1"/>
+                </a:solidFill>
+                <a:hlinkClick r:id="rId4">
+                  <a:extLst>
+                    <a:ext uri="{A12FA001-AC4F-418D-AE19-62706E023703}">
+                      <ahyp:hlinkClr xmlns:ahyp="http://schemas.microsoft.com/office/drawing/2018/hyperlinkcolor" val="tx"/>
+                    </a:ext>
+                  </a:extLst>
+                </a:hlinkClick>
+              </a:rPr>
+              <a:t>https://git-scm.com/download/win</a:t>
+            </a:r>
+            <a:endParaRPr lang="ru-RU" dirty="0">
+              <a:solidFill>
+                <a:schemeClr val="bg1"/>
+              </a:solidFill>
+            </a:endParaRPr>
+          </a:p>
+          <a:p>
+            <a:endParaRPr lang="ru-RU" dirty="0">
+              <a:solidFill>
+                <a:schemeClr val="bg1"/>
+              </a:solidFill>
+            </a:endParaRPr>
           </a:p>
         </p:txBody>
       </p:sp>
@@ -7483,12 +7842,32 @@
   <p:clrMapOvr>
     <a:masterClrMapping/>
   </p:clrMapOvr>
+  <mc:AlternateContent xmlns:mc="http://schemas.openxmlformats.org/markup-compatibility/2006">
+    <mc:Choice xmlns:p14="http://schemas.microsoft.com/office/powerpoint/2010/main" Requires="p14">
+      <p:transition spd="slow" p14:dur="1500">
+        <p:split orient="vert"/>
+      </p:transition>
+    </mc:Choice>
+    <mc:Fallback>
+      <p:transition spd="slow">
+        <p:split orient="vert"/>
+      </p:transition>
+    </mc:Fallback>
+  </mc:AlternateContent>
 </p:sld>
 </file>
 
 <file path=ppt/slides/slide12.xml><?xml version="1.0" encoding="utf-8"?>
 <p:sld xmlns:a="http://schemas.openxmlformats.org/drawingml/2006/main" xmlns:r="http://schemas.openxmlformats.org/officeDocument/2006/relationships" xmlns:p="http://schemas.openxmlformats.org/presentationml/2006/main">
   <p:cSld>
+    <p:bg>
+      <p:bgPr>
+        <a:solidFill>
+          <a:srgbClr val="001746"/>
+        </a:solidFill>
+        <a:effectLst/>
+      </p:bgPr>
+    </p:bg>
     <p:spTree>
       <p:nvGrpSpPr>
         <p:cNvPr id="1" name=""/>
@@ -7516,36 +7895,87 @@
             <a:spLocks noGrp="1"/>
           </p:cNvSpPr>
           <p:nvPr>
-            <p:ph type="title" idx="6"/>
+            <p:ph type="title" idx="4294967295"/>
           </p:nvPr>
         </p:nvSpPr>
         <p:spPr>
           <a:xfrm>
-            <a:off x="714300" y="436419"/>
-            <a:ext cx="7715100" cy="1052946"/>
+            <a:off x="449317" y="622739"/>
+            <a:ext cx="8245364" cy="1150882"/>
           </a:xfrm>
         </p:spPr>
         <p:txBody>
           <a:bodyPr/>
           <a:lstStyle/>
           <a:p>
-            <a:r>
-              <a:rPr lang="en-US" dirty="0" err="1"/>
-              <a:t>TortoiseGit</a:t>
-            </a:r>
-            <a:r>
-              <a:rPr lang="en-US" dirty="0"/>
-              <a:t> – </a:t>
-            </a:r>
-            <a:r>
-              <a:rPr lang="ru-RU" dirty="0"/>
+            <a:pPr algn="ctr"/>
+            <a:r>
+              <a:rPr lang="ru-RU" sz="2400" dirty="0">
+                <a:solidFill>
+                  <a:schemeClr val="bg1"/>
+                </a:solidFill>
+              </a:rPr>
+              <a:t>Это</a:t>
+            </a:r>
+            <a:r>
+              <a:rPr lang="en-US" sz="2400" dirty="0">
+                <a:solidFill>
+                  <a:schemeClr val="bg1"/>
+                </a:solidFill>
+              </a:rPr>
+              <a:t> </a:t>
+            </a:r>
+            <a:r>
+              <a:rPr lang="ru-RU" sz="2400" dirty="0">
+                <a:solidFill>
+                  <a:schemeClr val="bg1"/>
+                </a:solidFill>
+              </a:rPr>
               <a:t>визуальный клиент системы управления исходными кодами программы </a:t>
             </a:r>
             <a:r>
-              <a:rPr lang="en-US" dirty="0"/>
-              <a:t>GIT</a:t>
-            </a:r>
-            <a:endParaRPr lang="ru-RU" dirty="0"/>
+              <a:rPr lang="en-US" sz="2400" dirty="0">
+                <a:solidFill>
+                  <a:schemeClr val="bg1"/>
+                </a:solidFill>
+              </a:rPr>
+              <a:t>Git</a:t>
+            </a:r>
+            <a:r>
+              <a:rPr lang="ru-RU" sz="2400" dirty="0">
+                <a:solidFill>
+                  <a:schemeClr val="bg1"/>
+                </a:solidFill>
+              </a:rPr>
+              <a:t>, скачать который можно по ссылке:  </a:t>
+            </a:r>
+            <a:r>
+              <a:rPr lang="en-US" sz="1600" dirty="0">
+                <a:solidFill>
+                  <a:schemeClr val="bg1"/>
+                </a:solidFill>
+                <a:hlinkClick r:id="rId2">
+                  <a:extLst>
+                    <a:ext uri="{A12FA001-AC4F-418D-AE19-62706E023703}">
+                      <ahyp:hlinkClr xmlns:ahyp="http://schemas.microsoft.com/office/drawing/2018/hyperlinkcolor" val="tx"/>
+                    </a:ext>
+                  </a:extLst>
+                </a:hlinkClick>
+              </a:rPr>
+              <a:t>https://tortoisegit.org/download/</a:t>
+            </a:r>
+            <a:br>
+              <a:rPr lang="ru-RU" sz="1200" dirty="0">
+                <a:solidFill>
+                  <a:schemeClr val="bg1"/>
+                </a:solidFill>
+              </a:rPr>
+            </a:br>
+            <a:endParaRPr lang="ru-RU" sz="2400" dirty="0">
+              <a:solidFill>
+                <a:schemeClr val="bg1"/>
+              </a:solidFill>
+            </a:endParaRPr>
           </a:p>
         </p:txBody>
       </p:sp>
@@ -7564,21 +7994,96 @@
           <p:nvPr/>
         </p:nvPicPr>
         <p:blipFill>
-          <a:blip r:embed="rId2"/>
+          <a:blip r:embed="rId3"/>
           <a:stretch>
             <a:fillRect/>
           </a:stretch>
         </p:blipFill>
         <p:spPr>
           <a:xfrm>
-            <a:off x="2559477" y="1771649"/>
-            <a:ext cx="4024745" cy="2218459"/>
+            <a:off x="2100020" y="1977402"/>
+            <a:ext cx="4943959" cy="2725134"/>
+          </a:xfrm>
+          <a:prstGeom prst="roundRect">
+            <a:avLst>
+              <a:gd name="adj" fmla="val 8594"/>
+            </a:avLst>
+          </a:prstGeom>
+          <a:solidFill>
+            <a:srgbClr val="FFFFFF">
+              <a:shade val="85000"/>
+            </a:srgbClr>
+          </a:solidFill>
+          <a:ln>
+            <a:noFill/>
+          </a:ln>
+          <a:effectLst>
+            <a:reflection blurRad="12700" stA="38000" endPos="28000" dist="5000" dir="5400000" sy="-100000" algn="bl" rotWithShape="0"/>
+          </a:effectLst>
+        </p:spPr>
+      </p:pic>
+      <p:sp>
+        <p:nvSpPr>
+          <p:cNvPr id="5" name="TextBox 4">
+            <a:extLst>
+              <a:ext uri="{FF2B5EF4-FFF2-40B4-BE49-F238E27FC236}">
+                <a16:creationId xmlns:a16="http://schemas.microsoft.com/office/drawing/2014/main" id="{850A8532-BD57-4577-9FAD-076F4DE22E44}"/>
+              </a:ext>
+            </a:extLst>
+          </p:cNvPr>
+          <p:cNvSpPr txBox="1"/>
+          <p:nvPr/>
+        </p:nvSpPr>
+        <p:spPr>
+          <a:xfrm>
+            <a:off x="3797285" y="99518"/>
+            <a:ext cx="1789386" cy="523220"/>
           </a:xfrm>
           <a:prstGeom prst="rect">
             <a:avLst/>
           </a:prstGeom>
+          <a:noFill/>
         </p:spPr>
-      </p:pic>
+        <p:txBody>
+          <a:bodyPr wrap="square">
+            <a:spAutoFit/>
+          </a:bodyPr>
+          <a:lstStyle/>
+          <a:p>
+            <a:pPr algn="ctr"/>
+            <a:r>
+              <a:rPr lang="en-US" sz="2800" b="1" u="sng" dirty="0" err="1">
+                <a:solidFill>
+                  <a:srgbClr val="FF0000"/>
+                </a:solidFill>
+                <a:latin typeface="Oswald Medium" panose="00000600000000000000" pitchFamily="2" charset="-52"/>
+              </a:rPr>
+              <a:t>TortoiseGit</a:t>
+            </a:r>
+            <a:r>
+              <a:rPr lang="ru-RU" sz="2800" b="1" u="sng" dirty="0">
+                <a:solidFill>
+                  <a:srgbClr val="FF0000"/>
+                </a:solidFill>
+                <a:latin typeface="Oswald Medium" panose="00000600000000000000" pitchFamily="2" charset="-52"/>
+              </a:rPr>
+              <a:t>:</a:t>
+            </a:r>
+            <a:r>
+              <a:rPr lang="en-US" sz="2800" b="1" u="sng" dirty="0">
+                <a:solidFill>
+                  <a:srgbClr val="FF0000"/>
+                </a:solidFill>
+                <a:latin typeface="Oswald Medium" panose="00000600000000000000" pitchFamily="2" charset="-52"/>
+              </a:rPr>
+              <a:t> </a:t>
+            </a:r>
+            <a:endParaRPr lang="ru-RU" sz="2800" b="1" dirty="0">
+              <a:latin typeface="Oswald Medium" panose="00000600000000000000" pitchFamily="2" charset="-52"/>
+            </a:endParaRPr>
+          </a:p>
+        </p:txBody>
+      </p:sp>
     </p:spTree>
     <p:extLst>
       <p:ext uri="{BB962C8B-B14F-4D97-AF65-F5344CB8AC3E}">
@@ -7589,12 +8094,433 @@
   <p:clrMapOvr>
     <a:masterClrMapping/>
   </p:clrMapOvr>
+  <mc:AlternateContent xmlns:mc="http://schemas.openxmlformats.org/markup-compatibility/2006">
+    <mc:Choice xmlns:p14="http://schemas.microsoft.com/office/powerpoint/2010/main" Requires="p14">
+      <p:transition spd="slow" p14:dur="1500">
+        <p:split orient="vert"/>
+      </p:transition>
+    </mc:Choice>
+    <mc:Fallback>
+      <p:transition spd="slow">
+        <p:split orient="vert"/>
+      </p:transition>
+    </mc:Fallback>
+  </mc:AlternateContent>
+</p:sld>
+</file>
+
+<file path=ppt/slides/slide13.xml><?xml version="1.0" encoding="utf-8"?>
+<p:sld xmlns:a="http://schemas.openxmlformats.org/drawingml/2006/main" xmlns:r="http://schemas.openxmlformats.org/officeDocument/2006/relationships" xmlns:p="http://schemas.openxmlformats.org/presentationml/2006/main">
+  <p:cSld>
+    <p:bg>
+      <p:bgPr>
+        <a:solidFill>
+          <a:srgbClr val="001746"/>
+        </a:solidFill>
+        <a:effectLst/>
+      </p:bgPr>
+    </p:bg>
+    <p:spTree>
+      <p:nvGrpSpPr>
+        <p:cNvPr id="1" name=""/>
+        <p:cNvGrpSpPr/>
+        <p:nvPr/>
+      </p:nvGrpSpPr>
+      <p:grpSpPr>
+        <a:xfrm>
+          <a:off x="0" y="0"/>
+          <a:ext cx="0" cy="0"/>
+          <a:chOff x="0" y="0"/>
+          <a:chExt cx="0" cy="0"/>
+        </a:xfrm>
+      </p:grpSpPr>
+      <p:pic>
+        <p:nvPicPr>
+          <p:cNvPr id="3074" name="Picture 2" descr="Университет ИТМО">
+            <a:extLst>
+              <a:ext uri="{FF2B5EF4-FFF2-40B4-BE49-F238E27FC236}">
+                <a16:creationId xmlns:a16="http://schemas.microsoft.com/office/drawing/2014/main" id="{F4CE565F-6232-4A30-9D30-41B5BC1D8438}"/>
+              </a:ext>
+            </a:extLst>
+          </p:cNvPr>
+          <p:cNvPicPr>
+            <a:picLocks noChangeAspect="1" noChangeArrowheads="1"/>
+          </p:cNvPicPr>
+          <p:nvPr/>
+        </p:nvPicPr>
+        <p:blipFill rotWithShape="1">
+          <a:blip r:embed="rId2">
+            <a:extLst>
+              <a:ext uri="{28A0092B-C50C-407E-A947-70E740481C1C}">
+                <a14:useLocalDpi xmlns:a14="http://schemas.microsoft.com/office/drawing/2010/main" val="0"/>
+              </a:ext>
+            </a:extLst>
+          </a:blip>
+          <a:srcRect l="7209" t="8709" r="7171" b="13824"/>
+          <a:stretch/>
+        </p:blipFill>
+        <p:spPr bwMode="auto">
+          <a:xfrm>
+            <a:off x="4021810" y="665308"/>
+            <a:ext cx="4533255" cy="2246769"/>
+          </a:xfrm>
+          <a:prstGeom prst="roundRect">
+            <a:avLst>
+              <a:gd name="adj" fmla="val 8594"/>
+            </a:avLst>
+          </a:prstGeom>
+          <a:solidFill>
+            <a:srgbClr val="FFFFFF">
+              <a:shade val="85000"/>
+            </a:srgbClr>
+          </a:solidFill>
+          <a:ln>
+            <a:noFill/>
+          </a:ln>
+          <a:effectLst>
+            <a:reflection blurRad="12700" stA="38000" endPos="28000" dist="5000" dir="5400000" sy="-100000" algn="bl" rotWithShape="0"/>
+          </a:effectLst>
+          <a:extLst>
+            <a:ext uri="{909E8E84-426E-40DD-AFC4-6F175D3DCCD1}">
+              <a14:hiddenFill xmlns:a14="http://schemas.microsoft.com/office/drawing/2010/main">
+                <a:solidFill>
+                  <a:srgbClr val="FFFFFF"/>
+                </a:solidFill>
+              </a14:hiddenFill>
+            </a:ext>
+          </a:extLst>
+        </p:spPr>
+      </p:pic>
+      <p:sp>
+        <p:nvSpPr>
+          <p:cNvPr id="2" name="TextBox 1">
+            <a:extLst>
+              <a:ext uri="{FF2B5EF4-FFF2-40B4-BE49-F238E27FC236}">
+                <a16:creationId xmlns:a16="http://schemas.microsoft.com/office/drawing/2014/main" id="{2DAE5539-F484-4F62-AF11-BEE35D7CE366}"/>
+              </a:ext>
+            </a:extLst>
+          </p:cNvPr>
+          <p:cNvSpPr txBox="1"/>
+          <p:nvPr/>
+        </p:nvSpPr>
+        <p:spPr>
+          <a:xfrm>
+            <a:off x="139484" y="973085"/>
+            <a:ext cx="3789336" cy="1938992"/>
+          </a:xfrm>
+          <a:prstGeom prst="rect">
+            <a:avLst/>
+          </a:prstGeom>
+          <a:noFill/>
+        </p:spPr>
+        <p:txBody>
+          <a:bodyPr wrap="square" rtlCol="0">
+            <a:spAutoFit/>
+          </a:bodyPr>
+          <a:lstStyle/>
+          <a:p>
+            <a:r>
+              <a:rPr lang="ru-RU" sz="2000" dirty="0">
+                <a:solidFill>
+                  <a:schemeClr val="bg1"/>
+                </a:solidFill>
+                <a:latin typeface="Oswald Medium" panose="00000600000000000000" pitchFamily="2" charset="-52"/>
+              </a:rPr>
+              <a:t>Презентацию подготовил</a:t>
+            </a:r>
+            <a:r>
+              <a:rPr lang="en-US" sz="2000" dirty="0">
+                <a:solidFill>
+                  <a:schemeClr val="bg1"/>
+                </a:solidFill>
+                <a:latin typeface="Oswald Medium" panose="00000600000000000000" pitchFamily="2" charset="-52"/>
+              </a:rPr>
+              <a:t>:</a:t>
+            </a:r>
+            <a:r>
+              <a:rPr lang="ru-RU" sz="2000" dirty="0">
+                <a:solidFill>
+                  <a:schemeClr val="bg1"/>
+                </a:solidFill>
+                <a:latin typeface="Oswald Medium" panose="00000600000000000000" pitchFamily="2" charset="-52"/>
+              </a:rPr>
+              <a:t> </a:t>
+            </a:r>
+          </a:p>
+          <a:p>
+            <a:r>
+              <a:rPr lang="ru-RU" sz="2000" dirty="0">
+                <a:solidFill>
+                  <a:schemeClr val="bg1"/>
+                </a:solidFill>
+                <a:latin typeface="Oswald Medium" panose="00000600000000000000" pitchFamily="2" charset="-52"/>
+              </a:rPr>
+              <a:t>Журавлев Дмитрий, инженер</a:t>
+            </a:r>
+            <a:r>
+              <a:rPr lang="en-US" sz="2000" dirty="0">
+                <a:solidFill>
+                  <a:schemeClr val="bg1"/>
+                </a:solidFill>
+                <a:latin typeface="Oswald Medium" panose="00000600000000000000" pitchFamily="2" charset="-52"/>
+              </a:rPr>
+              <a:t>.</a:t>
+            </a:r>
+          </a:p>
+          <a:p>
+            <a:r>
+              <a:rPr lang="ru-RU" sz="2000" dirty="0">
+                <a:solidFill>
+                  <a:schemeClr val="bg1"/>
+                </a:solidFill>
+                <a:latin typeface="Oswald Medium" panose="00000600000000000000" pitchFamily="2" charset="-52"/>
+              </a:rPr>
+              <a:t>Контакты:</a:t>
+            </a:r>
+          </a:p>
+          <a:p>
+            <a:r>
+              <a:rPr lang="ru-RU" sz="2000" dirty="0">
+                <a:solidFill>
+                  <a:schemeClr val="bg1"/>
+                </a:solidFill>
+                <a:latin typeface="Oswald Medium" panose="00000600000000000000" pitchFamily="2" charset="-52"/>
+              </a:rPr>
+              <a:t>Тел. 8</a:t>
+            </a:r>
+            <a:r>
+              <a:rPr lang="en-US" sz="2000" dirty="0">
+                <a:solidFill>
+                  <a:schemeClr val="bg1"/>
+                </a:solidFill>
+                <a:latin typeface="Oswald Medium" panose="00000600000000000000" pitchFamily="2" charset="-52"/>
+              </a:rPr>
+              <a:t>(</a:t>
+            </a:r>
+            <a:r>
+              <a:rPr lang="ru-RU" sz="2000" dirty="0">
+                <a:solidFill>
+                  <a:schemeClr val="bg1"/>
+                </a:solidFill>
+                <a:latin typeface="Oswald Medium" panose="00000600000000000000" pitchFamily="2" charset="-52"/>
+              </a:rPr>
+              <a:t>918</a:t>
+            </a:r>
+            <a:r>
+              <a:rPr lang="en-US" sz="2000" dirty="0">
+                <a:solidFill>
+                  <a:schemeClr val="bg1"/>
+                </a:solidFill>
+                <a:latin typeface="Oswald Medium" panose="00000600000000000000" pitchFamily="2" charset="-52"/>
+              </a:rPr>
+              <a:t>)</a:t>
+            </a:r>
+            <a:r>
+              <a:rPr lang="ru-RU" sz="2000" dirty="0">
+                <a:solidFill>
+                  <a:schemeClr val="bg1"/>
+                </a:solidFill>
+                <a:latin typeface="Oswald Medium" panose="00000600000000000000" pitchFamily="2" charset="-52"/>
+              </a:rPr>
+              <a:t>328</a:t>
+            </a:r>
+            <a:r>
+              <a:rPr lang="en-US" sz="2000" dirty="0">
+                <a:solidFill>
+                  <a:schemeClr val="bg1"/>
+                </a:solidFill>
+                <a:latin typeface="Oswald Medium" panose="00000600000000000000" pitchFamily="2" charset="-52"/>
+              </a:rPr>
+              <a:t>-</a:t>
+            </a:r>
+            <a:r>
+              <a:rPr lang="ru-RU" sz="2000" dirty="0">
+                <a:solidFill>
+                  <a:schemeClr val="bg1"/>
+                </a:solidFill>
+                <a:latin typeface="Oswald Medium" panose="00000600000000000000" pitchFamily="2" charset="-52"/>
+              </a:rPr>
+              <a:t>88</a:t>
+            </a:r>
+            <a:r>
+              <a:rPr lang="en-US" sz="2000" dirty="0">
+                <a:solidFill>
+                  <a:schemeClr val="bg1"/>
+                </a:solidFill>
+                <a:latin typeface="Oswald Medium" panose="00000600000000000000" pitchFamily="2" charset="-52"/>
+              </a:rPr>
+              <a:t>-</a:t>
+            </a:r>
+            <a:r>
+              <a:rPr lang="ru-RU" sz="2000" dirty="0">
+                <a:solidFill>
+                  <a:schemeClr val="bg1"/>
+                </a:solidFill>
+                <a:latin typeface="Oswald Medium" panose="00000600000000000000" pitchFamily="2" charset="-52"/>
+              </a:rPr>
+              <a:t>14</a:t>
+            </a:r>
+          </a:p>
+          <a:p>
+            <a:r>
+              <a:rPr lang="en-US" sz="2000" dirty="0">
+                <a:solidFill>
+                  <a:schemeClr val="bg1"/>
+                </a:solidFill>
+                <a:latin typeface="Oswald Medium" panose="00000600000000000000" pitchFamily="2" charset="-52"/>
+              </a:rPr>
+              <a:t>Mail. </a:t>
+            </a:r>
+            <a:r>
+              <a:rPr lang="en-US" sz="2000" dirty="0">
+                <a:solidFill>
+                  <a:schemeClr val="bg1"/>
+                </a:solidFill>
+                <a:latin typeface="Oswald Medium" panose="00000600000000000000" pitchFamily="2" charset="-52"/>
+                <a:hlinkClick r:id="rId3">
+                  <a:extLst>
+                    <a:ext uri="{A12FA001-AC4F-418D-AE19-62706E023703}">
+                      <ahyp:hlinkClr xmlns:ahyp="http://schemas.microsoft.com/office/drawing/2018/hyperlinkcolor" val="tx"/>
+                    </a:ext>
+                  </a:extLst>
+                </a:hlinkClick>
+              </a:rPr>
+              <a:t>gddno@inbox.ru</a:t>
+            </a:r>
+            <a:endParaRPr lang="ru-RU" sz="2000" dirty="0">
+              <a:solidFill>
+                <a:schemeClr val="bg1"/>
+              </a:solidFill>
+              <a:latin typeface="Oswald Medium" panose="00000600000000000000" pitchFamily="2" charset="-52"/>
+            </a:endParaRPr>
+          </a:p>
+          <a:p>
+            <a:r>
+              <a:rPr lang="en-US" sz="2000" dirty="0">
+                <a:solidFill>
+                  <a:schemeClr val="bg1"/>
+                </a:solidFill>
+                <a:latin typeface="Oswald Medium" panose="00000600000000000000" pitchFamily="2" charset="-52"/>
+              </a:rPr>
+              <a:t>Telegram.</a:t>
+            </a:r>
+            <a:r>
+              <a:rPr lang="ru-RU" sz="2000" dirty="0">
+                <a:solidFill>
+                  <a:schemeClr val="bg1"/>
+                </a:solidFill>
+                <a:latin typeface="Oswald Medium" panose="00000600000000000000" pitchFamily="2" charset="-52"/>
+              </a:rPr>
+              <a:t> </a:t>
+            </a:r>
+            <a:r>
+              <a:rPr lang="en-US" sz="2000" dirty="0">
+                <a:solidFill>
+                  <a:schemeClr val="bg1"/>
+                </a:solidFill>
+                <a:latin typeface="Oswald Medium" panose="00000600000000000000" pitchFamily="2" charset="-52"/>
+              </a:rPr>
+              <a:t>https://t.me/dzhuravlevvv </a:t>
+            </a:r>
+            <a:endParaRPr lang="ru-RU" sz="2000" dirty="0">
+              <a:solidFill>
+                <a:schemeClr val="bg1"/>
+              </a:solidFill>
+              <a:latin typeface="Oswald Medium" panose="00000600000000000000" pitchFamily="2" charset="-52"/>
+            </a:endParaRPr>
+          </a:p>
+        </p:txBody>
+      </p:sp>
+      <p:sp>
+        <p:nvSpPr>
+          <p:cNvPr id="12" name="TextBox 11">
+            <a:extLst>
+              <a:ext uri="{FF2B5EF4-FFF2-40B4-BE49-F238E27FC236}">
+                <a16:creationId xmlns:a16="http://schemas.microsoft.com/office/drawing/2014/main" id="{65CB0C17-7494-47EF-873E-952576F26D3D}"/>
+              </a:ext>
+            </a:extLst>
+          </p:cNvPr>
+          <p:cNvSpPr txBox="1"/>
+          <p:nvPr/>
+        </p:nvSpPr>
+        <p:spPr>
+          <a:xfrm>
+            <a:off x="3529739" y="4215901"/>
+            <a:ext cx="2084522" cy="646331"/>
+          </a:xfrm>
+          <a:prstGeom prst="rect">
+            <a:avLst/>
+          </a:prstGeom>
+          <a:noFill/>
+        </p:spPr>
+        <p:txBody>
+          <a:bodyPr wrap="square">
+            <a:spAutoFit/>
+          </a:bodyPr>
+          <a:lstStyle/>
+          <a:p>
+            <a:pPr algn="ctr"/>
+            <a:r>
+              <a:rPr lang="ru-RU" sz="1800" dirty="0">
+                <a:solidFill>
+                  <a:schemeClr val="bg1"/>
+                </a:solidFill>
+                <a:latin typeface="Oswald Medium" panose="00000600000000000000" pitchFamily="2" charset="-52"/>
+              </a:rPr>
+              <a:t>Санкт-Петербург </a:t>
+            </a:r>
+          </a:p>
+          <a:p>
+            <a:pPr algn="ctr"/>
+            <a:r>
+              <a:rPr lang="ru-RU" sz="1800" dirty="0">
+                <a:solidFill>
+                  <a:schemeClr val="bg1"/>
+                </a:solidFill>
+                <a:latin typeface="Oswald Medium" panose="00000600000000000000" pitchFamily="2" charset="-52"/>
+              </a:rPr>
+              <a:t>2022 год</a:t>
+            </a:r>
+            <a:endParaRPr lang="ru-RU" sz="1800" dirty="0"/>
+          </a:p>
+        </p:txBody>
+      </p:sp>
+    </p:spTree>
+    <p:extLst>
+      <p:ext uri="{BB962C8B-B14F-4D97-AF65-F5344CB8AC3E}">
+        <p14:creationId xmlns:p14="http://schemas.microsoft.com/office/powerpoint/2010/main" val="4192428115"/>
+      </p:ext>
+    </p:extLst>
+  </p:cSld>
+  <p:clrMapOvr>
+    <a:masterClrMapping/>
+  </p:clrMapOvr>
+  <mc:AlternateContent xmlns:mc="http://schemas.openxmlformats.org/markup-compatibility/2006">
+    <mc:Choice xmlns:p14="http://schemas.microsoft.com/office/powerpoint/2010/main" Requires="p14">
+      <p:transition spd="slow" p14:dur="1500">
+        <p:split orient="vert"/>
+      </p:transition>
+    </mc:Choice>
+    <mc:Fallback>
+      <p:transition spd="slow">
+        <p:split orient="vert"/>
+      </p:transition>
+    </mc:Fallback>
+  </mc:AlternateContent>
 </p:sld>
 </file>
 
 <file path=ppt/slides/slide2.xml><?xml version="1.0" encoding="utf-8"?>
 <p:sld xmlns:a="http://schemas.openxmlformats.org/drawingml/2006/main" xmlns:r="http://schemas.openxmlformats.org/officeDocument/2006/relationships" xmlns:p="http://schemas.openxmlformats.org/presentationml/2006/main">
   <p:cSld>
+    <p:bg>
+      <p:bgPr>
+        <a:solidFill>
+          <a:srgbClr val="001746"/>
+        </a:solidFill>
+        <a:effectLst/>
+      </p:bgPr>
+    </p:bg>
     <p:spTree>
       <p:nvGrpSpPr>
         <p:cNvPr id="1" name=""/>
@@ -7638,13 +8564,25 @@
         </p:blipFill>
         <p:spPr bwMode="auto">
           <a:xfrm>
-            <a:off x="1239982" y="685800"/>
+            <a:off x="1278728" y="490104"/>
             <a:ext cx="6313343" cy="4163291"/>
           </a:xfrm>
-          <a:prstGeom prst="rect">
-            <a:avLst/>
+          <a:prstGeom prst="roundRect">
+            <a:avLst>
+              <a:gd name="adj" fmla="val 8594"/>
+            </a:avLst>
           </a:prstGeom>
-          <a:noFill/>
+          <a:solidFill>
+            <a:srgbClr val="FFFFFF">
+              <a:shade val="85000"/>
+            </a:srgbClr>
+          </a:solidFill>
+          <a:ln>
+            <a:noFill/>
+          </a:ln>
+          <a:effectLst>
+            <a:reflection blurRad="12700" stA="38000" endPos="28000" dist="5000" dir="5400000" sy="-100000" algn="bl" rotWithShape="0"/>
+          </a:effectLst>
           <a:extLst>
             <a:ext uri="{909E8E84-426E-40DD-AFC4-6F175D3DCCD1}">
               <a14:hiddenFill xmlns:a14="http://schemas.microsoft.com/office/drawing/2010/main">
@@ -7666,12 +8604,32 @@
   <p:clrMapOvr>
     <a:masterClrMapping/>
   </p:clrMapOvr>
+  <mc:AlternateContent xmlns:mc="http://schemas.openxmlformats.org/markup-compatibility/2006">
+    <mc:Choice xmlns:p14="http://schemas.microsoft.com/office/powerpoint/2010/main" Requires="p14">
+      <p:transition spd="slow" p14:dur="1500">
+        <p:split orient="vert"/>
+      </p:transition>
+    </mc:Choice>
+    <mc:Fallback>
+      <p:transition spd="slow">
+        <p:split orient="vert"/>
+      </p:transition>
+    </mc:Fallback>
+  </mc:AlternateContent>
 </p:sld>
 </file>
 
 <file path=ppt/slides/slide3.xml><?xml version="1.0" encoding="utf-8"?>
 <p:sld xmlns:a="http://schemas.openxmlformats.org/drawingml/2006/main" xmlns:r="http://schemas.openxmlformats.org/officeDocument/2006/relationships" xmlns:p="http://schemas.openxmlformats.org/presentationml/2006/main">
   <p:cSld>
+    <p:bg>
+      <p:bgPr>
+        <a:solidFill>
+          <a:srgbClr val="001746"/>
+        </a:solidFill>
+        <a:effectLst/>
+      </p:bgPr>
+    </p:bg>
     <p:spTree>
       <p:nvGrpSpPr>
         <p:cNvPr id="1" name=""/>
@@ -7718,10 +8676,22 @@
             <a:off x="872550" y="362370"/>
             <a:ext cx="7204650" cy="4327394"/>
           </a:xfrm>
-          <a:prstGeom prst="rect">
-            <a:avLst/>
+          <a:prstGeom prst="roundRect">
+            <a:avLst>
+              <a:gd name="adj" fmla="val 8594"/>
+            </a:avLst>
           </a:prstGeom>
-          <a:noFill/>
+          <a:solidFill>
+            <a:srgbClr val="FFFFFF">
+              <a:shade val="85000"/>
+            </a:srgbClr>
+          </a:solidFill>
+          <a:ln>
+            <a:noFill/>
+          </a:ln>
+          <a:effectLst>
+            <a:reflection blurRad="12700" stA="38000" endPos="28000" dist="5000" dir="5400000" sy="-100000" algn="bl" rotWithShape="0"/>
+          </a:effectLst>
           <a:extLst>
             <a:ext uri="{909E8E84-426E-40DD-AFC4-6F175D3DCCD1}">
               <a14:hiddenFill xmlns:a14="http://schemas.microsoft.com/office/drawing/2010/main">
@@ -7743,12 +8713,32 @@
   <p:clrMapOvr>
     <a:masterClrMapping/>
   </p:clrMapOvr>
+  <mc:AlternateContent xmlns:mc="http://schemas.openxmlformats.org/markup-compatibility/2006">
+    <mc:Choice xmlns:p14="http://schemas.microsoft.com/office/powerpoint/2010/main" Requires="p14">
+      <p:transition spd="slow" p14:dur="1500">
+        <p:split orient="vert"/>
+      </p:transition>
+    </mc:Choice>
+    <mc:Fallback>
+      <p:transition spd="slow">
+        <p:split orient="vert"/>
+      </p:transition>
+    </mc:Fallback>
+  </mc:AlternateContent>
 </p:sld>
 </file>
 
 <file path=ppt/slides/slide4.xml><?xml version="1.0" encoding="utf-8"?>
 <p:sld xmlns:a="http://schemas.openxmlformats.org/drawingml/2006/main" xmlns:r="http://schemas.openxmlformats.org/officeDocument/2006/relationships" xmlns:p="http://schemas.openxmlformats.org/presentationml/2006/main">
   <p:cSld>
+    <p:bg>
+      <p:bgPr>
+        <a:solidFill>
+          <a:srgbClr val="001746"/>
+        </a:solidFill>
+        <a:effectLst/>
+      </p:bgPr>
+    </p:bg>
     <p:spTree>
       <p:nvGrpSpPr>
         <p:cNvPr id="1" name=""/>
@@ -7776,28 +8766,29 @@
             <a:spLocks noGrp="1"/>
           </p:cNvSpPr>
           <p:nvPr>
-            <p:ph type="ctrTitle"/>
+            <p:ph type="ctrTitle" idx="4294967295"/>
           </p:nvPr>
         </p:nvSpPr>
         <p:spPr>
           <a:xfrm>
-            <a:off x="1524000" y="208607"/>
-            <a:ext cx="6367977" cy="2303457"/>
+            <a:off x="1388269" y="268288"/>
+            <a:ext cx="6367462" cy="2303462"/>
           </a:xfrm>
         </p:spPr>
         <p:txBody>
           <a:bodyPr/>
           <a:lstStyle/>
           <a:p>
-            <a:r>
-              <a:rPr lang="en-US" dirty="0">
+            <a:pPr algn="ctr"/>
+            <a:r>
+              <a:rPr lang="en-US" sz="6600" u="sng" dirty="0">
                 <a:solidFill>
                   <a:schemeClr val="bg1"/>
                 </a:solidFill>
               </a:rPr>
               <a:t>ERP- Enterprise Resource Planning</a:t>
             </a:r>
-            <a:endParaRPr lang="ru-RU" dirty="0">
+            <a:endParaRPr lang="ru-RU" sz="6600" u="sng" dirty="0">
               <a:solidFill>
                 <a:schemeClr val="bg1"/>
               </a:solidFill>
@@ -7834,7 +8825,7 @@
         </p:blipFill>
         <p:spPr bwMode="auto">
           <a:xfrm>
-            <a:off x="3164361" y="2631437"/>
+            <a:off x="3164361" y="2571750"/>
             <a:ext cx="2815278" cy="2432400"/>
           </a:xfrm>
           <a:prstGeom prst="rect">
@@ -7862,12 +8853,32 @@
   <p:clrMapOvr>
     <a:masterClrMapping/>
   </p:clrMapOvr>
+  <mc:AlternateContent xmlns:mc="http://schemas.openxmlformats.org/markup-compatibility/2006">
+    <mc:Choice xmlns:p14="http://schemas.microsoft.com/office/powerpoint/2010/main" Requires="p14">
+      <p:transition spd="slow" p14:dur="1500">
+        <p:split orient="vert"/>
+      </p:transition>
+    </mc:Choice>
+    <mc:Fallback>
+      <p:transition spd="slow">
+        <p:split orient="vert"/>
+      </p:transition>
+    </mc:Fallback>
+  </mc:AlternateContent>
 </p:sld>
 </file>
 
 <file path=ppt/slides/slide5.xml><?xml version="1.0" encoding="utf-8"?>
 <p:sld xmlns:a="http://schemas.openxmlformats.org/drawingml/2006/main" xmlns:r="http://schemas.openxmlformats.org/officeDocument/2006/relationships" xmlns:p="http://schemas.openxmlformats.org/presentationml/2006/main">
   <p:cSld>
+    <p:bg>
+      <p:bgPr>
+        <a:solidFill>
+          <a:srgbClr val="001746"/>
+        </a:solidFill>
+        <a:effectLst/>
+      </p:bgPr>
+    </p:bg>
     <p:spTree>
       <p:nvGrpSpPr>
         <p:cNvPr id="1" name=""/>
@@ -7896,7 +8907,7 @@
         </p:nvSpPr>
         <p:spPr>
           <a:xfrm>
-            <a:off x="103909" y="285995"/>
+            <a:off x="103909" y="179505"/>
             <a:ext cx="8707581" cy="523220"/>
           </a:xfrm>
           <a:prstGeom prst="rect">
@@ -7912,16 +8923,16 @@
           <a:p>
             <a:pPr algn="ctr" fontAlgn="base"/>
             <a:r>
-              <a:rPr lang="ru-RU" sz="2800" b="0" i="0" strike="noStrike" dirty="0">
+              <a:rPr lang="ru-RU" sz="2800" b="0" i="0" u="sng" strike="noStrike" dirty="0">
                 <a:solidFill>
                   <a:schemeClr val="bg1"/>
                 </a:solidFill>
                 <a:effectLst/>
                 <a:latin typeface="Oswald Medium" panose="00000600000000000000" pitchFamily="2" charset="-52"/>
               </a:rPr>
-              <a:t>ТОП 5 лучших ПЛАТНЫХ ERP-систем для ведения бизнеса</a:t>
-            </a:r>
-            <a:endParaRPr lang="ru-RU" sz="2800" b="0" i="0" dirty="0">
+              <a:t>ТОП 5 лучших ПЛАТНЫХ ERP-систем для ведения бизнеса:</a:t>
+            </a:r>
+            <a:endParaRPr lang="ru-RU" sz="2800" b="0" i="0" u="sng" dirty="0">
               <a:solidFill>
                 <a:schemeClr val="bg1"/>
               </a:solidFill>
@@ -7945,8 +8956,8 @@
         </p:nvSpPr>
         <p:spPr>
           <a:xfrm>
-            <a:off x="464288" y="1015990"/>
-            <a:ext cx="1741182" cy="3416320"/>
+            <a:off x="453878" y="798875"/>
+            <a:ext cx="1525376" cy="4154984"/>
           </a:xfrm>
           <a:prstGeom prst="rect">
             <a:avLst/>
@@ -7954,7 +8965,7 @@
           <a:noFill/>
         </p:spPr>
         <p:txBody>
-          <a:bodyPr wrap="none" rtlCol="0">
+          <a:bodyPr wrap="square" rtlCol="0">
             <a:spAutoFit/>
           </a:bodyPr>
           <a:lstStyle/>
@@ -7964,6 +8975,7 @@
                 <a:solidFill>
                   <a:schemeClr val="bg1"/>
                 </a:solidFill>
+                <a:latin typeface="Oswald Medium" panose="00000600000000000000" pitchFamily="2" charset="-52"/>
               </a:rPr>
               <a:t>1. SAP</a:t>
             </a:r>
@@ -7976,6 +8988,7 @@
               <a:solidFill>
                 <a:schemeClr val="bg1"/>
               </a:solidFill>
+              <a:latin typeface="Oswald Medium" panose="00000600000000000000" pitchFamily="2" charset="-52"/>
             </a:endParaRPr>
           </a:p>
           <a:p>
@@ -7984,6 +8997,7 @@
                 <a:solidFill>
                   <a:schemeClr val="bg1"/>
                 </a:solidFill>
+                <a:latin typeface="Oswald Medium" panose="00000600000000000000" pitchFamily="2" charset="-52"/>
               </a:rPr>
               <a:t>2. Oracle</a:t>
             </a:r>
@@ -7993,6 +9007,7 @@
               <a:solidFill>
                 <a:schemeClr val="bg1"/>
               </a:solidFill>
+              <a:latin typeface="Oswald Medium" panose="00000600000000000000" pitchFamily="2" charset="-52"/>
             </a:endParaRPr>
           </a:p>
           <a:p>
@@ -8001,8 +9016,9 @@
                 <a:solidFill>
                   <a:schemeClr val="bg1"/>
                 </a:solidFill>
-              </a:rPr>
-              <a:t>3. Workday</a:t>
+                <a:latin typeface="Oswald Medium" panose="00000600000000000000" pitchFamily="2" charset="-52"/>
+              </a:rPr>
+              <a:t>3. 1C</a:t>
             </a:r>
           </a:p>
           <a:p>
@@ -8010,6 +9026,7 @@
               <a:solidFill>
                 <a:schemeClr val="bg1"/>
               </a:solidFill>
+              <a:latin typeface="Oswald Medium" panose="00000600000000000000" pitchFamily="2" charset="-52"/>
             </a:endParaRPr>
           </a:p>
           <a:p>
@@ -8018,8 +9035,9 @@
                 <a:solidFill>
                   <a:schemeClr val="bg1"/>
                 </a:solidFill>
-              </a:rPr>
-              <a:t>4. Sage</a:t>
+                <a:latin typeface="Oswald Medium" panose="00000600000000000000" pitchFamily="2" charset="-52"/>
+              </a:rPr>
+              <a:t>3. Workday</a:t>
             </a:r>
           </a:p>
           <a:p>
@@ -8027,6 +9045,7 @@
               <a:solidFill>
                 <a:schemeClr val="bg1"/>
               </a:solidFill>
+              <a:latin typeface="Oswald Medium" panose="00000600000000000000" pitchFamily="2" charset="-52"/>
             </a:endParaRPr>
           </a:p>
           <a:p>
@@ -8035,6 +9054,26 @@
                 <a:solidFill>
                   <a:schemeClr val="bg1"/>
                 </a:solidFill>
+                <a:latin typeface="Oswald Medium" panose="00000600000000000000" pitchFamily="2" charset="-52"/>
+              </a:rPr>
+              <a:t>4. Sage</a:t>
+            </a:r>
+          </a:p>
+          <a:p>
+            <a:endParaRPr lang="en-US" sz="2400" dirty="0">
+              <a:solidFill>
+                <a:schemeClr val="bg1"/>
+              </a:solidFill>
+              <a:latin typeface="Oswald Medium" panose="00000600000000000000" pitchFamily="2" charset="-52"/>
+            </a:endParaRPr>
+          </a:p>
+          <a:p>
+            <a:r>
+              <a:rPr lang="en-US" sz="2400" dirty="0">
+                <a:solidFill>
+                  <a:schemeClr val="bg1"/>
+                </a:solidFill>
+                <a:latin typeface="Oswald Medium" panose="00000600000000000000" pitchFamily="2" charset="-52"/>
               </a:rPr>
               <a:t>5. Infor</a:t>
             </a:r>
@@ -8042,6 +9081,7 @@
               <a:solidFill>
                 <a:schemeClr val="bg1"/>
               </a:solidFill>
+              <a:latin typeface="Oswald Medium" panose="00000600000000000000" pitchFamily="2" charset="-52"/>
             </a:endParaRPr>
           </a:p>
         </p:txBody>
@@ -8073,8 +9113,8 @@
         </p:blipFill>
         <p:spPr bwMode="auto">
           <a:xfrm>
-            <a:off x="2915084" y="862875"/>
-            <a:ext cx="1542615" cy="765250"/>
+            <a:off x="2807748" y="798875"/>
+            <a:ext cx="1525376" cy="756698"/>
           </a:xfrm>
           <a:prstGeom prst="rect">
             <a:avLst/>
@@ -8120,8 +9160,8 @@
         </p:blipFill>
         <p:spPr bwMode="auto">
           <a:xfrm>
-            <a:off x="3532909" y="1702440"/>
-            <a:ext cx="1591757" cy="768774"/>
+            <a:off x="3570436" y="1581255"/>
+            <a:ext cx="1419514" cy="685585"/>
           </a:xfrm>
           <a:prstGeom prst="rect">
             <a:avLst/>
@@ -8167,8 +9207,8 @@
         </p:blipFill>
         <p:spPr bwMode="auto">
           <a:xfrm>
-            <a:off x="4142942" y="2559190"/>
-            <a:ext cx="2199410" cy="768774"/>
+            <a:off x="5055693" y="3015934"/>
+            <a:ext cx="1808407" cy="632104"/>
           </a:xfrm>
           <a:prstGeom prst="rect">
             <a:avLst/>
@@ -8212,8 +9252,8 @@
         </p:blipFill>
         <p:spPr bwMode="auto">
           <a:xfrm>
-            <a:off x="4973782" y="3392934"/>
-            <a:ext cx="2143125" cy="708314"/>
+            <a:off x="5959896" y="3666833"/>
+            <a:ext cx="1912539" cy="632104"/>
           </a:xfrm>
           <a:prstGeom prst="rect">
             <a:avLst/>
@@ -8257,8 +9297,55 @@
         </p:blipFill>
         <p:spPr bwMode="auto">
           <a:xfrm>
-            <a:off x="5867400" y="4166218"/>
-            <a:ext cx="2071255" cy="768774"/>
+            <a:off x="6916165" y="4317732"/>
+            <a:ext cx="1741182" cy="646263"/>
+          </a:xfrm>
+          <a:prstGeom prst="rect">
+            <a:avLst/>
+          </a:prstGeom>
+          <a:noFill/>
+          <a:extLst>
+            <a:ext uri="{909E8E84-426E-40DD-AFC4-6F175D3DCCD1}">
+              <a14:hiddenFill xmlns:a14="http://schemas.microsoft.com/office/drawing/2010/main">
+                <a:solidFill>
+                  <a:srgbClr val="FFFFFF"/>
+                </a:solidFill>
+              </a14:hiddenFill>
+            </a:ext>
+          </a:extLst>
+        </p:spPr>
+      </p:pic>
+      <p:pic>
+        <p:nvPicPr>
+          <p:cNvPr id="1026" name="Picture 2" descr="1С — Википедия">
+            <a:extLst>
+              <a:ext uri="{FF2B5EF4-FFF2-40B4-BE49-F238E27FC236}">
+                <a16:creationId xmlns:a16="http://schemas.microsoft.com/office/drawing/2014/main" id="{7934456B-03B3-42D5-8D8B-B9893C246BC5}"/>
+              </a:ext>
+            </a:extLst>
+          </p:cNvPr>
+          <p:cNvPicPr>
+            <a:picLocks noChangeAspect="1" noChangeArrowheads="1"/>
+          </p:cNvPicPr>
+          <p:nvPr/>
+        </p:nvPicPr>
+        <p:blipFill>
+          <a:blip r:embed="rId7">
+            <a:extLst>
+              <a:ext uri="{28A0092B-C50C-407E-A947-70E740481C1C}">
+                <a14:useLocalDpi xmlns:a14="http://schemas.microsoft.com/office/drawing/2010/main" val="0"/>
+              </a:ext>
+            </a:extLst>
+          </a:blip>
+          <a:srcRect/>
+          <a:stretch>
+            <a:fillRect/>
+          </a:stretch>
+        </p:blipFill>
+        <p:spPr bwMode="auto">
+          <a:xfrm>
+            <a:off x="4333124" y="2292522"/>
+            <a:ext cx="1445138" cy="704617"/>
           </a:xfrm>
           <a:prstGeom prst="rect">
             <a:avLst/>
@@ -8285,12 +9372,32 @@
   <p:clrMapOvr>
     <a:masterClrMapping/>
   </p:clrMapOvr>
+  <mc:AlternateContent xmlns:mc="http://schemas.openxmlformats.org/markup-compatibility/2006">
+    <mc:Choice xmlns:p14="http://schemas.microsoft.com/office/powerpoint/2010/main" Requires="p14">
+      <p:transition spd="slow" p14:dur="1500">
+        <p:split orient="vert"/>
+      </p:transition>
+    </mc:Choice>
+    <mc:Fallback>
+      <p:transition spd="slow">
+        <p:split orient="vert"/>
+      </p:transition>
+    </mc:Fallback>
+  </mc:AlternateContent>
 </p:sld>
 </file>
 
 <file path=ppt/slides/slide6.xml><?xml version="1.0" encoding="utf-8"?>
 <p:sld xmlns:a="http://schemas.openxmlformats.org/drawingml/2006/main" xmlns:r="http://schemas.openxmlformats.org/officeDocument/2006/relationships" xmlns:p="http://schemas.openxmlformats.org/presentationml/2006/main">
   <p:cSld>
+    <p:bg>
+      <p:bgPr>
+        <a:solidFill>
+          <a:srgbClr val="001746"/>
+        </a:solidFill>
+        <a:effectLst/>
+      </p:bgPr>
+    </p:bg>
     <p:spTree>
       <p:nvGrpSpPr>
         <p:cNvPr id="1" name=""/>
@@ -8319,8 +9426,8 @@
         </p:nvSpPr>
         <p:spPr>
           <a:xfrm>
-            <a:off x="840993" y="2117593"/>
-            <a:ext cx="1823106" cy="1446550"/>
+            <a:off x="414788" y="2179585"/>
+            <a:ext cx="2509447" cy="2431435"/>
           </a:xfrm>
           <a:prstGeom prst="rect">
             <a:avLst/>
@@ -8333,30 +9440,34 @@
           </a:bodyPr>
           <a:lstStyle/>
           <a:p>
-            <a:r>
-              <a:rPr lang="en-US" sz="2800" b="1" dirty="0">
-                <a:solidFill>
-                  <a:schemeClr val="bg1"/>
-                </a:solidFill>
+            <a:pPr algn="ctr"/>
+            <a:r>
+              <a:rPr lang="en-US" sz="4400" b="1" u="sng" dirty="0">
+                <a:solidFill>
+                  <a:schemeClr val="bg1"/>
+                </a:solidFill>
+                <a:latin typeface="Oswald Medium" panose="00000600000000000000" pitchFamily="2" charset="-52"/>
               </a:rPr>
               <a:t>CRM</a:t>
             </a:r>
           </a:p>
           <a:p>
-            <a:r>
-              <a:rPr lang="en-US" sz="2000" b="0" i="1" dirty="0">
+            <a:pPr algn="ctr"/>
+            <a:r>
+              <a:rPr lang="en-US" sz="3600" b="1" dirty="0">
                 <a:solidFill>
                   <a:schemeClr val="bg1"/>
                 </a:solidFill>
                 <a:effectLst/>
-                <a:latin typeface="Arial" panose="020B0604020202020204" pitchFamily="34" charset="0"/>
+                <a:latin typeface="Oswald Medium" panose="00000600000000000000" pitchFamily="2" charset="-52"/>
               </a:rPr>
               <a:t>Customer Relationship Management</a:t>
             </a:r>
-            <a:endParaRPr lang="ru-RU" sz="1600" dirty="0">
+            <a:endParaRPr lang="ru-RU" sz="2800" b="1" dirty="0">
               <a:solidFill>
                 <a:schemeClr val="bg1"/>
               </a:solidFill>
+              <a:latin typeface="Oswald Medium" panose="00000600000000000000" pitchFamily="2" charset="-52"/>
             </a:endParaRPr>
           </a:p>
         </p:txBody>
@@ -8375,8 +9486,8 @@
         </p:nvSpPr>
         <p:spPr>
           <a:xfrm>
-            <a:off x="3469835" y="2117593"/>
-            <a:ext cx="1680268" cy="1508105"/>
+            <a:off x="3358366" y="2179586"/>
+            <a:ext cx="2427268" cy="2492990"/>
           </a:xfrm>
           <a:prstGeom prst="rect">
             <a:avLst/>
@@ -8389,52 +9500,57 @@
           </a:bodyPr>
           <a:lstStyle/>
           <a:p>
-            <a:r>
-              <a:rPr lang="en-US" sz="3200" b="1" dirty="0">
-                <a:solidFill>
-                  <a:schemeClr val="bg1"/>
-                </a:solidFill>
+            <a:pPr algn="ctr"/>
+            <a:r>
+              <a:rPr lang="en-US" sz="4800" b="1" u="sng" dirty="0">
+                <a:solidFill>
+                  <a:schemeClr val="bg1"/>
+                </a:solidFill>
+                <a:latin typeface="Oswald Medium" panose="00000600000000000000" pitchFamily="2" charset="-52"/>
               </a:rPr>
               <a:t>PPM</a:t>
             </a:r>
           </a:p>
           <a:p>
-            <a:r>
-              <a:rPr lang="en-US" sz="2000" i="1" dirty="0">
-                <a:solidFill>
-                  <a:schemeClr val="bg1"/>
-                </a:solidFill>
-                <a:latin typeface="Arial" panose="020B0604020202020204" pitchFamily="34" charset="0"/>
+            <a:pPr algn="ctr"/>
+            <a:r>
+              <a:rPr lang="en-US" sz="3600" b="1" dirty="0">
+                <a:solidFill>
+                  <a:schemeClr val="bg1"/>
+                </a:solidFill>
+                <a:latin typeface="Oswald Medium" panose="00000600000000000000" pitchFamily="2" charset="-52"/>
               </a:rPr>
               <a:t>Project </a:t>
             </a:r>
           </a:p>
           <a:p>
-            <a:r>
-              <a:rPr lang="en-US" sz="2000" i="1" dirty="0">
-                <a:solidFill>
-                  <a:schemeClr val="bg1"/>
-                </a:solidFill>
-                <a:latin typeface="Arial" panose="020B0604020202020204" pitchFamily="34" charset="0"/>
+            <a:pPr algn="ctr"/>
+            <a:r>
+              <a:rPr lang="en-US" sz="3600" b="1" dirty="0">
+                <a:solidFill>
+                  <a:schemeClr val="bg1"/>
+                </a:solidFill>
+                <a:latin typeface="Oswald Medium" panose="00000600000000000000" pitchFamily="2" charset="-52"/>
               </a:rPr>
               <a:t>Portfolio </a:t>
             </a:r>
           </a:p>
           <a:p>
-            <a:r>
-              <a:rPr lang="en-US" sz="2000" i="1" dirty="0">
-                <a:solidFill>
-                  <a:schemeClr val="bg1"/>
-                </a:solidFill>
-                <a:latin typeface="Arial" panose="020B0604020202020204" pitchFamily="34" charset="0"/>
+            <a:pPr algn="ctr"/>
+            <a:r>
+              <a:rPr lang="en-US" sz="3600" b="1" dirty="0">
+                <a:solidFill>
+                  <a:schemeClr val="bg1"/>
+                </a:solidFill>
+                <a:latin typeface="Oswald Medium" panose="00000600000000000000" pitchFamily="2" charset="-52"/>
               </a:rPr>
               <a:t>Management</a:t>
             </a:r>
-            <a:endParaRPr lang="ru-RU" sz="2000" i="1" dirty="0">
+            <a:endParaRPr lang="ru-RU" sz="2000" b="1" dirty="0">
               <a:solidFill>
                 <a:schemeClr val="bg1"/>
               </a:solidFill>
-              <a:latin typeface="Arial" panose="020B0604020202020204" pitchFamily="34" charset="0"/>
+              <a:latin typeface="Oswald Medium" panose="00000600000000000000" pitchFamily="2" charset="-52"/>
             </a:endParaRPr>
           </a:p>
         </p:txBody>
@@ -8453,8 +9569,8 @@
         </p:nvSpPr>
         <p:spPr>
           <a:xfrm>
-            <a:off x="6038966" y="2117593"/>
-            <a:ext cx="1680268" cy="1446550"/>
+            <a:off x="6219765" y="2179586"/>
+            <a:ext cx="2427268" cy="2431435"/>
           </a:xfrm>
           <a:prstGeom prst="rect">
             <a:avLst/>
@@ -8467,52 +9583,57 @@
           </a:bodyPr>
           <a:lstStyle/>
           <a:p>
-            <a:r>
-              <a:rPr lang="en-US" sz="2800" b="1" dirty="0">
-                <a:solidFill>
-                  <a:schemeClr val="bg1"/>
-                </a:solidFill>
+            <a:pPr algn="ctr"/>
+            <a:r>
+              <a:rPr lang="en-US" sz="4400" b="1" u="sng" dirty="0">
+                <a:solidFill>
+                  <a:schemeClr val="bg1"/>
+                </a:solidFill>
+                <a:latin typeface="Oswald Medium" panose="00000600000000000000" pitchFamily="2" charset="-52"/>
               </a:rPr>
               <a:t>PLM</a:t>
             </a:r>
           </a:p>
           <a:p>
-            <a:r>
-              <a:rPr lang="en-US" sz="2000" i="1" dirty="0">
-                <a:solidFill>
-                  <a:schemeClr val="bg1"/>
-                </a:solidFill>
-                <a:latin typeface="Arial" panose="020B0604020202020204" pitchFamily="34" charset="0"/>
+            <a:pPr algn="ctr"/>
+            <a:r>
+              <a:rPr lang="en-US" sz="3600" b="1" dirty="0">
+                <a:solidFill>
+                  <a:schemeClr val="bg1"/>
+                </a:solidFill>
+                <a:latin typeface="Oswald Medium" panose="00000600000000000000" pitchFamily="2" charset="-52"/>
               </a:rPr>
               <a:t>Product </a:t>
             </a:r>
           </a:p>
           <a:p>
-            <a:r>
-              <a:rPr lang="en-US" sz="2000" i="1" dirty="0">
-                <a:solidFill>
-                  <a:schemeClr val="bg1"/>
-                </a:solidFill>
-                <a:latin typeface="Arial" panose="020B0604020202020204" pitchFamily="34" charset="0"/>
+            <a:pPr algn="ctr"/>
+            <a:r>
+              <a:rPr lang="en-US" sz="3600" b="1" dirty="0">
+                <a:solidFill>
+                  <a:schemeClr val="bg1"/>
+                </a:solidFill>
+                <a:latin typeface="Oswald Medium" panose="00000600000000000000" pitchFamily="2" charset="-52"/>
               </a:rPr>
               <a:t>Lifecycle </a:t>
             </a:r>
           </a:p>
           <a:p>
-            <a:r>
-              <a:rPr lang="en-US" sz="2000" i="1" dirty="0">
-                <a:solidFill>
-                  <a:schemeClr val="bg1"/>
-                </a:solidFill>
-                <a:latin typeface="Arial" panose="020B0604020202020204" pitchFamily="34" charset="0"/>
+            <a:pPr algn="ctr"/>
+            <a:r>
+              <a:rPr lang="en-US" sz="3600" b="1" dirty="0">
+                <a:solidFill>
+                  <a:schemeClr val="bg1"/>
+                </a:solidFill>
+                <a:latin typeface="Oswald Medium" panose="00000600000000000000" pitchFamily="2" charset="-52"/>
               </a:rPr>
               <a:t>Management</a:t>
             </a:r>
-            <a:endParaRPr lang="ru-RU" sz="2000" i="1" dirty="0">
+            <a:endParaRPr lang="ru-RU" sz="2000" b="1" dirty="0">
               <a:solidFill>
                 <a:schemeClr val="bg1"/>
               </a:solidFill>
-              <a:latin typeface="Arial" panose="020B0604020202020204" pitchFamily="34" charset="0"/>
+              <a:latin typeface="Oswald Medium" panose="00000600000000000000" pitchFamily="2" charset="-52"/>
             </a:endParaRPr>
           </a:p>
         </p:txBody>
@@ -8531,8 +9652,8 @@
         </p:nvSpPr>
         <p:spPr>
           <a:xfrm>
-            <a:off x="3472665" y="504565"/>
-            <a:ext cx="1156206" cy="646331"/>
+            <a:off x="3965942" y="179977"/>
+            <a:ext cx="1212116" cy="923330"/>
           </a:xfrm>
           <a:prstGeom prst="rect">
             <a:avLst/>
@@ -8546,14 +9667,17 @@
           <a:lstStyle/>
           <a:p>
             <a:r>
-              <a:rPr lang="en-US" sz="3600" b="1" dirty="0">
-                <a:solidFill>
-                  <a:schemeClr val="bg1"/>
-                </a:solidFill>
+              <a:rPr lang="en-US" sz="5400" b="1" u="sng" dirty="0">
+                <a:solidFill>
+                  <a:schemeClr val="bg1"/>
+                </a:solidFill>
+                <a:latin typeface="Oswald Medium" panose="00000600000000000000" pitchFamily="2" charset="-52"/>
               </a:rPr>
               <a:t>ERP</a:t>
             </a:r>
-            <a:endParaRPr lang="ru-RU" sz="3600" b="1" dirty="0"/>
+            <a:endParaRPr lang="ru-RU" sz="5400" b="1" u="sng" dirty="0">
+              <a:latin typeface="Oswald Medium" panose="00000600000000000000" pitchFamily="2" charset="-52"/>
+            </a:endParaRPr>
           </a:p>
         </p:txBody>
       </p:sp>
@@ -8570,19 +9694,19 @@
           <p:nvPr/>
         </p:nvSpPr>
         <p:spPr>
-          <a:xfrm rot="7809197">
-            <a:off x="2410184" y="1100584"/>
-            <a:ext cx="440038" cy="473418"/>
+          <a:xfrm rot="7947215">
+            <a:off x="2733996" y="1146303"/>
+            <a:ext cx="890880" cy="473418"/>
           </a:xfrm>
           <a:prstGeom prst="rightArrow">
             <a:avLst/>
           </a:prstGeom>
           <a:solidFill>
-            <a:srgbClr val="FF0000"/>
+            <a:schemeClr val="bg1"/>
           </a:solidFill>
           <a:ln>
             <a:solidFill>
-              <a:srgbClr val="FF0000"/>
+              <a:schemeClr val="bg1"/>
             </a:solidFill>
           </a:ln>
         </p:spPr>
@@ -8625,18 +9749,18 @@
         </p:nvSpPr>
         <p:spPr>
           <a:xfrm rot="5400000">
-            <a:off x="3773878" y="1203520"/>
-            <a:ext cx="440038" cy="473418"/>
+            <a:off x="4170051" y="1391620"/>
+            <a:ext cx="803898" cy="473418"/>
           </a:xfrm>
           <a:prstGeom prst="rightArrow">
             <a:avLst/>
           </a:prstGeom>
           <a:solidFill>
-            <a:srgbClr val="FF0000"/>
+            <a:schemeClr val="bg1"/>
           </a:solidFill>
           <a:ln>
             <a:solidFill>
-              <a:srgbClr val="FF0000"/>
+              <a:schemeClr val="bg1"/>
             </a:solidFill>
           </a:ln>
         </p:spPr>
@@ -8678,19 +9802,19 @@
           <p:nvPr/>
         </p:nvSpPr>
         <p:spPr>
-          <a:xfrm rot="3117200">
-            <a:off x="5250525" y="1078384"/>
-            <a:ext cx="440038" cy="473418"/>
+          <a:xfrm rot="2851128">
+            <a:off x="5523910" y="1147690"/>
+            <a:ext cx="885070" cy="473418"/>
           </a:xfrm>
           <a:prstGeom prst="rightArrow">
             <a:avLst/>
           </a:prstGeom>
           <a:solidFill>
-            <a:srgbClr val="FF0000"/>
+            <a:schemeClr val="bg1"/>
           </a:solidFill>
           <a:ln>
             <a:solidFill>
-              <a:srgbClr val="FF0000"/>
+              <a:schemeClr val="bg1"/>
             </a:solidFill>
           </a:ln>
         </p:spPr>
@@ -8729,12 +9853,32 @@
   <p:clrMapOvr>
     <a:masterClrMapping/>
   </p:clrMapOvr>
+  <mc:AlternateContent xmlns:mc="http://schemas.openxmlformats.org/markup-compatibility/2006">
+    <mc:Choice xmlns:p14="http://schemas.microsoft.com/office/powerpoint/2010/main" Requires="p14">
+      <p:transition spd="slow" p14:dur="1500">
+        <p:split orient="vert"/>
+      </p:transition>
+    </mc:Choice>
+    <mc:Fallback>
+      <p:transition spd="slow">
+        <p:split orient="vert"/>
+      </p:transition>
+    </mc:Fallback>
+  </mc:AlternateContent>
 </p:sld>
 </file>
 
 <file path=ppt/slides/slide7.xml><?xml version="1.0" encoding="utf-8"?>
 <p:sld xmlns:a="http://schemas.openxmlformats.org/drawingml/2006/main" xmlns:r="http://schemas.openxmlformats.org/officeDocument/2006/relationships" xmlns:p="http://schemas.openxmlformats.org/presentationml/2006/main">
   <p:cSld>
+    <p:bg>
+      <p:bgPr>
+        <a:solidFill>
+          <a:srgbClr val="001746"/>
+        </a:solidFill>
+        <a:effectLst/>
+      </p:bgPr>
+    </p:bg>
     <p:spTree>
       <p:nvGrpSpPr>
         <p:cNvPr id="1" name=""/>
@@ -8762,19 +9906,24 @@
             <a:spLocks noGrp="1"/>
           </p:cNvSpPr>
           <p:nvPr>
-            <p:ph type="title"/>
+            <p:ph type="title" idx="4294967295"/>
           </p:nvPr>
         </p:nvSpPr>
         <p:spPr>
           <a:xfrm>
-            <a:off x="747786" y="1254364"/>
-            <a:ext cx="6872213" cy="3479278"/>
+            <a:off x="441434" y="755729"/>
+            <a:ext cx="6731876" cy="4234111"/>
           </a:xfrm>
         </p:spPr>
         <p:txBody>
           <a:bodyPr/>
           <a:lstStyle/>
           <a:p>
+            <a:pPr>
+              <a:lnSpc>
+                <a:spcPct val="150000"/>
+              </a:lnSpc>
+            </a:pPr>
             <a:r>
               <a:rPr lang="en-US" sz="2000" dirty="0">
                 <a:solidFill>
@@ -8915,7 +10064,7 @@
             <a:br>
               <a:rPr lang="ru-RU" sz="2000" dirty="0">
                 <a:solidFill>
-                  <a:schemeClr val="bg1"/>
+                  <a:srgbClr val="FF0000"/>
                 </a:solidFill>
               </a:rPr>
             </a:br>
@@ -8925,30 +10074,7 @@
                   <a:schemeClr val="bg1"/>
                 </a:solidFill>
               </a:rPr>
-              <a:t>9</a:t>
-            </a:r>
-            <a:r>
-              <a:rPr lang="ru-RU" sz="2000" dirty="0">
-                <a:solidFill>
-                  <a:srgbClr val="FF0000"/>
-                </a:solidFill>
-              </a:rPr>
-              <a:t>. Учет и управления рисками</a:t>
-            </a:r>
-            <a:br>
-              <a:rPr lang="ru-RU" sz="2000" dirty="0">
-                <a:solidFill>
-                  <a:srgbClr val="FF0000"/>
-                </a:solidFill>
-              </a:rPr>
-            </a:br>
-            <a:r>
-              <a:rPr lang="ru-RU" sz="2000" dirty="0">
-                <a:solidFill>
-                  <a:schemeClr val="bg1"/>
-                </a:solidFill>
-              </a:rPr>
-              <a:t>10. Отслеживание актуального состояния выполнения задачи</a:t>
+              <a:t>9. Отслеживание актуального состояния выполнения задачи</a:t>
             </a:r>
             <a:br>
               <a:rPr lang="ru-RU" sz="2000" dirty="0">
@@ -8978,21 +10104,22 @@
             <a:spLocks noGrp="1"/>
           </p:cNvSpPr>
           <p:nvPr>
-            <p:ph type="title" idx="2"/>
+            <p:ph type="title" idx="4294967295"/>
           </p:nvPr>
         </p:nvSpPr>
         <p:spPr>
           <a:xfrm>
-            <a:off x="747787" y="547255"/>
-            <a:ext cx="7508148" cy="579790"/>
+            <a:off x="1290234" y="176292"/>
+            <a:ext cx="6563532" cy="579437"/>
           </a:xfrm>
         </p:spPr>
         <p:txBody>
           <a:bodyPr/>
           <a:lstStyle/>
           <a:p>
-            <a:r>
-              <a:rPr lang="en-US" sz="2800" dirty="0">
+            <a:pPr algn="ctr"/>
+            <a:r>
+              <a:rPr lang="en-US" sz="2800" u="sng" dirty="0">
                 <a:solidFill>
                   <a:srgbClr val="FF0000"/>
                 </a:solidFill>
@@ -9000,23 +10127,31 @@
               <a:t>PPM </a:t>
             </a:r>
             <a:r>
-              <a:rPr lang="ru-RU" sz="2800" dirty="0">
+              <a:rPr lang="en-US" u="sng" dirty="0">
                 <a:solidFill>
                   <a:srgbClr val="FF0000"/>
                 </a:solidFill>
               </a:rPr>
-              <a:t>система (</a:t>
-            </a:r>
-            <a:r>
-              <a:rPr lang="en-US" sz="2800" dirty="0">
+              <a:t>system</a:t>
+            </a:r>
+            <a:r>
+              <a:rPr lang="ru-RU" sz="2800" u="sng" dirty="0">
                 <a:solidFill>
                   <a:srgbClr val="FF0000"/>
                 </a:solidFill>
               </a:rPr>
+              <a:t> (</a:t>
+            </a:r>
+            <a:r>
+              <a:rPr lang="en-US" sz="2800" u="sng" dirty="0">
+                <a:solidFill>
+                  <a:srgbClr val="FF0000"/>
+                </a:solidFill>
+              </a:rPr>
               <a:t>Project Portfolio Management</a:t>
             </a:r>
             <a:r>
-              <a:rPr lang="ru-RU" sz="2800" dirty="0">
+              <a:rPr lang="ru-RU" sz="2800" u="sng" dirty="0">
                 <a:solidFill>
                   <a:srgbClr val="FF0000"/>
                 </a:solidFill>
@@ -9036,12 +10171,32 @@
   <p:clrMapOvr>
     <a:masterClrMapping/>
   </p:clrMapOvr>
+  <mc:AlternateContent xmlns:mc="http://schemas.openxmlformats.org/markup-compatibility/2006">
+    <mc:Choice xmlns:p14="http://schemas.microsoft.com/office/powerpoint/2010/main" Requires="p14">
+      <p:transition spd="slow" p14:dur="1500">
+        <p:split orient="vert"/>
+      </p:transition>
+    </mc:Choice>
+    <mc:Fallback>
+      <p:transition spd="slow">
+        <p:split orient="vert"/>
+      </p:transition>
+    </mc:Fallback>
+  </mc:AlternateContent>
 </p:sld>
 </file>
 
 <file path=ppt/slides/slide8.xml><?xml version="1.0" encoding="utf-8"?>
 <p:sld xmlns:a="http://schemas.openxmlformats.org/drawingml/2006/main" xmlns:r="http://schemas.openxmlformats.org/officeDocument/2006/relationships" xmlns:p="http://schemas.openxmlformats.org/presentationml/2006/main">
   <p:cSld>
+    <p:bg>
+      <p:bgPr>
+        <a:solidFill>
+          <a:srgbClr val="001746"/>
+        </a:solidFill>
+        <a:effectLst/>
+      </p:bgPr>
+    </p:bg>
     <p:spTree>
       <p:nvGrpSpPr>
         <p:cNvPr id="1" name="Shape 171"/>
@@ -9063,13 +10218,13 @@
             <a:spLocks noGrp="1"/>
           </p:cNvSpPr>
           <p:nvPr>
-            <p:ph type="ctrTitle"/>
+            <p:ph type="ctrTitle" idx="4294967295"/>
           </p:nvPr>
         </p:nvSpPr>
         <p:spPr>
           <a:xfrm>
-            <a:off x="924790" y="1697182"/>
-            <a:ext cx="7294419" cy="2052184"/>
+            <a:off x="925511" y="2053499"/>
+            <a:ext cx="7292975" cy="2052637"/>
           </a:xfrm>
           <a:prstGeom prst="rect">
             <a:avLst/>
@@ -9128,20 +10283,32 @@
           </p:cNvPicPr>
           <p:nvPr/>
         </p:nvPicPr>
-        <p:blipFill>
+        <p:blipFill rotWithShape="1">
           <a:blip r:embed="rId3"/>
-          <a:stretch>
-            <a:fillRect/>
-          </a:stretch>
+          <a:srcRect l="-1662" r="-2610"/>
+          <a:stretch/>
         </p:blipFill>
         <p:spPr>
           <a:xfrm>
-            <a:off x="2331102" y="619252"/>
-            <a:ext cx="4080013" cy="914324"/>
+            <a:off x="2464231" y="650249"/>
+            <a:ext cx="4254284" cy="914324"/>
           </a:xfrm>
-          <a:prstGeom prst="rect">
-            <a:avLst/>
+          <a:prstGeom prst="roundRect">
+            <a:avLst>
+              <a:gd name="adj" fmla="val 8594"/>
+            </a:avLst>
           </a:prstGeom>
+          <a:solidFill>
+            <a:srgbClr val="FFFFFF">
+              <a:shade val="85000"/>
+            </a:srgbClr>
+          </a:solidFill>
+          <a:ln>
+            <a:noFill/>
+          </a:ln>
+          <a:effectLst>
+            <a:reflection blurRad="12700" stA="38000" endPos="28000" dist="5000" dir="5400000" sy="-100000" algn="bl" rotWithShape="0"/>
+          </a:effectLst>
         </p:spPr>
       </p:pic>
     </p:spTree>
@@ -9154,12 +10321,32 @@
   <p:clrMapOvr>
     <a:masterClrMapping/>
   </p:clrMapOvr>
+  <mc:AlternateContent xmlns:mc="http://schemas.openxmlformats.org/markup-compatibility/2006">
+    <mc:Choice xmlns:p14="http://schemas.microsoft.com/office/powerpoint/2010/main" Requires="p14">
+      <p:transition spd="slow" p14:dur="1500">
+        <p:split orient="vert"/>
+      </p:transition>
+    </mc:Choice>
+    <mc:Fallback>
+      <p:transition spd="slow">
+        <p:split orient="vert"/>
+      </p:transition>
+    </mc:Fallback>
+  </mc:AlternateContent>
 </p:sld>
 </file>
 
 <file path=ppt/slides/slide9.xml><?xml version="1.0" encoding="utf-8"?>
 <p:sld xmlns:a="http://schemas.openxmlformats.org/drawingml/2006/main" xmlns:r="http://schemas.openxmlformats.org/officeDocument/2006/relationships" xmlns:p="http://schemas.openxmlformats.org/presentationml/2006/main">
   <p:cSld>
+    <p:bg>
+      <p:bgPr>
+        <a:solidFill>
+          <a:srgbClr val="001746"/>
+        </a:solidFill>
+        <a:effectLst/>
+      </p:bgPr>
+    </p:bg>
     <p:spTree>
       <p:nvGrpSpPr>
         <p:cNvPr id="1" name="Shape 184"/>
@@ -9181,13 +10368,13 @@
             <a:spLocks noGrp="1"/>
           </p:cNvSpPr>
           <p:nvPr>
-            <p:ph type="title" idx="6"/>
+            <p:ph type="title" idx="4294967295"/>
           </p:nvPr>
         </p:nvSpPr>
         <p:spPr>
           <a:xfrm>
-            <a:off x="678873" y="119210"/>
-            <a:ext cx="6566265" cy="599650"/>
+            <a:off x="1570667" y="118785"/>
+            <a:ext cx="5282231" cy="600075"/>
           </a:xfrm>
           <a:prstGeom prst="rect">
             <a:avLst/>
@@ -9209,11 +10396,15 @@
               <a:buNone/>
             </a:pPr>
             <a:r>
-              <a:rPr lang="ru-RU" dirty="0"/>
+              <a:rPr lang="ru-RU" b="1" u="sng" dirty="0">
+                <a:solidFill>
+                  <a:srgbClr val="FF0000"/>
+                </a:solidFill>
+              </a:rPr>
               <a:t>Какие возможности предоставляет:</a:t>
             </a:r>
             <a:br>
-              <a:rPr lang="ru-RU" dirty="0"/>
+              <a:rPr lang="ru-RU" b="1" u="sng" dirty="0"/>
             </a:br>
             <a:r>
               <a:rPr lang="ru-RU" dirty="0">
@@ -9245,8 +10436,8 @@
         </p:nvSpPr>
         <p:spPr>
           <a:xfrm>
-            <a:off x="678874" y="718860"/>
-            <a:ext cx="7065818" cy="4401205"/>
+            <a:off x="441434" y="718860"/>
+            <a:ext cx="7070835" cy="4401205"/>
           </a:xfrm>
           <a:prstGeom prst="rect">
             <a:avLst/>
@@ -9513,6 +10704,18 @@
   <p:clrMapOvr>
     <a:masterClrMapping/>
   </p:clrMapOvr>
+  <mc:AlternateContent xmlns:mc="http://schemas.openxmlformats.org/markup-compatibility/2006">
+    <mc:Choice xmlns:p14="http://schemas.microsoft.com/office/powerpoint/2010/main" Requires="p14">
+      <p:transition spd="slow" p14:dur="1500">
+        <p:split orient="vert"/>
+      </p:transition>
+    </mc:Choice>
+    <mc:Fallback>
+      <p:transition spd="slow">
+        <p:split orient="vert"/>
+      </p:transition>
+    </mc:Fallback>
+  </mc:AlternateContent>
 </p:sld>
 </file>
 

</xml_diff>

<commit_message>
Corrected comments from Ilya
</commit_message>
<xml_diff>
--- a/Redmine.pptx
+++ b/Redmine.pptx
@@ -5,7 +5,7 @@
     <p:sldMasterId id="2147483673" r:id="rId1"/>
   </p:sldMasterIdLst>
   <p:notesMasterIdLst>
-    <p:notesMasterId r:id="rId15"/>
+    <p:notesMasterId r:id="rId12"/>
   </p:notesMasterIdLst>
   <p:sldIdLst>
     <p:sldId id="319" r:id="rId2"/>
@@ -14,40 +14,37 @@
     <p:sldId id="306" r:id="rId5"/>
     <p:sldId id="313" r:id="rId6"/>
     <p:sldId id="314" r:id="rId7"/>
-    <p:sldId id="307" r:id="rId8"/>
-    <p:sldId id="316" r:id="rId9"/>
-    <p:sldId id="258" r:id="rId10"/>
-    <p:sldId id="317" r:id="rId11"/>
-    <p:sldId id="308" r:id="rId12"/>
-    <p:sldId id="309" r:id="rId13"/>
-    <p:sldId id="318" r:id="rId14"/>
+    <p:sldId id="316" r:id="rId8"/>
+    <p:sldId id="307" r:id="rId9"/>
+    <p:sldId id="317" r:id="rId10"/>
+    <p:sldId id="318" r:id="rId11"/>
   </p:sldIdLst>
   <p:sldSz cx="9144000" cy="5143500" type="screen16x9"/>
   <p:notesSz cx="6858000" cy="9144000"/>
   <p:embeddedFontLst>
     <p:embeddedFont>
       <p:font typeface="Frank Ruhl Libre Medium" panose="00000600000000000000" pitchFamily="2" charset="-79"/>
-      <p:regular r:id="rId16"/>
-      <p:bold r:id="rId17"/>
+      <p:regular r:id="rId13"/>
+      <p:bold r:id="rId14"/>
     </p:embeddedFont>
     <p:embeddedFont>
       <p:font typeface="Lato Light" panose="020F0502020204030203" pitchFamily="34" charset="0"/>
-      <p:regular r:id="rId18"/>
-      <p:bold r:id="rId19"/>
-      <p:italic r:id="rId20"/>
-      <p:boldItalic r:id="rId21"/>
+      <p:regular r:id="rId15"/>
+      <p:bold r:id="rId16"/>
+      <p:italic r:id="rId17"/>
+      <p:boldItalic r:id="rId18"/>
     </p:embeddedFont>
     <p:embeddedFont>
       <p:font typeface="Oswald Medium" panose="00000600000000000000" pitchFamily="2" charset="-52"/>
-      <p:regular r:id="rId22"/>
-      <p:bold r:id="rId23"/>
+      <p:regular r:id="rId19"/>
+      <p:bold r:id="rId20"/>
     </p:embeddedFont>
     <p:embeddedFont>
       <p:font typeface="Roboto" panose="02000000000000000000" pitchFamily="2" charset="0"/>
-      <p:regular r:id="rId24"/>
-      <p:bold r:id="rId25"/>
-      <p:italic r:id="rId26"/>
-      <p:boldItalic r:id="rId27"/>
+      <p:regular r:id="rId21"/>
+      <p:bold r:id="rId22"/>
+      <p:italic r:id="rId23"/>
+      <p:boldItalic r:id="rId24"/>
     </p:embeddedFont>
   </p:embeddedFontLst>
   <p:defaultTextStyle>
@@ -939,110 +936,6 @@
         <p14:creationId xmlns:p14="http://schemas.microsoft.com/office/powerpoint/2010/main" val="577799347"/>
       </p:ext>
     </p:extLst>
-  </p:cSld>
-  <p:clrMapOvr>
-    <a:masterClrMapping/>
-  </p:clrMapOvr>
-</p:notes>
-</file>
-
-<file path=ppt/notesSlides/notesSlide3.xml><?xml version="1.0" encoding="utf-8"?>
-<p:notes xmlns:a="http://schemas.openxmlformats.org/drawingml/2006/main" xmlns:r="http://schemas.openxmlformats.org/officeDocument/2006/relationships" xmlns:p="http://schemas.openxmlformats.org/presentationml/2006/main" showMasterSp="0" showMasterPhAnim="0">
-  <p:cSld>
-    <p:spTree>
-      <p:nvGrpSpPr>
-        <p:cNvPr id="1" name="Shape 181"/>
-        <p:cNvGrpSpPr/>
-        <p:nvPr/>
-      </p:nvGrpSpPr>
-      <p:grpSpPr>
-        <a:xfrm>
-          <a:off x="0" y="0"/>
-          <a:ext cx="0" cy="0"/>
-          <a:chOff x="0" y="0"/>
-          <a:chExt cx="0" cy="0"/>
-        </a:xfrm>
-      </p:grpSpPr>
-      <p:sp>
-        <p:nvSpPr>
-          <p:cNvPr id="182" name="Google Shape;182;gaf340c683e_0_138:notes"/>
-          <p:cNvSpPr>
-            <a:spLocks noGrp="1" noRot="1" noChangeAspect="1"/>
-          </p:cNvSpPr>
-          <p:nvPr>
-            <p:ph type="sldImg" idx="2"/>
-          </p:nvPr>
-        </p:nvSpPr>
-        <p:spPr>
-          <a:xfrm>
-            <a:off x="381000" y="685800"/>
-            <a:ext cx="6096000" cy="3429000"/>
-          </a:xfrm>
-          <a:custGeom>
-            <a:avLst/>
-            <a:gdLst/>
-            <a:ahLst/>
-            <a:cxnLst/>
-            <a:rect l="l" t="t" r="r" b="b"/>
-            <a:pathLst>
-              <a:path w="120000" h="120000" extrusionOk="0">
-                <a:moveTo>
-                  <a:pt x="0" y="0"/>
-                </a:moveTo>
-                <a:lnTo>
-                  <a:pt x="120000" y="0"/>
-                </a:lnTo>
-                <a:lnTo>
-                  <a:pt x="120000" y="120000"/>
-                </a:lnTo>
-                <a:lnTo>
-                  <a:pt x="0" y="120000"/>
-                </a:lnTo>
-                <a:close/>
-              </a:path>
-            </a:pathLst>
-          </a:custGeom>
-        </p:spPr>
-      </p:sp>
-      <p:sp>
-        <p:nvSpPr>
-          <p:cNvPr id="183" name="Google Shape;183;gaf340c683e_0_138:notes"/>
-          <p:cNvSpPr txBox="1">
-            <a:spLocks noGrp="1"/>
-          </p:cNvSpPr>
-          <p:nvPr>
-            <p:ph type="body" idx="1"/>
-          </p:nvPr>
-        </p:nvSpPr>
-        <p:spPr>
-          <a:xfrm>
-            <a:off x="685800" y="4343400"/>
-            <a:ext cx="5486400" cy="4114800"/>
-          </a:xfrm>
-          <a:prstGeom prst="rect">
-            <a:avLst/>
-          </a:prstGeom>
-        </p:spPr>
-        <p:txBody>
-          <a:bodyPr spcFirstLastPara="1" wrap="square" lIns="91425" tIns="91425" rIns="91425" bIns="91425" anchor="t" anchorCtr="0">
-            <a:noAutofit/>
-          </a:bodyPr>
-          <a:lstStyle/>
-          <a:p>
-            <a:pPr marL="0" lvl="0" indent="0" algn="l" rtl="0">
-              <a:spcBef>
-                <a:spcPts val="0"/>
-              </a:spcBef>
-              <a:spcAft>
-                <a:spcPts val="0"/>
-              </a:spcAft>
-              <a:buNone/>
-            </a:pPr>
-            <a:endParaRPr/>
-          </a:p>
-        </p:txBody>
-      </p:sp>
-    </p:spTree>
   </p:cSld>
   <p:clrMapOvr>
     <a:masterClrMapping/>
@@ -7041,13 +6934,13 @@
   <p:clrMapOvr>
     <a:masterClrMapping/>
   </p:clrMapOvr>
-  <mc:AlternateContent xmlns:mc="http://schemas.openxmlformats.org/markup-compatibility/2006">
-    <mc:Choice xmlns:p14="http://schemas.microsoft.com/office/powerpoint/2010/main" Requires="p14">
+  <mc:AlternateContent xmlns:mc="http://schemas.openxmlformats.org/markup-compatibility/2006" xmlns:p14="http://schemas.microsoft.com/office/powerpoint/2010/main">
+    <mc:Choice Requires="p14">
       <p:transition spd="slow" p14:dur="1500">
         <p:split orient="vert"/>
       </p:transition>
     </mc:Choice>
-    <mc:Fallback>
+    <mc:Fallback xmlns="">
       <p:transition spd="slow">
         <p:split orient="vert"/>
       </p:transition>
@@ -7057,1059 +6950,6 @@
 </file>
 
 <file path=ppt/slides/slide10.xml><?xml version="1.0" encoding="utf-8"?>
-<p:sld xmlns:a="http://schemas.openxmlformats.org/drawingml/2006/main" xmlns:r="http://schemas.openxmlformats.org/officeDocument/2006/relationships" xmlns:p="http://schemas.openxmlformats.org/presentationml/2006/main">
-  <p:cSld>
-    <p:bg>
-      <p:bgPr>
-        <a:solidFill>
-          <a:srgbClr val="001746"/>
-        </a:solidFill>
-        <a:effectLst/>
-      </p:bgPr>
-    </p:bg>
-    <p:spTree>
-      <p:nvGrpSpPr>
-        <p:cNvPr id="1" name=""/>
-        <p:cNvGrpSpPr/>
-        <p:nvPr/>
-      </p:nvGrpSpPr>
-      <p:grpSpPr>
-        <a:xfrm>
-          <a:off x="0" y="0"/>
-          <a:ext cx="0" cy="0"/>
-          <a:chOff x="0" y="0"/>
-          <a:chExt cx="0" cy="0"/>
-        </a:xfrm>
-      </p:grpSpPr>
-      <p:pic>
-        <p:nvPicPr>
-          <p:cNvPr id="16" name="Рисунок 15">
-            <a:extLst>
-              <a:ext uri="{FF2B5EF4-FFF2-40B4-BE49-F238E27FC236}">
-                <a16:creationId xmlns:a16="http://schemas.microsoft.com/office/drawing/2014/main" id="{2658361C-E6CE-4EDF-9B28-B05BF78D3ADA}"/>
-              </a:ext>
-            </a:extLst>
-          </p:cNvPr>
-          <p:cNvPicPr>
-            <a:picLocks noChangeAspect="1"/>
-          </p:cNvPicPr>
-          <p:nvPr/>
-        </p:nvPicPr>
-        <p:blipFill>
-          <a:blip r:embed="rId2"/>
-          <a:stretch>
-            <a:fillRect/>
-          </a:stretch>
-        </p:blipFill>
-        <p:spPr>
-          <a:xfrm>
-            <a:off x="0" y="0"/>
-            <a:ext cx="9143999" cy="5143500"/>
-          </a:xfrm>
-          <a:prstGeom prst="rect">
-            <a:avLst/>
-          </a:prstGeom>
-        </p:spPr>
-      </p:pic>
-    </p:spTree>
-    <p:extLst>
-      <p:ext uri="{BB962C8B-B14F-4D97-AF65-F5344CB8AC3E}">
-        <p14:creationId xmlns:p14="http://schemas.microsoft.com/office/powerpoint/2010/main" val="2277270073"/>
-      </p:ext>
-    </p:extLst>
-  </p:cSld>
-  <p:clrMapOvr>
-    <a:masterClrMapping/>
-  </p:clrMapOvr>
-  <mc:AlternateContent xmlns:mc="http://schemas.openxmlformats.org/markup-compatibility/2006">
-    <mc:Choice xmlns:p14="http://schemas.microsoft.com/office/powerpoint/2010/main" Requires="p14">
-      <p:transition spd="slow" p14:dur="1500">
-        <p:split orient="vert"/>
-      </p:transition>
-    </mc:Choice>
-    <mc:Fallback>
-      <p:transition spd="slow">
-        <p:split orient="vert"/>
-      </p:transition>
-    </mc:Fallback>
-  </mc:AlternateContent>
-</p:sld>
-</file>
-
-<file path=ppt/slides/slide11.xml><?xml version="1.0" encoding="utf-8"?>
-<p:sld xmlns:a="http://schemas.openxmlformats.org/drawingml/2006/main" xmlns:r="http://schemas.openxmlformats.org/officeDocument/2006/relationships" xmlns:p="http://schemas.openxmlformats.org/presentationml/2006/main">
-  <p:cSld>
-    <p:bg>
-      <p:bgPr>
-        <a:solidFill>
-          <a:srgbClr val="001746"/>
-        </a:solidFill>
-        <a:effectLst/>
-      </p:bgPr>
-    </p:bg>
-    <p:spTree>
-      <p:nvGrpSpPr>
-        <p:cNvPr id="1" name=""/>
-        <p:cNvGrpSpPr/>
-        <p:nvPr/>
-      </p:nvGrpSpPr>
-      <p:grpSpPr>
-        <a:xfrm>
-          <a:off x="0" y="0"/>
-          <a:ext cx="0" cy="0"/>
-          <a:chOff x="0" y="0"/>
-          <a:chExt cx="0" cy="0"/>
-        </a:xfrm>
-      </p:grpSpPr>
-      <p:sp>
-        <p:nvSpPr>
-          <p:cNvPr id="8" name="Заголовок 7">
-            <a:extLst>
-              <a:ext uri="{FF2B5EF4-FFF2-40B4-BE49-F238E27FC236}">
-                <a16:creationId xmlns:a16="http://schemas.microsoft.com/office/drawing/2014/main" id="{18187F5A-5661-4E75-AD3A-ADCE96AAAEB8}"/>
-              </a:ext>
-            </a:extLst>
-          </p:cNvPr>
-          <p:cNvSpPr>
-            <a:spLocks noGrp="1"/>
-          </p:cNvSpPr>
-          <p:nvPr>
-            <p:ph type="title" idx="4294967295"/>
-          </p:nvPr>
-        </p:nvSpPr>
-        <p:spPr>
-          <a:xfrm>
-            <a:off x="416273" y="0"/>
-            <a:ext cx="1909141" cy="615950"/>
-          </a:xfrm>
-        </p:spPr>
-        <p:txBody>
-          <a:bodyPr/>
-          <a:lstStyle/>
-          <a:p>
-            <a:r>
-              <a:rPr lang="ru-RU" b="1" u="sng" dirty="0">
-                <a:solidFill>
-                  <a:srgbClr val="FF0000"/>
-                </a:solidFill>
-              </a:rPr>
-              <a:t>Работа с </a:t>
-            </a:r>
-            <a:r>
-              <a:rPr lang="en-US" b="1" u="sng" dirty="0">
-                <a:solidFill>
-                  <a:srgbClr val="FF0000"/>
-                </a:solidFill>
-              </a:rPr>
-              <a:t>Git</a:t>
-            </a:r>
-            <a:endParaRPr lang="ru-RU" b="1" u="sng" dirty="0">
-              <a:solidFill>
-                <a:srgbClr val="FF0000"/>
-              </a:solidFill>
-            </a:endParaRPr>
-          </a:p>
-        </p:txBody>
-      </p:sp>
-      <p:sp>
-        <p:nvSpPr>
-          <p:cNvPr id="13" name="Заголовок 12">
-            <a:extLst>
-              <a:ext uri="{FF2B5EF4-FFF2-40B4-BE49-F238E27FC236}">
-                <a16:creationId xmlns:a16="http://schemas.microsoft.com/office/drawing/2014/main" id="{AB1CCBB2-AC24-4788-A39D-99576E92AE69}"/>
-              </a:ext>
-            </a:extLst>
-          </p:cNvPr>
-          <p:cNvSpPr>
-            <a:spLocks noGrp="1"/>
-          </p:cNvSpPr>
-          <p:nvPr>
-            <p:ph type="title" idx="4294967295"/>
-          </p:nvPr>
-        </p:nvSpPr>
-        <p:spPr>
-          <a:xfrm>
-            <a:off x="416274" y="472966"/>
-            <a:ext cx="7113722" cy="4468922"/>
-          </a:xfrm>
-        </p:spPr>
-        <p:txBody>
-          <a:bodyPr/>
-          <a:lstStyle/>
-          <a:p>
-            <a:pPr algn="l"/>
-            <a:r>
-              <a:rPr lang="ru-RU" sz="1900" dirty="0">
-                <a:solidFill>
-                  <a:schemeClr val="bg1"/>
-                </a:solidFill>
-              </a:rPr>
-              <a:t>Основные команды :</a:t>
-            </a:r>
-            <a:br>
-              <a:rPr lang="en-US" sz="1900" dirty="0">
-                <a:solidFill>
-                  <a:schemeClr val="bg1"/>
-                </a:solidFill>
-              </a:rPr>
-            </a:br>
-            <a:r>
-              <a:rPr lang="en-US" sz="1800" dirty="0">
-                <a:solidFill>
-                  <a:schemeClr val="bg1"/>
-                </a:solidFill>
-              </a:rPr>
-              <a:t>1. git </a:t>
-            </a:r>
-            <a:r>
-              <a:rPr lang="en-US" sz="1800" dirty="0" err="1">
-                <a:solidFill>
-                  <a:schemeClr val="bg1"/>
-                </a:solidFill>
-              </a:rPr>
-              <a:t>init</a:t>
-            </a:r>
-            <a:r>
-              <a:rPr lang="en-US" sz="1800" dirty="0">
-                <a:solidFill>
-                  <a:schemeClr val="bg1"/>
-                </a:solidFill>
-              </a:rPr>
-              <a:t> – </a:t>
-            </a:r>
-            <a:r>
-              <a:rPr lang="ru-RU" sz="1800" dirty="0">
-                <a:solidFill>
-                  <a:schemeClr val="bg1"/>
-                </a:solidFill>
-              </a:rPr>
-              <a:t>инициализация </a:t>
-            </a:r>
-            <a:r>
-              <a:rPr lang="en-US" sz="1800" dirty="0">
-                <a:solidFill>
-                  <a:schemeClr val="bg1"/>
-                </a:solidFill>
-              </a:rPr>
-              <a:t>Git</a:t>
-            </a:r>
-            <a:r>
-              <a:rPr lang="ru-RU" sz="1800" dirty="0">
-                <a:solidFill>
-                  <a:schemeClr val="bg1"/>
-                </a:solidFill>
-              </a:rPr>
-              <a:t>-репозитория</a:t>
-            </a:r>
-            <a:br>
-              <a:rPr lang="ru-RU" sz="1800" dirty="0">
-                <a:solidFill>
-                  <a:schemeClr val="bg1"/>
-                </a:solidFill>
-              </a:rPr>
-            </a:br>
-            <a:r>
-              <a:rPr lang="en-US" sz="1800" dirty="0">
-                <a:solidFill>
-                  <a:schemeClr val="bg1"/>
-                </a:solidFill>
-              </a:rPr>
-              <a:t>2</a:t>
-            </a:r>
-            <a:r>
-              <a:rPr lang="ru-RU" sz="1800" dirty="0">
-                <a:solidFill>
-                  <a:schemeClr val="bg1"/>
-                </a:solidFill>
-              </a:rPr>
-              <a:t>. </a:t>
-            </a:r>
-            <a:r>
-              <a:rPr lang="en-US" sz="1800" dirty="0">
-                <a:solidFill>
-                  <a:schemeClr val="bg1"/>
-                </a:solidFill>
-              </a:rPr>
-              <a:t>git add . – </a:t>
-            </a:r>
-            <a:r>
-              <a:rPr lang="ru-RU" sz="1800" dirty="0">
-                <a:solidFill>
-                  <a:schemeClr val="bg1"/>
-                </a:solidFill>
-              </a:rPr>
-              <a:t>сборка слепка следующего коммита</a:t>
-            </a:r>
-            <a:br>
-              <a:rPr lang="en-US" sz="1800" dirty="0">
-                <a:solidFill>
-                  <a:schemeClr val="bg1"/>
-                </a:solidFill>
-              </a:rPr>
-            </a:br>
-            <a:r>
-              <a:rPr lang="en-US" sz="1800" dirty="0">
-                <a:solidFill>
-                  <a:schemeClr val="bg1"/>
-                </a:solidFill>
-              </a:rPr>
-              <a:t>3. git commit - </a:t>
-            </a:r>
-            <a:r>
-              <a:rPr lang="ru-RU" sz="1800" dirty="0">
-                <a:solidFill>
-                  <a:schemeClr val="bg1"/>
-                </a:solidFill>
-              </a:rPr>
-              <a:t>сохраняет слепок во внутренней базе данных</a:t>
-            </a:r>
-            <a:br>
-              <a:rPr lang="ru-RU" sz="1800" dirty="0">
-                <a:solidFill>
-                  <a:schemeClr val="bg1"/>
-                </a:solidFill>
-              </a:rPr>
-            </a:br>
-            <a:r>
-              <a:rPr lang="en-US" sz="1800" dirty="0">
-                <a:solidFill>
-                  <a:schemeClr val="bg1"/>
-                </a:solidFill>
-              </a:rPr>
-              <a:t>4. git status – </a:t>
-            </a:r>
-            <a:r>
-              <a:rPr lang="ru-RU" sz="1800" dirty="0">
-                <a:solidFill>
-                  <a:schemeClr val="bg1"/>
-                </a:solidFill>
-              </a:rPr>
-              <a:t>показывает статус рабочего каталога (дерева)</a:t>
-            </a:r>
-            <a:br>
-              <a:rPr lang="en-US" sz="1800" dirty="0">
-                <a:solidFill>
-                  <a:schemeClr val="bg1"/>
-                </a:solidFill>
-              </a:rPr>
-            </a:br>
-            <a:r>
-              <a:rPr lang="ru-RU" sz="1800" dirty="0">
-                <a:solidFill>
-                  <a:schemeClr val="bg1"/>
-                </a:solidFill>
-              </a:rPr>
-              <a:t>5</a:t>
-            </a:r>
-            <a:r>
-              <a:rPr lang="en-US" sz="1800" dirty="0">
-                <a:solidFill>
-                  <a:schemeClr val="bg1"/>
-                </a:solidFill>
-              </a:rPr>
-              <a:t>. git push</a:t>
-            </a:r>
-            <a:r>
-              <a:rPr lang="ru-RU" sz="1800" dirty="0">
-                <a:solidFill>
-                  <a:schemeClr val="bg1"/>
-                </a:solidFill>
-              </a:rPr>
-              <a:t> – получение и интеграция с другим репозиторием или локальным</a:t>
-            </a:r>
-            <a:br>
-              <a:rPr lang="en-US" sz="1800" dirty="0">
-                <a:solidFill>
-                  <a:schemeClr val="bg1"/>
-                </a:solidFill>
-              </a:rPr>
-            </a:br>
-            <a:r>
-              <a:rPr lang="ru-RU" sz="1800" dirty="0">
-                <a:solidFill>
-                  <a:schemeClr val="bg1"/>
-                </a:solidFill>
-              </a:rPr>
-              <a:t>6</a:t>
-            </a:r>
-            <a:r>
-              <a:rPr lang="en-US" sz="1800" dirty="0">
-                <a:solidFill>
-                  <a:schemeClr val="bg1"/>
-                </a:solidFill>
-              </a:rPr>
-              <a:t>. git pull - </a:t>
-            </a:r>
-            <a:r>
-              <a:rPr lang="ru-RU" sz="1800" dirty="0">
-                <a:solidFill>
-                  <a:schemeClr val="bg1"/>
-                </a:solidFill>
-              </a:rPr>
-              <a:t> обновите удаленные ссылки вместе со связанными объектами</a:t>
-            </a:r>
-            <a:br>
-              <a:rPr lang="en-US" sz="1800" dirty="0">
-                <a:solidFill>
-                  <a:schemeClr val="bg1"/>
-                </a:solidFill>
-              </a:rPr>
-            </a:br>
-            <a:r>
-              <a:rPr lang="ru-RU" sz="1800" dirty="0">
-                <a:solidFill>
-                  <a:schemeClr val="bg1"/>
-                </a:solidFill>
-              </a:rPr>
-              <a:t>7</a:t>
-            </a:r>
-            <a:r>
-              <a:rPr lang="en-US" sz="1800" dirty="0">
-                <a:solidFill>
-                  <a:schemeClr val="bg1"/>
-                </a:solidFill>
-              </a:rPr>
-              <a:t>. git branch “</a:t>
-            </a:r>
-            <a:r>
-              <a:rPr lang="en-US" sz="1800" dirty="0" err="1">
-                <a:solidFill>
-                  <a:schemeClr val="bg1"/>
-                </a:solidFill>
-              </a:rPr>
-              <a:t>NameBranch</a:t>
-            </a:r>
-            <a:r>
-              <a:rPr lang="en-US" sz="1800" dirty="0">
-                <a:solidFill>
-                  <a:schemeClr val="bg1"/>
-                </a:solidFill>
-              </a:rPr>
-              <a:t>”- </a:t>
-            </a:r>
-            <a:r>
-              <a:rPr lang="ru-RU" sz="1800" dirty="0">
-                <a:solidFill>
-                  <a:schemeClr val="bg1"/>
-                </a:solidFill>
-              </a:rPr>
-              <a:t>создание новой ветки</a:t>
-            </a:r>
-            <a:br>
-              <a:rPr lang="en-US" sz="1800" dirty="0">
-                <a:solidFill>
-                  <a:schemeClr val="bg1"/>
-                </a:solidFill>
-              </a:rPr>
-            </a:br>
-            <a:r>
-              <a:rPr lang="en-US" sz="1800" dirty="0">
-                <a:solidFill>
-                  <a:schemeClr val="bg1"/>
-                </a:solidFill>
-              </a:rPr>
-              <a:t>8. git branch – </a:t>
-            </a:r>
-            <a:r>
-              <a:rPr lang="ru-RU" sz="1800" dirty="0">
-                <a:solidFill>
-                  <a:schemeClr val="bg1"/>
-                </a:solidFill>
-              </a:rPr>
-              <a:t>просмотр веток и в какой находишься </a:t>
-            </a:r>
-            <a:br>
-              <a:rPr lang="en-US" sz="1800" dirty="0">
-                <a:solidFill>
-                  <a:schemeClr val="bg1"/>
-                </a:solidFill>
-              </a:rPr>
-            </a:br>
-            <a:r>
-              <a:rPr lang="ru-RU" sz="1800" dirty="0">
-                <a:solidFill>
-                  <a:schemeClr val="bg1"/>
-                </a:solidFill>
-              </a:rPr>
-              <a:t>8</a:t>
-            </a:r>
-            <a:r>
-              <a:rPr lang="en-US" sz="1800" dirty="0">
-                <a:solidFill>
-                  <a:schemeClr val="bg1"/>
-                </a:solidFill>
-              </a:rPr>
-              <a:t>. git checkout “</a:t>
-            </a:r>
-            <a:r>
-              <a:rPr lang="en-US" sz="1800" dirty="0" err="1">
-                <a:solidFill>
-                  <a:schemeClr val="bg1"/>
-                </a:solidFill>
-              </a:rPr>
-              <a:t>NameBranch</a:t>
-            </a:r>
-            <a:r>
-              <a:rPr lang="en-US" sz="1800" dirty="0">
-                <a:solidFill>
-                  <a:schemeClr val="bg1"/>
-                </a:solidFill>
-              </a:rPr>
-              <a:t>”-</a:t>
-            </a:r>
-            <a:r>
-              <a:rPr lang="ru-RU" sz="1800" dirty="0">
-                <a:solidFill>
-                  <a:schemeClr val="bg1"/>
-                </a:solidFill>
-              </a:rPr>
-              <a:t> переключение между ветками </a:t>
-            </a:r>
-            <a:br>
-              <a:rPr lang="en-US" sz="1800" dirty="0">
-                <a:solidFill>
-                  <a:schemeClr val="bg1"/>
-                </a:solidFill>
-              </a:rPr>
-            </a:br>
-            <a:r>
-              <a:rPr lang="ru-RU" sz="1800" dirty="0">
-                <a:solidFill>
-                  <a:schemeClr val="bg1"/>
-                </a:solidFill>
-              </a:rPr>
-              <a:t>9</a:t>
-            </a:r>
-            <a:r>
-              <a:rPr lang="en-US" sz="1800" dirty="0">
-                <a:solidFill>
-                  <a:schemeClr val="bg1"/>
-                </a:solidFill>
-              </a:rPr>
-              <a:t>.</a:t>
-            </a:r>
-            <a:r>
-              <a:rPr lang="ru-RU" sz="1800" dirty="0">
-                <a:solidFill>
-                  <a:schemeClr val="bg1"/>
-                </a:solidFill>
-              </a:rPr>
-              <a:t> </a:t>
-            </a:r>
-            <a:r>
-              <a:rPr lang="en-US" sz="1800" dirty="0">
-                <a:solidFill>
-                  <a:schemeClr val="bg1"/>
-                </a:solidFill>
-              </a:rPr>
-              <a:t>git clone </a:t>
-            </a:r>
-            <a:r>
-              <a:rPr lang="en-US" sz="1800" dirty="0">
-                <a:solidFill>
-                  <a:schemeClr val="bg1"/>
-                </a:solidFill>
-                <a:hlinkClick r:id="rId2">
-                  <a:extLst>
-                    <a:ext uri="{A12FA001-AC4F-418D-AE19-62706E023703}">
-                      <ahyp:hlinkClr xmlns:ahyp="http://schemas.microsoft.com/office/drawing/2018/hyperlinkcolor" val="tx"/>
-                    </a:ext>
-                  </a:extLst>
-                </a:hlinkClick>
-              </a:rPr>
-              <a:t>https://github.com/testrepo/dev.git</a:t>
-            </a:r>
-            <a:r>
-              <a:rPr lang="en-US" sz="1800" dirty="0">
-                <a:solidFill>
-                  <a:schemeClr val="bg1"/>
-                </a:solidFill>
-              </a:rPr>
-              <a:t> - </a:t>
-            </a:r>
-            <a:r>
-              <a:rPr lang="ru-RU" sz="1800" dirty="0">
-                <a:solidFill>
-                  <a:schemeClr val="bg1"/>
-                </a:solidFill>
-              </a:rPr>
-              <a:t>клонирование всей ветки </a:t>
-            </a:r>
-            <a:br>
-              <a:rPr lang="ru-RU" sz="1800" dirty="0">
-                <a:solidFill>
-                  <a:schemeClr val="bg1"/>
-                </a:solidFill>
-              </a:rPr>
-            </a:br>
-            <a:r>
-              <a:rPr lang="ru-RU" sz="1800" dirty="0">
-                <a:solidFill>
-                  <a:schemeClr val="bg1"/>
-                </a:solidFill>
-              </a:rPr>
-              <a:t>10. </a:t>
-            </a:r>
-            <a:r>
-              <a:rPr lang="en-US" sz="1800" dirty="0">
-                <a:solidFill>
-                  <a:schemeClr val="bg1"/>
-                </a:solidFill>
-              </a:rPr>
-              <a:t>git reset – </a:t>
-            </a:r>
-            <a:r>
-              <a:rPr lang="ru-RU" sz="1800" dirty="0">
-                <a:solidFill>
-                  <a:schemeClr val="bg1"/>
-                </a:solidFill>
-              </a:rPr>
-              <a:t>отменяет изменения, лучше использовать для локальных  изменений</a:t>
-            </a:r>
-            <a:br>
-              <a:rPr lang="ru-RU" sz="1800" dirty="0">
-                <a:solidFill>
-                  <a:schemeClr val="bg1"/>
-                </a:solidFill>
-              </a:rPr>
-            </a:br>
-            <a:r>
-              <a:rPr lang="ru-RU" sz="1800" dirty="0">
-                <a:solidFill>
-                  <a:schemeClr val="bg1"/>
-                </a:solidFill>
-              </a:rPr>
-              <a:t>11. </a:t>
-            </a:r>
-            <a:r>
-              <a:rPr lang="en-US" sz="1800" dirty="0">
-                <a:solidFill>
-                  <a:schemeClr val="bg1"/>
-                </a:solidFill>
-              </a:rPr>
-              <a:t>git revert --hard “028fd209ed” - </a:t>
-            </a:r>
-            <a:r>
-              <a:rPr lang="ru-RU" sz="1800" dirty="0">
-                <a:solidFill>
-                  <a:schemeClr val="bg1"/>
-                </a:solidFill>
-              </a:rPr>
-              <a:t>отменяет изменения, лучше использовать для публичных изменений </a:t>
-            </a:r>
-            <a:endParaRPr lang="ru-RU" sz="1900" dirty="0">
-              <a:solidFill>
-                <a:schemeClr val="bg1"/>
-              </a:solidFill>
-            </a:endParaRPr>
-          </a:p>
-        </p:txBody>
-      </p:sp>
-      <p:pic>
-        <p:nvPicPr>
-          <p:cNvPr id="2050" name="Picture 2" descr="Введение в Git: от установки до основных команд">
-            <a:extLst>
-              <a:ext uri="{FF2B5EF4-FFF2-40B4-BE49-F238E27FC236}">
-                <a16:creationId xmlns:a16="http://schemas.microsoft.com/office/drawing/2014/main" id="{19501F41-1EC4-4307-AF4D-0DBDBDC0DCDE}"/>
-              </a:ext>
-            </a:extLst>
-          </p:cNvPr>
-          <p:cNvPicPr>
-            <a:picLocks noChangeAspect="1" noChangeArrowheads="1"/>
-          </p:cNvPicPr>
-          <p:nvPr/>
-        </p:nvPicPr>
-        <p:blipFill>
-          <a:blip r:embed="rId3">
-            <a:extLst>
-              <a:ext uri="{28A0092B-C50C-407E-A947-70E740481C1C}">
-                <a14:useLocalDpi xmlns:a14="http://schemas.microsoft.com/office/drawing/2010/main" val="0"/>
-              </a:ext>
-            </a:extLst>
-          </a:blip>
-          <a:srcRect/>
-          <a:stretch>
-            <a:fillRect/>
-          </a:stretch>
-        </p:blipFill>
-        <p:spPr bwMode="auto">
-          <a:xfrm>
-            <a:off x="6822939" y="855881"/>
-            <a:ext cx="1414113" cy="1414113"/>
-          </a:xfrm>
-          <a:prstGeom prst="roundRect">
-            <a:avLst>
-              <a:gd name="adj" fmla="val 8594"/>
-            </a:avLst>
-          </a:prstGeom>
-          <a:solidFill>
-            <a:srgbClr val="FFFFFF">
-              <a:shade val="85000"/>
-            </a:srgbClr>
-          </a:solidFill>
-          <a:ln>
-            <a:noFill/>
-          </a:ln>
-          <a:effectLst>
-            <a:reflection blurRad="12700" stA="38000" endPos="28000" dist="5000" dir="5400000" sy="-100000" algn="bl" rotWithShape="0"/>
-          </a:effectLst>
-          <a:extLst>
-            <a:ext uri="{909E8E84-426E-40DD-AFC4-6F175D3DCCD1}">
-              <a14:hiddenFill xmlns:a14="http://schemas.microsoft.com/office/drawing/2010/main">
-                <a:solidFill>
-                  <a:srgbClr val="FFFFFF"/>
-                </a:solidFill>
-              </a14:hiddenFill>
-            </a:ext>
-          </a:extLst>
-        </p:spPr>
-      </p:pic>
-      <p:sp>
-        <p:nvSpPr>
-          <p:cNvPr id="2" name="TextBox 1">
-            <a:extLst>
-              <a:ext uri="{FF2B5EF4-FFF2-40B4-BE49-F238E27FC236}">
-                <a16:creationId xmlns:a16="http://schemas.microsoft.com/office/drawing/2014/main" id="{A64F6EF4-79AA-46E9-AE4A-2A022870A434}"/>
-              </a:ext>
-            </a:extLst>
-          </p:cNvPr>
-          <p:cNvSpPr txBox="1"/>
-          <p:nvPr/>
-        </p:nvSpPr>
-        <p:spPr>
-          <a:xfrm>
-            <a:off x="6273162" y="117217"/>
-            <a:ext cx="2821606" cy="738664"/>
-          </a:xfrm>
-          <a:prstGeom prst="rect">
-            <a:avLst/>
-          </a:prstGeom>
-          <a:noFill/>
-        </p:spPr>
-        <p:txBody>
-          <a:bodyPr wrap="none" rtlCol="0">
-            <a:spAutoFit/>
-          </a:bodyPr>
-          <a:lstStyle/>
-          <a:p>
-            <a:r>
-              <a:rPr lang="ru-RU" dirty="0">
-                <a:solidFill>
-                  <a:schemeClr val="bg1"/>
-                </a:solidFill>
-              </a:rPr>
-              <a:t>Ссылка для скачивания:</a:t>
-            </a:r>
-          </a:p>
-          <a:p>
-            <a:r>
-              <a:rPr lang="en-US" dirty="0">
-                <a:solidFill>
-                  <a:schemeClr val="bg1"/>
-                </a:solidFill>
-                <a:hlinkClick r:id="rId4">
-                  <a:extLst>
-                    <a:ext uri="{A12FA001-AC4F-418D-AE19-62706E023703}">
-                      <ahyp:hlinkClr xmlns:ahyp="http://schemas.microsoft.com/office/drawing/2018/hyperlinkcolor" val="tx"/>
-                    </a:ext>
-                  </a:extLst>
-                </a:hlinkClick>
-              </a:rPr>
-              <a:t>https://git-scm.com/download/win</a:t>
-            </a:r>
-            <a:endParaRPr lang="ru-RU" dirty="0">
-              <a:solidFill>
-                <a:schemeClr val="bg1"/>
-              </a:solidFill>
-            </a:endParaRPr>
-          </a:p>
-          <a:p>
-            <a:endParaRPr lang="ru-RU" dirty="0">
-              <a:solidFill>
-                <a:schemeClr val="bg1"/>
-              </a:solidFill>
-            </a:endParaRPr>
-          </a:p>
-        </p:txBody>
-      </p:sp>
-    </p:spTree>
-    <p:extLst>
-      <p:ext uri="{BB962C8B-B14F-4D97-AF65-F5344CB8AC3E}">
-        <p14:creationId xmlns:p14="http://schemas.microsoft.com/office/powerpoint/2010/main" val="215869770"/>
-      </p:ext>
-    </p:extLst>
-  </p:cSld>
-  <p:clrMapOvr>
-    <a:masterClrMapping/>
-  </p:clrMapOvr>
-  <mc:AlternateContent xmlns:mc="http://schemas.openxmlformats.org/markup-compatibility/2006">
-    <mc:Choice xmlns:p14="http://schemas.microsoft.com/office/powerpoint/2010/main" Requires="p14">
-      <p:transition spd="slow" p14:dur="1500">
-        <p:split orient="vert"/>
-      </p:transition>
-    </mc:Choice>
-    <mc:Fallback>
-      <p:transition spd="slow">
-        <p:split orient="vert"/>
-      </p:transition>
-    </mc:Fallback>
-  </mc:AlternateContent>
-</p:sld>
-</file>
-
-<file path=ppt/slides/slide12.xml><?xml version="1.0" encoding="utf-8"?>
-<p:sld xmlns:a="http://schemas.openxmlformats.org/drawingml/2006/main" xmlns:r="http://schemas.openxmlformats.org/officeDocument/2006/relationships" xmlns:p="http://schemas.openxmlformats.org/presentationml/2006/main">
-  <p:cSld>
-    <p:bg>
-      <p:bgPr>
-        <a:solidFill>
-          <a:srgbClr val="001746"/>
-        </a:solidFill>
-        <a:effectLst/>
-      </p:bgPr>
-    </p:bg>
-    <p:spTree>
-      <p:nvGrpSpPr>
-        <p:cNvPr id="1" name=""/>
-        <p:cNvGrpSpPr/>
-        <p:nvPr/>
-      </p:nvGrpSpPr>
-      <p:grpSpPr>
-        <a:xfrm>
-          <a:off x="0" y="0"/>
-          <a:ext cx="0" cy="0"/>
-          <a:chOff x="0" y="0"/>
-          <a:chExt cx="0" cy="0"/>
-        </a:xfrm>
-      </p:grpSpPr>
-      <p:sp>
-        <p:nvSpPr>
-          <p:cNvPr id="8" name="Заголовок 7">
-            <a:extLst>
-              <a:ext uri="{FF2B5EF4-FFF2-40B4-BE49-F238E27FC236}">
-                <a16:creationId xmlns:a16="http://schemas.microsoft.com/office/drawing/2014/main" id="{CD2A918D-FCB5-4A6A-B076-B7C922CDE925}"/>
-              </a:ext>
-            </a:extLst>
-          </p:cNvPr>
-          <p:cNvSpPr>
-            <a:spLocks noGrp="1"/>
-          </p:cNvSpPr>
-          <p:nvPr>
-            <p:ph type="title" idx="4294967295"/>
-          </p:nvPr>
-        </p:nvSpPr>
-        <p:spPr>
-          <a:xfrm>
-            <a:off x="449317" y="622739"/>
-            <a:ext cx="8245364" cy="1150882"/>
-          </a:xfrm>
-        </p:spPr>
-        <p:txBody>
-          <a:bodyPr/>
-          <a:lstStyle/>
-          <a:p>
-            <a:pPr algn="ctr"/>
-            <a:r>
-              <a:rPr lang="ru-RU" sz="2400" dirty="0">
-                <a:solidFill>
-                  <a:schemeClr val="bg1"/>
-                </a:solidFill>
-              </a:rPr>
-              <a:t>Это</a:t>
-            </a:r>
-            <a:r>
-              <a:rPr lang="en-US" sz="2400" dirty="0">
-                <a:solidFill>
-                  <a:schemeClr val="bg1"/>
-                </a:solidFill>
-              </a:rPr>
-              <a:t> </a:t>
-            </a:r>
-            <a:r>
-              <a:rPr lang="ru-RU" sz="2400" dirty="0">
-                <a:solidFill>
-                  <a:schemeClr val="bg1"/>
-                </a:solidFill>
-              </a:rPr>
-              <a:t>визуальный клиент системы управления исходными кодами программы </a:t>
-            </a:r>
-            <a:r>
-              <a:rPr lang="en-US" sz="2400" dirty="0">
-                <a:solidFill>
-                  <a:schemeClr val="bg1"/>
-                </a:solidFill>
-              </a:rPr>
-              <a:t>Git</a:t>
-            </a:r>
-            <a:r>
-              <a:rPr lang="ru-RU" sz="2400" dirty="0">
-                <a:solidFill>
-                  <a:schemeClr val="bg1"/>
-                </a:solidFill>
-              </a:rPr>
-              <a:t>, скачать который можно по ссылке:  </a:t>
-            </a:r>
-            <a:r>
-              <a:rPr lang="en-US" sz="1600" dirty="0">
-                <a:solidFill>
-                  <a:schemeClr val="bg1"/>
-                </a:solidFill>
-                <a:hlinkClick r:id="rId2">
-                  <a:extLst>
-                    <a:ext uri="{A12FA001-AC4F-418D-AE19-62706E023703}">
-                      <ahyp:hlinkClr xmlns:ahyp="http://schemas.microsoft.com/office/drawing/2018/hyperlinkcolor" val="tx"/>
-                    </a:ext>
-                  </a:extLst>
-                </a:hlinkClick>
-              </a:rPr>
-              <a:t>https://tortoisegit.org/download/</a:t>
-            </a:r>
-            <a:br>
-              <a:rPr lang="ru-RU" sz="1200" dirty="0">
-                <a:solidFill>
-                  <a:schemeClr val="bg1"/>
-                </a:solidFill>
-              </a:rPr>
-            </a:br>
-            <a:endParaRPr lang="ru-RU" sz="2400" dirty="0">
-              <a:solidFill>
-                <a:schemeClr val="bg1"/>
-              </a:solidFill>
-            </a:endParaRPr>
-          </a:p>
-        </p:txBody>
-      </p:sp>
-      <p:pic>
-        <p:nvPicPr>
-          <p:cNvPr id="3" name="Рисунок 2">
-            <a:extLst>
-              <a:ext uri="{FF2B5EF4-FFF2-40B4-BE49-F238E27FC236}">
-                <a16:creationId xmlns:a16="http://schemas.microsoft.com/office/drawing/2014/main" id="{29FB72C1-EC73-42F9-8DE8-FE212BBBB1AE}"/>
-              </a:ext>
-            </a:extLst>
-          </p:cNvPr>
-          <p:cNvPicPr>
-            <a:picLocks noChangeAspect="1"/>
-          </p:cNvPicPr>
-          <p:nvPr/>
-        </p:nvPicPr>
-        <p:blipFill>
-          <a:blip r:embed="rId3"/>
-          <a:stretch>
-            <a:fillRect/>
-          </a:stretch>
-        </p:blipFill>
-        <p:spPr>
-          <a:xfrm>
-            <a:off x="2100020" y="1977402"/>
-            <a:ext cx="4943959" cy="2725134"/>
-          </a:xfrm>
-          <a:prstGeom prst="roundRect">
-            <a:avLst>
-              <a:gd name="adj" fmla="val 8594"/>
-            </a:avLst>
-          </a:prstGeom>
-          <a:solidFill>
-            <a:srgbClr val="FFFFFF">
-              <a:shade val="85000"/>
-            </a:srgbClr>
-          </a:solidFill>
-          <a:ln>
-            <a:noFill/>
-          </a:ln>
-          <a:effectLst>
-            <a:reflection blurRad="12700" stA="38000" endPos="28000" dist="5000" dir="5400000" sy="-100000" algn="bl" rotWithShape="0"/>
-          </a:effectLst>
-        </p:spPr>
-      </p:pic>
-      <p:sp>
-        <p:nvSpPr>
-          <p:cNvPr id="5" name="TextBox 4">
-            <a:extLst>
-              <a:ext uri="{FF2B5EF4-FFF2-40B4-BE49-F238E27FC236}">
-                <a16:creationId xmlns:a16="http://schemas.microsoft.com/office/drawing/2014/main" id="{850A8532-BD57-4577-9FAD-076F4DE22E44}"/>
-              </a:ext>
-            </a:extLst>
-          </p:cNvPr>
-          <p:cNvSpPr txBox="1"/>
-          <p:nvPr/>
-        </p:nvSpPr>
-        <p:spPr>
-          <a:xfrm>
-            <a:off x="3797285" y="99518"/>
-            <a:ext cx="1789386" cy="523220"/>
-          </a:xfrm>
-          <a:prstGeom prst="rect">
-            <a:avLst/>
-          </a:prstGeom>
-          <a:noFill/>
-        </p:spPr>
-        <p:txBody>
-          <a:bodyPr wrap="square">
-            <a:spAutoFit/>
-          </a:bodyPr>
-          <a:lstStyle/>
-          <a:p>
-            <a:pPr algn="ctr"/>
-            <a:r>
-              <a:rPr lang="en-US" sz="2800" b="1" u="sng" dirty="0" err="1">
-                <a:solidFill>
-                  <a:srgbClr val="FF0000"/>
-                </a:solidFill>
-                <a:latin typeface="Oswald Medium" panose="00000600000000000000" pitchFamily="2" charset="-52"/>
-              </a:rPr>
-              <a:t>TortoiseGit</a:t>
-            </a:r>
-            <a:r>
-              <a:rPr lang="ru-RU" sz="2800" b="1" u="sng" dirty="0">
-                <a:solidFill>
-                  <a:srgbClr val="FF0000"/>
-                </a:solidFill>
-                <a:latin typeface="Oswald Medium" panose="00000600000000000000" pitchFamily="2" charset="-52"/>
-              </a:rPr>
-              <a:t>:</a:t>
-            </a:r>
-            <a:r>
-              <a:rPr lang="en-US" sz="2800" b="1" u="sng" dirty="0">
-                <a:solidFill>
-                  <a:srgbClr val="FF0000"/>
-                </a:solidFill>
-                <a:latin typeface="Oswald Medium" panose="00000600000000000000" pitchFamily="2" charset="-52"/>
-              </a:rPr>
-              <a:t> </a:t>
-            </a:r>
-            <a:endParaRPr lang="ru-RU" sz="2800" b="1" dirty="0">
-              <a:latin typeface="Oswald Medium" panose="00000600000000000000" pitchFamily="2" charset="-52"/>
-            </a:endParaRPr>
-          </a:p>
-        </p:txBody>
-      </p:sp>
-    </p:spTree>
-    <p:extLst>
-      <p:ext uri="{BB962C8B-B14F-4D97-AF65-F5344CB8AC3E}">
-        <p14:creationId xmlns:p14="http://schemas.microsoft.com/office/powerpoint/2010/main" val="952590308"/>
-      </p:ext>
-    </p:extLst>
-  </p:cSld>
-  <p:clrMapOvr>
-    <a:masterClrMapping/>
-  </p:clrMapOvr>
-  <mc:AlternateContent xmlns:mc="http://schemas.openxmlformats.org/markup-compatibility/2006">
-    <mc:Choice xmlns:p14="http://schemas.microsoft.com/office/powerpoint/2010/main" Requires="p14">
-      <p:transition spd="slow" p14:dur="1500">
-        <p:split orient="vert"/>
-      </p:transition>
-    </mc:Choice>
-    <mc:Fallback>
-      <p:transition spd="slow">
-        <p:split orient="vert"/>
-      </p:transition>
-    </mc:Fallback>
-  </mc:AlternateContent>
-</p:sld>
-</file>
-
-<file path=ppt/slides/slide13.xml><?xml version="1.0" encoding="utf-8"?>
 <p:sld xmlns:a="http://schemas.openxmlformats.org/drawingml/2006/main" xmlns:r="http://schemas.openxmlformats.org/officeDocument/2006/relationships" xmlns:p="http://schemas.openxmlformats.org/presentationml/2006/main">
   <p:cSld>
     <p:bg>
@@ -8180,15 +7020,6 @@
           <a:effectLst>
             <a:reflection blurRad="12700" stA="38000" endPos="28000" dist="5000" dir="5400000" sy="-100000" algn="bl" rotWithShape="0"/>
           </a:effectLst>
-          <a:extLst>
-            <a:ext uri="{909E8E84-426E-40DD-AFC4-6F175D3DCCD1}">
-              <a14:hiddenFill xmlns:a14="http://schemas.microsoft.com/office/drawing/2010/main">
-                <a:solidFill>
-                  <a:srgbClr val="FFFFFF"/>
-                </a:solidFill>
-              </a14:hiddenFill>
-            </a:ext>
-          </a:extLst>
         </p:spPr>
       </p:pic>
       <p:sp>
@@ -8495,13 +7326,13 @@
   <p:clrMapOvr>
     <a:masterClrMapping/>
   </p:clrMapOvr>
-  <mc:AlternateContent xmlns:mc="http://schemas.openxmlformats.org/markup-compatibility/2006">
-    <mc:Choice xmlns:p14="http://schemas.microsoft.com/office/powerpoint/2010/main" Requires="p14">
+  <mc:AlternateContent xmlns:mc="http://schemas.openxmlformats.org/markup-compatibility/2006" xmlns:p14="http://schemas.microsoft.com/office/powerpoint/2010/main">
+    <mc:Choice Requires="p14">
       <p:transition spd="slow" p14:dur="1500">
         <p:split orient="vert"/>
       </p:transition>
     </mc:Choice>
-    <mc:Fallback>
+    <mc:Fallback xmlns="">
       <p:transition spd="slow">
         <p:split orient="vert"/>
       </p:transition>
@@ -8583,15 +7414,6 @@
           <a:effectLst>
             <a:reflection blurRad="12700" stA="38000" endPos="28000" dist="5000" dir="5400000" sy="-100000" algn="bl" rotWithShape="0"/>
           </a:effectLst>
-          <a:extLst>
-            <a:ext uri="{909E8E84-426E-40DD-AFC4-6F175D3DCCD1}">
-              <a14:hiddenFill xmlns:a14="http://schemas.microsoft.com/office/drawing/2010/main">
-                <a:solidFill>
-                  <a:srgbClr val="FFFFFF"/>
-                </a:solidFill>
-              </a14:hiddenFill>
-            </a:ext>
-          </a:extLst>
         </p:spPr>
       </p:pic>
     </p:spTree>
@@ -8604,13 +7426,13 @@
   <p:clrMapOvr>
     <a:masterClrMapping/>
   </p:clrMapOvr>
-  <mc:AlternateContent xmlns:mc="http://schemas.openxmlformats.org/markup-compatibility/2006">
-    <mc:Choice xmlns:p14="http://schemas.microsoft.com/office/powerpoint/2010/main" Requires="p14">
+  <mc:AlternateContent xmlns:mc="http://schemas.openxmlformats.org/markup-compatibility/2006" xmlns:p14="http://schemas.microsoft.com/office/powerpoint/2010/main">
+    <mc:Choice Requires="p14">
       <p:transition spd="slow" p14:dur="1500">
         <p:split orient="vert"/>
       </p:transition>
     </mc:Choice>
-    <mc:Fallback>
+    <mc:Fallback xmlns="">
       <p:transition spd="slow">
         <p:split orient="vert"/>
       </p:transition>
@@ -8692,15 +7514,6 @@
           <a:effectLst>
             <a:reflection blurRad="12700" stA="38000" endPos="28000" dist="5000" dir="5400000" sy="-100000" algn="bl" rotWithShape="0"/>
           </a:effectLst>
-          <a:extLst>
-            <a:ext uri="{909E8E84-426E-40DD-AFC4-6F175D3DCCD1}">
-              <a14:hiddenFill xmlns:a14="http://schemas.microsoft.com/office/drawing/2010/main">
-                <a:solidFill>
-                  <a:srgbClr val="FFFFFF"/>
-                </a:solidFill>
-              </a14:hiddenFill>
-            </a:ext>
-          </a:extLst>
         </p:spPr>
       </p:pic>
     </p:spTree>
@@ -8713,13 +7526,13 @@
   <p:clrMapOvr>
     <a:masterClrMapping/>
   </p:clrMapOvr>
-  <mc:AlternateContent xmlns:mc="http://schemas.openxmlformats.org/markup-compatibility/2006">
-    <mc:Choice xmlns:p14="http://schemas.microsoft.com/office/powerpoint/2010/main" Requires="p14">
+  <mc:AlternateContent xmlns:mc="http://schemas.openxmlformats.org/markup-compatibility/2006" xmlns:p14="http://schemas.microsoft.com/office/powerpoint/2010/main">
+    <mc:Choice Requires="p14">
       <p:transition spd="slow" p14:dur="1500">
         <p:split orient="vert"/>
       </p:transition>
     </mc:Choice>
-    <mc:Fallback>
+    <mc:Fallback xmlns="">
       <p:transition spd="slow">
         <p:split orient="vert"/>
       </p:transition>
@@ -8853,13 +7666,13 @@
   <p:clrMapOvr>
     <a:masterClrMapping/>
   </p:clrMapOvr>
-  <mc:AlternateContent xmlns:mc="http://schemas.openxmlformats.org/markup-compatibility/2006">
-    <mc:Choice xmlns:p14="http://schemas.microsoft.com/office/powerpoint/2010/main" Requires="p14">
+  <mc:AlternateContent xmlns:mc="http://schemas.openxmlformats.org/markup-compatibility/2006" xmlns:p14="http://schemas.microsoft.com/office/powerpoint/2010/main">
+    <mc:Choice Requires="p14">
       <p:transition spd="slow" p14:dur="1500">
         <p:split orient="vert"/>
       </p:transition>
     </mc:Choice>
-    <mc:Fallback>
+    <mc:Fallback xmlns="">
       <p:transition spd="slow">
         <p:split orient="vert"/>
       </p:transition>
@@ -9372,13 +8185,13 @@
   <p:clrMapOvr>
     <a:masterClrMapping/>
   </p:clrMapOvr>
-  <mc:AlternateContent xmlns:mc="http://schemas.openxmlformats.org/markup-compatibility/2006">
-    <mc:Choice xmlns:p14="http://schemas.microsoft.com/office/powerpoint/2010/main" Requires="p14">
+  <mc:AlternateContent xmlns:mc="http://schemas.openxmlformats.org/markup-compatibility/2006" xmlns:p14="http://schemas.microsoft.com/office/powerpoint/2010/main">
+    <mc:Choice Requires="p14">
       <p:transition spd="slow" p14:dur="1500">
         <p:split orient="vert"/>
       </p:transition>
     </mc:Choice>
-    <mc:Fallback>
+    <mc:Fallback xmlns="">
       <p:transition spd="slow">
         <p:split orient="vert"/>
       </p:transition>
@@ -9853,13 +8666,13 @@
   <p:clrMapOvr>
     <a:masterClrMapping/>
   </p:clrMapOvr>
-  <mc:AlternateContent xmlns:mc="http://schemas.openxmlformats.org/markup-compatibility/2006">
-    <mc:Choice xmlns:p14="http://schemas.microsoft.com/office/powerpoint/2010/main" Requires="p14">
+  <mc:AlternateContent xmlns:mc="http://schemas.openxmlformats.org/markup-compatibility/2006" xmlns:p14="http://schemas.microsoft.com/office/powerpoint/2010/main">
+    <mc:Choice Requires="p14">
       <p:transition spd="slow" p14:dur="1500">
         <p:split orient="vert"/>
       </p:transition>
     </mc:Choice>
-    <mc:Fallback>
+    <mc:Fallback xmlns="">
       <p:transition spd="slow">
         <p:split orient="vert"/>
       </p:transition>
@@ -9869,324 +8682,6 @@
 </file>
 
 <file path=ppt/slides/slide7.xml><?xml version="1.0" encoding="utf-8"?>
-<p:sld xmlns:a="http://schemas.openxmlformats.org/drawingml/2006/main" xmlns:r="http://schemas.openxmlformats.org/officeDocument/2006/relationships" xmlns:p="http://schemas.openxmlformats.org/presentationml/2006/main">
-  <p:cSld>
-    <p:bg>
-      <p:bgPr>
-        <a:solidFill>
-          <a:srgbClr val="001746"/>
-        </a:solidFill>
-        <a:effectLst/>
-      </p:bgPr>
-    </p:bg>
-    <p:spTree>
-      <p:nvGrpSpPr>
-        <p:cNvPr id="1" name=""/>
-        <p:cNvGrpSpPr/>
-        <p:nvPr/>
-      </p:nvGrpSpPr>
-      <p:grpSpPr>
-        <a:xfrm>
-          <a:off x="0" y="0"/>
-          <a:ext cx="0" cy="0"/>
-          <a:chOff x="0" y="0"/>
-          <a:chExt cx="0" cy="0"/>
-        </a:xfrm>
-      </p:grpSpPr>
-      <p:sp>
-        <p:nvSpPr>
-          <p:cNvPr id="2" name="Заголовок 1">
-            <a:extLst>
-              <a:ext uri="{FF2B5EF4-FFF2-40B4-BE49-F238E27FC236}">
-                <a16:creationId xmlns:a16="http://schemas.microsoft.com/office/drawing/2014/main" id="{8738C682-F29F-486C-B499-BAC2F9F61C64}"/>
-              </a:ext>
-            </a:extLst>
-          </p:cNvPr>
-          <p:cNvSpPr>
-            <a:spLocks noGrp="1"/>
-          </p:cNvSpPr>
-          <p:nvPr>
-            <p:ph type="title" idx="4294967295"/>
-          </p:nvPr>
-        </p:nvSpPr>
-        <p:spPr>
-          <a:xfrm>
-            <a:off x="441434" y="755729"/>
-            <a:ext cx="6731876" cy="4234111"/>
-          </a:xfrm>
-        </p:spPr>
-        <p:txBody>
-          <a:bodyPr/>
-          <a:lstStyle/>
-          <a:p>
-            <a:pPr>
-              <a:lnSpc>
-                <a:spcPct val="150000"/>
-              </a:lnSpc>
-            </a:pPr>
-            <a:r>
-              <a:rPr lang="en-US" sz="2000" dirty="0">
-                <a:solidFill>
-                  <a:schemeClr val="bg1"/>
-                </a:solidFill>
-              </a:rPr>
-              <a:t>1. </a:t>
-            </a:r>
-            <a:r>
-              <a:rPr lang="ru-RU" sz="2000" dirty="0">
-                <a:solidFill>
-                  <a:schemeClr val="bg1"/>
-                </a:solidFill>
-              </a:rPr>
-              <a:t>Актуальная информация о состоянии проектов</a:t>
-            </a:r>
-            <a:br>
-              <a:rPr lang="ru-RU" sz="2000" dirty="0">
-                <a:solidFill>
-                  <a:schemeClr val="bg1"/>
-                </a:solidFill>
-              </a:rPr>
-            </a:br>
-            <a:r>
-              <a:rPr lang="ru-RU" sz="2000" dirty="0">
-                <a:solidFill>
-                  <a:schemeClr val="bg1"/>
-                </a:solidFill>
-              </a:rPr>
-              <a:t>2. Централизованное место хранения проектных документов</a:t>
-            </a:r>
-            <a:br>
-              <a:rPr lang="ru-RU" sz="2000" dirty="0">
-                <a:solidFill>
-                  <a:schemeClr val="bg1"/>
-                </a:solidFill>
-              </a:rPr>
-            </a:br>
-            <a:r>
-              <a:rPr lang="ru-RU" sz="2000" dirty="0">
-                <a:solidFill>
-                  <a:schemeClr val="bg1"/>
-                </a:solidFill>
-              </a:rPr>
-              <a:t>3. Распределение ресурсов</a:t>
-            </a:r>
-            <a:br>
-              <a:rPr lang="ru-RU" sz="2000" dirty="0">
-                <a:solidFill>
-                  <a:schemeClr val="bg1"/>
-                </a:solidFill>
-              </a:rPr>
-            </a:br>
-            <a:r>
-              <a:rPr lang="ru-RU" sz="2000" dirty="0">
-                <a:solidFill>
-                  <a:schemeClr val="bg1"/>
-                </a:solidFill>
-              </a:rPr>
-              <a:t>4. Календарно-сетевое планирование (Диаграмма </a:t>
-            </a:r>
-            <a:r>
-              <a:rPr lang="ru-RU" sz="2000" dirty="0" err="1">
-                <a:solidFill>
-                  <a:schemeClr val="bg1"/>
-                </a:solidFill>
-              </a:rPr>
-              <a:t>Ганта</a:t>
-            </a:r>
-            <a:r>
-              <a:rPr lang="ru-RU" sz="2000" dirty="0">
-                <a:solidFill>
-                  <a:schemeClr val="bg1"/>
-                </a:solidFill>
-              </a:rPr>
-              <a:t>)</a:t>
-            </a:r>
-            <a:br>
-              <a:rPr lang="ru-RU" sz="2000" dirty="0">
-                <a:solidFill>
-                  <a:schemeClr val="bg1"/>
-                </a:solidFill>
-              </a:rPr>
-            </a:br>
-            <a:r>
-              <a:rPr lang="ru-RU" sz="2000" dirty="0">
-                <a:solidFill>
-                  <a:schemeClr val="bg1"/>
-                </a:solidFill>
-              </a:rPr>
-              <a:t>5. Визуальная отчетность</a:t>
-            </a:r>
-            <a:br>
-              <a:rPr lang="ru-RU" sz="2000" dirty="0">
-                <a:solidFill>
-                  <a:schemeClr val="bg1"/>
-                </a:solidFill>
-              </a:rPr>
-            </a:br>
-            <a:r>
-              <a:rPr lang="ru-RU" sz="2000" dirty="0">
-                <a:solidFill>
-                  <a:schemeClr val="bg1"/>
-                </a:solidFill>
-              </a:rPr>
-              <a:t>6. Разграничение доступа к информации</a:t>
-            </a:r>
-            <a:br>
-              <a:rPr lang="ru-RU" sz="2000" dirty="0">
-                <a:solidFill>
-                  <a:schemeClr val="bg1"/>
-                </a:solidFill>
-              </a:rPr>
-            </a:br>
-            <a:r>
-              <a:rPr lang="ru-RU" sz="2000" dirty="0">
-                <a:solidFill>
-                  <a:schemeClr val="bg1"/>
-                </a:solidFill>
-              </a:rPr>
-              <a:t>7. Структурированный поиск информации</a:t>
-            </a:r>
-            <a:br>
-              <a:rPr lang="ru-RU" sz="2000" dirty="0">
-                <a:solidFill>
-                  <a:schemeClr val="bg1"/>
-                </a:solidFill>
-              </a:rPr>
-            </a:br>
-            <a:r>
-              <a:rPr lang="ru-RU" sz="2000" dirty="0">
-                <a:solidFill>
-                  <a:schemeClr val="bg1"/>
-                </a:solidFill>
-              </a:rPr>
-              <a:t>8. Интеграция в информационную инфраструктуру предприятия</a:t>
-            </a:r>
-            <a:br>
-              <a:rPr lang="ru-RU" sz="2000" dirty="0">
-                <a:solidFill>
-                  <a:srgbClr val="FF0000"/>
-                </a:solidFill>
-              </a:rPr>
-            </a:br>
-            <a:r>
-              <a:rPr lang="ru-RU" sz="2000" dirty="0">
-                <a:solidFill>
-                  <a:schemeClr val="bg1"/>
-                </a:solidFill>
-              </a:rPr>
-              <a:t>9. Отслеживание актуального состояния выполнения задачи</a:t>
-            </a:r>
-            <a:br>
-              <a:rPr lang="ru-RU" sz="2000" dirty="0">
-                <a:solidFill>
-                  <a:schemeClr val="bg1"/>
-                </a:solidFill>
-              </a:rPr>
-            </a:br>
-            <a:endParaRPr lang="ru-RU" sz="2000" dirty="0">
-              <a:solidFill>
-                <a:schemeClr val="bg1"/>
-              </a:solidFill>
-            </a:endParaRPr>
-          </a:p>
-        </p:txBody>
-      </p:sp>
-      <p:sp>
-        <p:nvSpPr>
-          <p:cNvPr id="3" name="Заголовок 2">
-            <a:extLst>
-              <a:ext uri="{FF2B5EF4-FFF2-40B4-BE49-F238E27FC236}">
-                <a16:creationId xmlns:a16="http://schemas.microsoft.com/office/drawing/2014/main" id="{C69C51BD-7CAB-4325-8297-6C34E1A97DCF}"/>
-              </a:ext>
-            </a:extLst>
-          </p:cNvPr>
-          <p:cNvSpPr>
-            <a:spLocks noGrp="1"/>
-          </p:cNvSpPr>
-          <p:nvPr>
-            <p:ph type="title" idx="4294967295"/>
-          </p:nvPr>
-        </p:nvSpPr>
-        <p:spPr>
-          <a:xfrm>
-            <a:off x="1290234" y="176292"/>
-            <a:ext cx="6563532" cy="579437"/>
-          </a:xfrm>
-        </p:spPr>
-        <p:txBody>
-          <a:bodyPr/>
-          <a:lstStyle/>
-          <a:p>
-            <a:pPr algn="ctr"/>
-            <a:r>
-              <a:rPr lang="en-US" sz="2800" u="sng" dirty="0">
-                <a:solidFill>
-                  <a:srgbClr val="FF0000"/>
-                </a:solidFill>
-              </a:rPr>
-              <a:t>PPM </a:t>
-            </a:r>
-            <a:r>
-              <a:rPr lang="en-US" u="sng" dirty="0">
-                <a:solidFill>
-                  <a:srgbClr val="FF0000"/>
-                </a:solidFill>
-              </a:rPr>
-              <a:t>system</a:t>
-            </a:r>
-            <a:r>
-              <a:rPr lang="ru-RU" sz="2800" u="sng" dirty="0">
-                <a:solidFill>
-                  <a:srgbClr val="FF0000"/>
-                </a:solidFill>
-              </a:rPr>
-              <a:t> (</a:t>
-            </a:r>
-            <a:r>
-              <a:rPr lang="en-US" sz="2800" u="sng" dirty="0">
-                <a:solidFill>
-                  <a:srgbClr val="FF0000"/>
-                </a:solidFill>
-              </a:rPr>
-              <a:t>Project Portfolio Management</a:t>
-            </a:r>
-            <a:r>
-              <a:rPr lang="ru-RU" sz="2800" u="sng" dirty="0">
-                <a:solidFill>
-                  <a:srgbClr val="FF0000"/>
-                </a:solidFill>
-              </a:rPr>
-              <a:t>)</a:t>
-            </a:r>
-          </a:p>
-        </p:txBody>
-      </p:sp>
-    </p:spTree>
-    <p:extLst>
-      <p:ext uri="{BB962C8B-B14F-4D97-AF65-F5344CB8AC3E}">
-        <p14:creationId xmlns:p14="http://schemas.microsoft.com/office/powerpoint/2010/main" val="2153187432"/>
-      </p:ext>
-    </p:extLst>
-  </p:cSld>
-  <p:clrMapOvr>
-    <a:masterClrMapping/>
-  </p:clrMapOvr>
-  <mc:AlternateContent xmlns:mc="http://schemas.openxmlformats.org/markup-compatibility/2006">
-    <mc:Choice xmlns:p14="http://schemas.microsoft.com/office/powerpoint/2010/main" Requires="p14">
-      <p:transition spd="slow" p14:dur="1500">
-        <p:split orient="vert"/>
-      </p:transition>
-    </mc:Choice>
-    <mc:Fallback>
-      <p:transition spd="slow">
-        <p:split orient="vert"/>
-      </p:transition>
-    </mc:Fallback>
-  </mc:AlternateContent>
-</p:sld>
-</file>
-
-<file path=ppt/slides/slide8.xml><?xml version="1.0" encoding="utf-8"?>
 <p:sld xmlns:a="http://schemas.openxmlformats.org/drawingml/2006/main" xmlns:r="http://schemas.openxmlformats.org/officeDocument/2006/relationships" xmlns:p="http://schemas.openxmlformats.org/presentationml/2006/main">
   <p:cSld>
     <p:bg>
@@ -10321,13 +8816,300 @@
   <p:clrMapOvr>
     <a:masterClrMapping/>
   </p:clrMapOvr>
-  <mc:AlternateContent xmlns:mc="http://schemas.openxmlformats.org/markup-compatibility/2006">
-    <mc:Choice xmlns:p14="http://schemas.microsoft.com/office/powerpoint/2010/main" Requires="p14">
+  <mc:AlternateContent xmlns:mc="http://schemas.openxmlformats.org/markup-compatibility/2006" xmlns:p14="http://schemas.microsoft.com/office/powerpoint/2010/main">
+    <mc:Choice Requires="p14">
       <p:transition spd="slow" p14:dur="1500">
         <p:split orient="vert"/>
       </p:transition>
     </mc:Choice>
-    <mc:Fallback>
+    <mc:Fallback xmlns="">
+      <p:transition spd="slow">
+        <p:split orient="vert"/>
+      </p:transition>
+    </mc:Fallback>
+  </mc:AlternateContent>
+</p:sld>
+</file>
+
+<file path=ppt/slides/slide8.xml><?xml version="1.0" encoding="utf-8"?>
+<p:sld xmlns:a="http://schemas.openxmlformats.org/drawingml/2006/main" xmlns:r="http://schemas.openxmlformats.org/officeDocument/2006/relationships" xmlns:p="http://schemas.openxmlformats.org/presentationml/2006/main">
+  <p:cSld>
+    <p:bg>
+      <p:bgPr>
+        <a:solidFill>
+          <a:srgbClr val="001746"/>
+        </a:solidFill>
+        <a:effectLst/>
+      </p:bgPr>
+    </p:bg>
+    <p:spTree>
+      <p:nvGrpSpPr>
+        <p:cNvPr id="1" name=""/>
+        <p:cNvGrpSpPr/>
+        <p:nvPr/>
+      </p:nvGrpSpPr>
+      <p:grpSpPr>
+        <a:xfrm>
+          <a:off x="0" y="0"/>
+          <a:ext cx="0" cy="0"/>
+          <a:chOff x="0" y="0"/>
+          <a:chExt cx="0" cy="0"/>
+        </a:xfrm>
+      </p:grpSpPr>
+      <p:sp>
+        <p:nvSpPr>
+          <p:cNvPr id="2" name="Заголовок 1">
+            <a:extLst>
+              <a:ext uri="{FF2B5EF4-FFF2-40B4-BE49-F238E27FC236}">
+                <a16:creationId xmlns:a16="http://schemas.microsoft.com/office/drawing/2014/main" id="{8738C682-F29F-486C-B499-BAC2F9F61C64}"/>
+              </a:ext>
+            </a:extLst>
+          </p:cNvPr>
+          <p:cNvSpPr>
+            <a:spLocks noGrp="1"/>
+          </p:cNvSpPr>
+          <p:nvPr>
+            <p:ph type="title" idx="4294967295"/>
+          </p:nvPr>
+        </p:nvSpPr>
+        <p:spPr>
+          <a:xfrm>
+            <a:off x="449943" y="812800"/>
+            <a:ext cx="7757886" cy="3944811"/>
+          </a:xfrm>
+        </p:spPr>
+        <p:txBody>
+          <a:bodyPr/>
+          <a:lstStyle/>
+          <a:p>
+            <a:pPr>
+              <a:lnSpc>
+                <a:spcPct val="200000"/>
+              </a:lnSpc>
+            </a:pPr>
+            <a:r>
+              <a:rPr lang="en-US" sz="2000" dirty="0">
+                <a:solidFill>
+                  <a:schemeClr val="bg1"/>
+                </a:solidFill>
+              </a:rPr>
+              <a:t>1. </a:t>
+            </a:r>
+            <a:r>
+              <a:rPr lang="ru-RU" sz="2000" dirty="0">
+                <a:solidFill>
+                  <a:schemeClr val="bg1"/>
+                </a:solidFill>
+              </a:rPr>
+              <a:t>Актуальная информация о состоянии проектов</a:t>
+            </a:r>
+            <a:r>
+              <a:rPr lang="en-US" sz="2000" dirty="0">
+                <a:solidFill>
+                  <a:schemeClr val="bg1"/>
+                </a:solidFill>
+              </a:rPr>
+              <a:t> </a:t>
+            </a:r>
+            <a:r>
+              <a:rPr lang="ru-RU" sz="2000" dirty="0">
+                <a:solidFill>
+                  <a:schemeClr val="bg1"/>
+                </a:solidFill>
+              </a:rPr>
+              <a:t>(управление задачами)</a:t>
+            </a:r>
+            <a:br>
+              <a:rPr lang="ru-RU" sz="2000" dirty="0">
+                <a:solidFill>
+                  <a:schemeClr val="bg1"/>
+                </a:solidFill>
+              </a:rPr>
+            </a:br>
+            <a:r>
+              <a:rPr lang="ru-RU" sz="2000" dirty="0">
+                <a:solidFill>
+                  <a:schemeClr val="bg1"/>
+                </a:solidFill>
+              </a:rPr>
+              <a:t>2. Централизованное место хранения проектных документов</a:t>
+            </a:r>
+            <a:br>
+              <a:rPr lang="ru-RU" sz="2000" dirty="0">
+                <a:solidFill>
+                  <a:schemeClr val="bg1"/>
+                </a:solidFill>
+              </a:rPr>
+            </a:br>
+            <a:r>
+              <a:rPr lang="ru-RU" sz="2000" dirty="0">
+                <a:solidFill>
+                  <a:schemeClr val="bg1"/>
+                </a:solidFill>
+              </a:rPr>
+              <a:t>3. Распределение ресурсов</a:t>
+            </a:r>
+            <a:br>
+              <a:rPr lang="ru-RU" sz="2000" dirty="0">
+                <a:solidFill>
+                  <a:schemeClr val="bg1"/>
+                </a:solidFill>
+              </a:rPr>
+            </a:br>
+            <a:r>
+              <a:rPr lang="ru-RU" sz="2000" dirty="0">
+                <a:solidFill>
+                  <a:schemeClr val="bg1"/>
+                </a:solidFill>
+              </a:rPr>
+              <a:t>4. Визуальная отчетность</a:t>
+            </a:r>
+            <a:br>
+              <a:rPr lang="ru-RU" sz="2000" dirty="0">
+                <a:solidFill>
+                  <a:schemeClr val="bg1"/>
+                </a:solidFill>
+              </a:rPr>
+            </a:br>
+            <a:r>
+              <a:rPr lang="ru-RU" sz="2000" dirty="0">
+                <a:solidFill>
+                  <a:schemeClr val="bg1"/>
+                </a:solidFill>
+              </a:rPr>
+              <a:t>5. Разграничение доступа к информации</a:t>
+            </a:r>
+            <a:br>
+              <a:rPr lang="ru-RU" sz="2000" dirty="0">
+                <a:solidFill>
+                  <a:schemeClr val="bg1"/>
+                </a:solidFill>
+              </a:rPr>
+            </a:br>
+            <a:r>
+              <a:rPr lang="ru-RU" sz="2000" dirty="0">
+                <a:solidFill>
+                  <a:schemeClr val="bg1"/>
+                </a:solidFill>
+              </a:rPr>
+              <a:t>6. Структурированный поиск информации</a:t>
+            </a:r>
+            <a:br>
+              <a:rPr lang="ru-RU" sz="2000" dirty="0">
+                <a:solidFill>
+                  <a:schemeClr val="bg1"/>
+                </a:solidFill>
+              </a:rPr>
+            </a:br>
+            <a:br>
+              <a:rPr lang="ru-RU" sz="2000" dirty="0">
+                <a:solidFill>
+                  <a:srgbClr val="FF0000"/>
+                </a:solidFill>
+              </a:rPr>
+            </a:br>
+            <a:br>
+              <a:rPr lang="ru-RU" sz="2000" dirty="0">
+                <a:solidFill>
+                  <a:schemeClr val="bg1"/>
+                </a:solidFill>
+              </a:rPr>
+            </a:br>
+            <a:endParaRPr lang="ru-RU" sz="2000" dirty="0">
+              <a:solidFill>
+                <a:schemeClr val="bg1"/>
+              </a:solidFill>
+            </a:endParaRPr>
+          </a:p>
+        </p:txBody>
+      </p:sp>
+      <p:sp>
+        <p:nvSpPr>
+          <p:cNvPr id="3" name="Заголовок 2">
+            <a:extLst>
+              <a:ext uri="{FF2B5EF4-FFF2-40B4-BE49-F238E27FC236}">
+                <a16:creationId xmlns:a16="http://schemas.microsoft.com/office/drawing/2014/main" id="{C69C51BD-7CAB-4325-8297-6C34E1A97DCF}"/>
+              </a:ext>
+            </a:extLst>
+          </p:cNvPr>
+          <p:cNvSpPr>
+            <a:spLocks noGrp="1"/>
+          </p:cNvSpPr>
+          <p:nvPr>
+            <p:ph type="title" idx="4294967295"/>
+          </p:nvPr>
+        </p:nvSpPr>
+        <p:spPr>
+          <a:xfrm>
+            <a:off x="1290234" y="176292"/>
+            <a:ext cx="6563532" cy="579437"/>
+          </a:xfrm>
+        </p:spPr>
+        <p:txBody>
+          <a:bodyPr/>
+          <a:lstStyle/>
+          <a:p>
+            <a:pPr algn="ctr"/>
+            <a:r>
+              <a:rPr lang="en-US" sz="2800" u="sng" dirty="0">
+                <a:solidFill>
+                  <a:srgbClr val="FF0000"/>
+                </a:solidFill>
+              </a:rPr>
+              <a:t>PPM </a:t>
+            </a:r>
+            <a:r>
+              <a:rPr lang="en-US" u="sng" dirty="0">
+                <a:solidFill>
+                  <a:srgbClr val="FF0000"/>
+                </a:solidFill>
+              </a:rPr>
+              <a:t>system</a:t>
+            </a:r>
+            <a:r>
+              <a:rPr lang="ru-RU" sz="2800" u="sng" dirty="0">
+                <a:solidFill>
+                  <a:srgbClr val="FF0000"/>
+                </a:solidFill>
+              </a:rPr>
+              <a:t> (</a:t>
+            </a:r>
+            <a:r>
+              <a:rPr lang="en-US" sz="2800" u="sng" dirty="0">
+                <a:solidFill>
+                  <a:srgbClr val="FF0000"/>
+                </a:solidFill>
+              </a:rPr>
+              <a:t>Project Portfolio Management</a:t>
+            </a:r>
+            <a:r>
+              <a:rPr lang="ru-RU" sz="2800" u="sng" dirty="0">
+                <a:solidFill>
+                  <a:srgbClr val="FF0000"/>
+                </a:solidFill>
+              </a:rPr>
+              <a:t>)</a:t>
+            </a:r>
+          </a:p>
+        </p:txBody>
+      </p:sp>
+    </p:spTree>
+    <p:extLst>
+      <p:ext uri="{BB962C8B-B14F-4D97-AF65-F5344CB8AC3E}">
+        <p14:creationId xmlns:p14="http://schemas.microsoft.com/office/powerpoint/2010/main" val="2153187432"/>
+      </p:ext>
+    </p:extLst>
+  </p:cSld>
+  <p:clrMapOvr>
+    <a:masterClrMapping/>
+  </p:clrMapOvr>
+  <mc:AlternateContent xmlns:mc="http://schemas.openxmlformats.org/markup-compatibility/2006" xmlns:p14="http://schemas.microsoft.com/office/powerpoint/2010/main">
+    <mc:Choice Requires="p14">
+      <p:transition spd="slow" p14:dur="1500">
+        <p:split orient="vert"/>
+      </p:transition>
+    </mc:Choice>
+    <mc:Fallback xmlns="">
       <p:transition spd="slow">
         <p:split orient="vert"/>
       </p:transition>
@@ -10349,7 +9131,7 @@
     </p:bg>
     <p:spTree>
       <p:nvGrpSpPr>
-        <p:cNvPr id="1" name="Shape 184"/>
+        <p:cNvPr id="1" name=""/>
         <p:cNvGrpSpPr/>
         <p:nvPr/>
       </p:nvGrpSpPr>
@@ -10361,356 +9143,53 @@
           <a:chExt cx="0" cy="0"/>
         </a:xfrm>
       </p:grpSpPr>
-      <p:sp>
-        <p:nvSpPr>
-          <p:cNvPr id="191" name="Google Shape;191;p30"/>
-          <p:cNvSpPr txBox="1">
-            <a:spLocks noGrp="1"/>
-          </p:cNvSpPr>
-          <p:nvPr>
-            <p:ph type="title" idx="4294967295"/>
-          </p:nvPr>
-        </p:nvSpPr>
+      <p:pic>
+        <p:nvPicPr>
+          <p:cNvPr id="3" name="Рисунок 2">
+            <a:extLst>
+              <a:ext uri="{FF2B5EF4-FFF2-40B4-BE49-F238E27FC236}">
+                <a16:creationId xmlns:a16="http://schemas.microsoft.com/office/drawing/2014/main" id="{8B7F0E1E-606F-4D15-B02E-DBEF13F214AA}"/>
+              </a:ext>
+            </a:extLst>
+          </p:cNvPr>
+          <p:cNvPicPr>
+            <a:picLocks noChangeAspect="1"/>
+          </p:cNvPicPr>
+          <p:nvPr/>
+        </p:nvPicPr>
+        <p:blipFill>
+          <a:blip r:embed="rId2"/>
+          <a:stretch>
+            <a:fillRect/>
+          </a:stretch>
+        </p:blipFill>
         <p:spPr>
           <a:xfrm>
-            <a:off x="1570667" y="118785"/>
-            <a:ext cx="5282231" cy="600075"/>
+            <a:off x="0" y="0"/>
+            <a:ext cx="9144000" cy="5143499"/>
           </a:xfrm>
           <a:prstGeom prst="rect">
             <a:avLst/>
           </a:prstGeom>
         </p:spPr>
-        <p:txBody>
-          <a:bodyPr spcFirstLastPara="1" wrap="square" lIns="91425" tIns="91425" rIns="91425" bIns="91425" anchor="t" anchorCtr="0">
-            <a:noAutofit/>
-          </a:bodyPr>
-          <a:lstStyle/>
-          <a:p>
-            <a:pPr marL="0" lvl="0" indent="0" algn="l" rtl="0">
-              <a:spcBef>
-                <a:spcPts val="0"/>
-              </a:spcBef>
-              <a:spcAft>
-                <a:spcPts val="0"/>
-              </a:spcAft>
-              <a:buNone/>
-            </a:pPr>
-            <a:r>
-              <a:rPr lang="ru-RU" b="1" u="sng" dirty="0">
-                <a:solidFill>
-                  <a:srgbClr val="FF0000"/>
-                </a:solidFill>
-              </a:rPr>
-              <a:t>Какие возможности предоставляет:</a:t>
-            </a:r>
-            <a:br>
-              <a:rPr lang="ru-RU" b="1" u="sng" dirty="0"/>
-            </a:br>
-            <a:r>
-              <a:rPr lang="ru-RU" dirty="0">
-                <a:solidFill>
-                  <a:schemeClr val="bg1"/>
-                </a:solidFill>
-              </a:rPr>
-              <a:t> </a:t>
-            </a:r>
-            <a:endParaRPr dirty="0">
-              <a:solidFill>
-                <a:schemeClr val="bg1"/>
-              </a:solidFill>
-            </a:endParaRPr>
-          </a:p>
-        </p:txBody>
-      </p:sp>
-      <p:sp>
-        <p:nvSpPr>
-          <p:cNvPr id="58" name="TextBox 57">
-            <a:extLst>
-              <a:ext uri="{FF2B5EF4-FFF2-40B4-BE49-F238E27FC236}">
-                <a16:creationId xmlns:a16="http://schemas.microsoft.com/office/drawing/2014/main" id="{C2A3E5F5-11CA-4ACA-8692-DEE65F5793CF}"/>
-              </a:ext>
-            </a:extLst>
-          </p:cNvPr>
-          <p:cNvSpPr txBox="1"/>
-          <p:nvPr/>
-        </p:nvSpPr>
-        <p:spPr>
-          <a:xfrm>
-            <a:off x="441434" y="718860"/>
-            <a:ext cx="7070835" cy="4401205"/>
-          </a:xfrm>
-          <a:prstGeom prst="rect">
-            <a:avLst/>
-          </a:prstGeom>
-          <a:noFill/>
-        </p:spPr>
-        <p:txBody>
-          <a:bodyPr wrap="square">
-            <a:spAutoFit/>
-          </a:bodyPr>
-          <a:lstStyle/>
-          <a:p>
-            <a:r>
-              <a:rPr lang="ru-RU" sz="2000" dirty="0">
-                <a:solidFill>
-                  <a:schemeClr val="bg1"/>
-                </a:solidFill>
-                <a:latin typeface="Oswald Medium"/>
-                <a:sym typeface="Oswald Medium"/>
-              </a:rPr>
-              <a:t>1. Ведение множество проектов одновременно</a:t>
-            </a:r>
-          </a:p>
-          <a:p>
-            <a:endParaRPr lang="ru-RU" sz="2000" dirty="0">
-              <a:solidFill>
-                <a:schemeClr val="bg1"/>
-              </a:solidFill>
-              <a:latin typeface="Oswald Medium"/>
-              <a:sym typeface="Oswald Medium"/>
-            </a:endParaRPr>
-          </a:p>
-          <a:p>
-            <a:r>
-              <a:rPr lang="ru-RU" sz="2000" dirty="0">
-                <a:solidFill>
-                  <a:schemeClr val="bg1"/>
-                </a:solidFill>
-                <a:latin typeface="Oswald Medium"/>
-                <a:sym typeface="Oswald Medium"/>
-              </a:rPr>
-              <a:t>2. Формирования индивидуальных задач для каждого сотрудника</a:t>
-            </a:r>
-          </a:p>
-          <a:p>
-            <a:endParaRPr lang="ru-RU" sz="2000" dirty="0">
-              <a:solidFill>
-                <a:schemeClr val="bg1"/>
-              </a:solidFill>
-              <a:latin typeface="Oswald Medium"/>
-              <a:sym typeface="Oswald Medium"/>
-            </a:endParaRPr>
-          </a:p>
-          <a:p>
-            <a:r>
-              <a:rPr lang="ru-RU" sz="2000" dirty="0">
-                <a:solidFill>
-                  <a:schemeClr val="bg1"/>
-                </a:solidFill>
-                <a:latin typeface="Oswald Medium"/>
-                <a:sym typeface="Oswald Medium"/>
-              </a:rPr>
-              <a:t>3. Отслеживания прогресса</a:t>
-            </a:r>
-            <a:r>
-              <a:rPr lang="en-US" sz="2000" dirty="0">
-                <a:solidFill>
-                  <a:schemeClr val="bg1"/>
-                </a:solidFill>
-                <a:latin typeface="Oswald Medium"/>
-                <a:sym typeface="Oswald Medium"/>
-              </a:rPr>
-              <a:t> </a:t>
-            </a:r>
-            <a:r>
-              <a:rPr lang="ru-RU" sz="2000" dirty="0">
-                <a:solidFill>
-                  <a:schemeClr val="bg1"/>
-                </a:solidFill>
-                <a:latin typeface="Oswald Medium"/>
-                <a:sym typeface="Oswald Medium"/>
-              </a:rPr>
-              <a:t>выполнения задачи</a:t>
-            </a:r>
-          </a:p>
-          <a:p>
-            <a:endParaRPr lang="ru-RU" sz="2000" dirty="0">
-              <a:solidFill>
-                <a:schemeClr val="bg1"/>
-              </a:solidFill>
-              <a:latin typeface="Oswald Medium"/>
-              <a:sym typeface="Oswald Medium"/>
-            </a:endParaRPr>
-          </a:p>
-          <a:p>
-            <a:r>
-              <a:rPr lang="ru-RU" sz="2000" dirty="0">
-                <a:solidFill>
-                  <a:schemeClr val="bg1"/>
-                </a:solidFill>
-                <a:latin typeface="Oswald Medium"/>
-                <a:sym typeface="Oswald Medium"/>
-              </a:rPr>
-              <a:t>4. Диаграмма </a:t>
-            </a:r>
-            <a:r>
-              <a:rPr lang="ru-RU" sz="2000" dirty="0" err="1">
-                <a:solidFill>
-                  <a:schemeClr val="bg1"/>
-                </a:solidFill>
-                <a:latin typeface="Oswald Medium"/>
-                <a:sym typeface="Oswald Medium"/>
-              </a:rPr>
-              <a:t>Ганта</a:t>
-            </a:r>
-            <a:endParaRPr lang="ru-RU" sz="2000" dirty="0">
-              <a:solidFill>
-                <a:schemeClr val="bg1"/>
-              </a:solidFill>
-              <a:latin typeface="Oswald Medium"/>
-              <a:sym typeface="Oswald Medium"/>
-            </a:endParaRPr>
-          </a:p>
-          <a:p>
-            <a:endParaRPr lang="en-US" sz="2000" dirty="0">
-              <a:solidFill>
-                <a:schemeClr val="bg1"/>
-              </a:solidFill>
-              <a:latin typeface="Oswald Medium"/>
-              <a:sym typeface="Oswald Medium"/>
-            </a:endParaRPr>
-          </a:p>
-          <a:p>
-            <a:r>
-              <a:rPr lang="en-US" sz="2000" dirty="0">
-                <a:solidFill>
-                  <a:schemeClr val="bg1"/>
-                </a:solidFill>
-                <a:latin typeface="Oswald Medium"/>
-                <a:sym typeface="Oswald Medium"/>
-              </a:rPr>
-              <a:t>5. Wiki </a:t>
-            </a:r>
-            <a:r>
-              <a:rPr lang="ru-RU" sz="2000" dirty="0">
-                <a:solidFill>
-                  <a:schemeClr val="bg1"/>
-                </a:solidFill>
-                <a:latin typeface="Oswald Medium"/>
-                <a:sym typeface="Oswald Medium"/>
-              </a:rPr>
-              <a:t>для каждого проекта</a:t>
-            </a:r>
-          </a:p>
-          <a:p>
-            <a:r>
-              <a:rPr lang="en-US" sz="2000" dirty="0">
-                <a:solidFill>
-                  <a:schemeClr val="bg1"/>
-                </a:solidFill>
-                <a:latin typeface="Oswald Medium"/>
-                <a:sym typeface="Oswald Medium"/>
-              </a:rPr>
-              <a:t> </a:t>
-            </a:r>
-            <a:endParaRPr lang="ru-RU" sz="2000" dirty="0">
-              <a:solidFill>
-                <a:schemeClr val="bg1"/>
-              </a:solidFill>
-              <a:latin typeface="Oswald Medium"/>
-              <a:sym typeface="Oswald Medium"/>
-            </a:endParaRPr>
-          </a:p>
-          <a:p>
-            <a:r>
-              <a:rPr lang="ru-RU" sz="2000" dirty="0">
-                <a:solidFill>
-                  <a:schemeClr val="bg1"/>
-                </a:solidFill>
-                <a:latin typeface="Oswald Medium"/>
-                <a:sym typeface="Oswald Medium"/>
-              </a:rPr>
-              <a:t>6.</a:t>
-            </a:r>
-            <a:r>
-              <a:rPr lang="en-US" sz="2000" dirty="0">
-                <a:solidFill>
-                  <a:schemeClr val="bg1"/>
-                </a:solidFill>
-                <a:latin typeface="Oswald Medium"/>
-                <a:sym typeface="Oswald Medium"/>
-              </a:rPr>
-              <a:t> </a:t>
-            </a:r>
-            <a:r>
-              <a:rPr lang="ru-RU" sz="2000" dirty="0">
-                <a:solidFill>
-                  <a:schemeClr val="bg1"/>
-                </a:solidFill>
-                <a:latin typeface="Oswald Medium"/>
-                <a:sym typeface="Oswald Medium"/>
-              </a:rPr>
-              <a:t>Рассылка оповещений на почту</a:t>
-            </a:r>
-            <a:endParaRPr lang="en-US" sz="2000" dirty="0">
-              <a:solidFill>
-                <a:schemeClr val="bg1"/>
-              </a:solidFill>
-              <a:latin typeface="Oswald Medium"/>
-              <a:sym typeface="Oswald Medium"/>
-            </a:endParaRPr>
-          </a:p>
-          <a:p>
-            <a:endParaRPr lang="ru-RU" sz="2000" dirty="0">
-              <a:solidFill>
-                <a:schemeClr val="bg1"/>
-              </a:solidFill>
-              <a:latin typeface="Oswald Medium"/>
-              <a:sym typeface="Oswald Medium"/>
-            </a:endParaRPr>
-          </a:p>
-          <a:p>
-            <a:r>
-              <a:rPr lang="ru-RU" sz="2000" dirty="0">
-                <a:solidFill>
-                  <a:schemeClr val="bg1"/>
-                </a:solidFill>
-                <a:latin typeface="Oswald Medium"/>
-                <a:sym typeface="Oswald Medium"/>
-              </a:rPr>
-              <a:t>7. Интеграция с </a:t>
-            </a:r>
-            <a:r>
-              <a:rPr lang="en-US" sz="2000" dirty="0">
-                <a:solidFill>
-                  <a:schemeClr val="bg1"/>
-                </a:solidFill>
-                <a:latin typeface="Oswald Medium"/>
-                <a:sym typeface="Oswald Medium"/>
-              </a:rPr>
-              <a:t>Git</a:t>
-            </a:r>
-            <a:endParaRPr lang="ru-RU" sz="2000" dirty="0">
-              <a:solidFill>
-                <a:schemeClr val="bg1"/>
-              </a:solidFill>
-              <a:latin typeface="Oswald Medium"/>
-              <a:sym typeface="Oswald Medium"/>
-            </a:endParaRPr>
-          </a:p>
-          <a:p>
-            <a:endParaRPr lang="ru-RU" sz="2000" dirty="0">
-              <a:solidFill>
-                <a:schemeClr val="bg1"/>
-              </a:solidFill>
-              <a:latin typeface="Oswald Medium"/>
-              <a:sym typeface="Oswald Medium"/>
-            </a:endParaRPr>
-          </a:p>
-        </p:txBody>
-      </p:sp>
+      </p:pic>
     </p:spTree>
+    <p:extLst>
+      <p:ext uri="{BB962C8B-B14F-4D97-AF65-F5344CB8AC3E}">
+        <p14:creationId xmlns:p14="http://schemas.microsoft.com/office/powerpoint/2010/main" val="2277270073"/>
+      </p:ext>
+    </p:extLst>
   </p:cSld>
   <p:clrMapOvr>
     <a:masterClrMapping/>
   </p:clrMapOvr>
-  <mc:AlternateContent xmlns:mc="http://schemas.openxmlformats.org/markup-compatibility/2006">
-    <mc:Choice xmlns:p14="http://schemas.microsoft.com/office/powerpoint/2010/main" Requires="p14">
+  <mc:AlternateContent xmlns:mc="http://schemas.openxmlformats.org/markup-compatibility/2006" xmlns:p14="http://schemas.microsoft.com/office/powerpoint/2010/main">
+    <mc:Choice Requires="p14">
       <p:transition spd="slow" p14:dur="1500">
         <p:split orient="vert"/>
       </p:transition>
     </mc:Choice>
-    <mc:Fallback>
+    <mc:Fallback xmlns="">
       <p:transition spd="slow">
         <p:split orient="vert"/>
       </p:transition>

</xml_diff>